<commit_message>
add more texts in thread management / remove mulitple unnecessary files
</commit_message>
<xml_diff>
--- a/figs/certikos/concurrent_linking.pptx
+++ b/figs/certikos/concurrent_linking.pptx
@@ -232,7 +232,7 @@
           <a:p>
             <a:fld id="{98CD50F9-C04E-0643-A81F-E269F6C4EDC0}" type="datetimeFigureOut">
               <a:rPr lang="en-US" smtClean="0"/>
-              <a:t>1/21/19</a:t>
+              <a:t>1/22/19</a:t>
             </a:fld>
             <a:endParaRPr lang="en-US"/>
           </a:p>
@@ -411,7 +411,7 @@
             <a:fld id="{17A7BBF0-95DB-485B-8F44-219DC193D725}" type="datetimeFigureOut">
               <a:rPr lang="en-US" smtClean="0"/>
               <a:pPr/>
-              <a:t>1/21/19</a:t>
+              <a:t>1/22/19</a:t>
             </a:fld>
             <a:endParaRPr lang="en-US"/>
           </a:p>
@@ -724,7 +724,7 @@
         <p:spPr/>
         <p:txBody>
           <a:bodyPr>
-            <a:normAutofit fontScale="92500" lnSpcReduction="20000"/>
+            <a:normAutofit fontScale="85000" lnSpcReduction="10000"/>
           </a:bodyPr>
           <a:lstStyle/>
           <a:p>
@@ -7534,6 +7534,174 @@
           <a:chExt cx="0" cy="0"/>
         </a:xfrm>
       </p:grpSpPr>
+      <p:sp>
+        <p:nvSpPr>
+          <p:cNvPr id="65" name="Rectangle 64">
+            <a:extLst>
+              <a:ext uri="{FF2B5EF4-FFF2-40B4-BE49-F238E27FC236}">
+                <a16:creationId xmlns:a16="http://schemas.microsoft.com/office/drawing/2014/main" id="{F2F5B4B5-12F8-1D41-BF43-F67DF63DD38F}"/>
+              </a:ext>
+            </a:extLst>
+          </p:cNvPr>
+          <p:cNvSpPr/>
+          <p:nvPr/>
+        </p:nvSpPr>
+        <p:spPr bwMode="auto">
+          <a:xfrm>
+            <a:off x="3474858" y="2195902"/>
+            <a:ext cx="1218631" cy="1676400"/>
+          </a:xfrm>
+          <a:prstGeom prst="rect">
+            <a:avLst/>
+          </a:prstGeom>
+          <a:solidFill>
+            <a:srgbClr val="FFFF00"/>
+          </a:solidFill>
+          <a:ln w="9525" cap="flat" cmpd="sng" algn="ctr">
+            <a:noFill/>
+            <a:prstDash val="solid"/>
+            <a:round/>
+            <a:headEnd type="none" w="med" len="med"/>
+            <a:tailEnd type="none" w="med" len="med"/>
+          </a:ln>
+          <a:effectLst/>
+          <a:extLst>
+            <a:ext uri="{AF507438-7753-43e0-B8FC-AC1667EBCBE1}">
+              <a14:hiddenEffects xmlns:a14="http://schemas.microsoft.com/office/drawing/2010/main" xmlns="">
+                <a:effectLst>
+                  <a:outerShdw blurRad="63500" dist="38099" dir="2700000" algn="ctr" rotWithShape="0">
+                    <a:schemeClr val="bg2">
+                      <a:alpha val="74998"/>
+                    </a:schemeClr>
+                  </a:outerShdw>
+                </a:effectLst>
+              </a14:hiddenEffects>
+            </a:ext>
+          </a:extLst>
+        </p:spPr>
+        <p:txBody>
+          <a:bodyPr vert="horz" wrap="square" lIns="91440" tIns="45720" rIns="91440" bIns="45720" numCol="1" rtlCol="0" anchor="t" anchorCtr="0" compatLnSpc="1">
+            <a:prstTxWarp prst="textNoShape">
+              <a:avLst/>
+            </a:prstTxWarp>
+          </a:bodyPr>
+          <a:lstStyle/>
+          <a:p>
+            <a:pPr marL="0" marR="0" indent="0" algn="l" defTabSz="914400" rtl="0" eaLnBrk="1" fontAlgn="base" latinLnBrk="0" hangingPunct="1">
+              <a:lnSpc>
+                <a:spcPct val="100000"/>
+              </a:lnSpc>
+              <a:spcBef>
+                <a:spcPct val="0"/>
+              </a:spcBef>
+              <a:spcAft>
+                <a:spcPct val="0"/>
+              </a:spcAft>
+              <a:buClrTx/>
+              <a:buSzTx/>
+              <a:buFontTx/>
+              <a:buNone/>
+              <a:tabLst/>
+            </a:pPr>
+            <a:endParaRPr kumimoji="0" lang="en-US" sz="1600" b="0" i="0" u="none" strike="noStrike" cap="none" normalizeH="0" baseline="0" dirty="0">
+              <a:ln>
+                <a:noFill/>
+              </a:ln>
+              <a:solidFill>
+                <a:schemeClr val="tx1"/>
+              </a:solidFill>
+              <a:effectLst/>
+              <a:latin typeface="Arial" charset="0"/>
+              <a:ea typeface="ＭＳ Ｐゴシック" charset="0"/>
+              <a:cs typeface="Arial" charset="0"/>
+            </a:endParaRPr>
+          </a:p>
+        </p:txBody>
+      </p:sp>
+      <p:sp>
+        <p:nvSpPr>
+          <p:cNvPr id="7" name="Rectangle 6">
+            <a:extLst>
+              <a:ext uri="{FF2B5EF4-FFF2-40B4-BE49-F238E27FC236}">
+                <a16:creationId xmlns:a16="http://schemas.microsoft.com/office/drawing/2014/main" id="{FAA55B9C-19C4-AD4A-A6C9-2CD8B3F7EAEE}"/>
+              </a:ext>
+            </a:extLst>
+          </p:cNvPr>
+          <p:cNvSpPr/>
+          <p:nvPr/>
+        </p:nvSpPr>
+        <p:spPr bwMode="auto">
+          <a:xfrm>
+            <a:off x="2942396" y="625657"/>
+            <a:ext cx="1751093" cy="1454606"/>
+          </a:xfrm>
+          <a:prstGeom prst="rect">
+            <a:avLst/>
+          </a:prstGeom>
+          <a:solidFill>
+            <a:srgbClr val="FFFF00"/>
+          </a:solidFill>
+          <a:ln w="9525" cap="flat" cmpd="sng" algn="ctr">
+            <a:noFill/>
+            <a:prstDash val="solid"/>
+            <a:round/>
+            <a:headEnd type="none" w="med" len="med"/>
+            <a:tailEnd type="none" w="med" len="med"/>
+          </a:ln>
+          <a:effectLst/>
+          <a:extLst>
+            <a:ext uri="{AF507438-7753-43e0-B8FC-AC1667EBCBE1}">
+              <a14:hiddenEffects xmlns:a14="http://schemas.microsoft.com/office/drawing/2010/main" xmlns="">
+                <a:effectLst>
+                  <a:outerShdw blurRad="63500" dist="38099" dir="2700000" algn="ctr" rotWithShape="0">
+                    <a:schemeClr val="bg2">
+                      <a:alpha val="74998"/>
+                    </a:schemeClr>
+                  </a:outerShdw>
+                </a:effectLst>
+              </a14:hiddenEffects>
+            </a:ext>
+          </a:extLst>
+        </p:spPr>
+        <p:txBody>
+          <a:bodyPr vert="horz" wrap="square" lIns="91440" tIns="45720" rIns="91440" bIns="45720" numCol="1" rtlCol="0" anchor="t" anchorCtr="0" compatLnSpc="1">
+            <a:prstTxWarp prst="textNoShape">
+              <a:avLst/>
+            </a:prstTxWarp>
+          </a:bodyPr>
+          <a:lstStyle/>
+          <a:p>
+            <a:pPr marL="0" marR="0" indent="0" algn="l" defTabSz="914400" rtl="0" eaLnBrk="1" fontAlgn="base" latinLnBrk="0" hangingPunct="1">
+              <a:lnSpc>
+                <a:spcPct val="100000"/>
+              </a:lnSpc>
+              <a:spcBef>
+                <a:spcPct val="0"/>
+              </a:spcBef>
+              <a:spcAft>
+                <a:spcPct val="0"/>
+              </a:spcAft>
+              <a:buClrTx/>
+              <a:buSzTx/>
+              <a:buFontTx/>
+              <a:buNone/>
+              <a:tabLst/>
+            </a:pPr>
+            <a:endParaRPr kumimoji="0" lang="en-US" sz="1600" b="0" i="0" u="none" strike="noStrike" cap="none" normalizeH="0" baseline="0" dirty="0">
+              <a:ln>
+                <a:noFill/>
+              </a:ln>
+              <a:solidFill>
+                <a:schemeClr val="tx1"/>
+              </a:solidFill>
+              <a:effectLst/>
+              <a:latin typeface="Arial" charset="0"/>
+              <a:ea typeface="ＭＳ Ｐゴシック" charset="0"/>
+              <a:cs typeface="Arial" charset="0"/>
+            </a:endParaRPr>
+          </a:p>
+        </p:txBody>
+      </p:sp>
       <mc:AlternateContent xmlns:mc="http://schemas.openxmlformats.org/markup-compatibility/2006">
         <mc:Choice xmlns:a14="http://schemas.microsoft.com/office/drawing/2010/main" Requires="a14">
           <p:sp>
@@ -7550,7 +7718,7 @@
             </p:nvSpPr>
             <p:spPr>
               <a:xfrm>
-                <a:off x="4419600" y="1169797"/>
+                <a:off x="4770829" y="1534714"/>
                 <a:ext cx="4220771" cy="327334"/>
               </a:xfrm>
               <a:prstGeom prst="rect">
@@ -7613,11 +7781,11 @@
                                 </m:dPr>
                                 <m:e>
                                   <m:r>
-                                    <a:rPr lang="en-US" sz="1400" b="1" i="1" dirty="0" smtClean="0">
+                                    <a:rPr lang="en-US" sz="1400" b="0" i="1" dirty="0" smtClean="0">
                                       <a:latin typeface="Cambria Math" panose="02040503050406030204" pitchFamily="18" charset="0"/>
                                       <a:ea typeface="Cambria Math" panose="02040503050406030204" pitchFamily="18" charset="0"/>
                                     </a:rPr>
-                                    <m:t>𝒕𝒊𝒅</m:t>
+                                    <m:t>𝑡𝑖𝑑</m:t>
                                   </m:r>
                                   <m:r>
                                     <a:rPr lang="en-US" sz="1400" b="1" i="1" dirty="0" smtClean="0">
@@ -7739,7 +7907,7 @@
                           <m:sSub>
                             <m:sSubPr>
                               <m:ctrlPr>
-                                <a:rPr lang="en-US" sz="1400" b="0" dirty="0" smtClean="0">
+                                <a:rPr lang="en-US" sz="1400" b="0" i="1" dirty="0" smtClean="0">
                                   <a:latin typeface="Cambria Math" panose="02040503050406030204" pitchFamily="18" charset="0"/>
                                   <a:ea typeface="Cambria Math" panose="02040503050406030204" pitchFamily="18" charset="0"/>
                                 </a:rPr>
@@ -7807,7 +7975,7 @@
             </p:nvSpPr>
             <p:spPr>
               <a:xfrm>
-                <a:off x="4419600" y="1169797"/>
+                <a:off x="4770829" y="1534714"/>
                 <a:ext cx="4220771" cy="327334"/>
               </a:xfrm>
               <a:prstGeom prst="rect">
@@ -7816,7 +7984,7 @@
               <a:blipFill>
                 <a:blip r:embed="rId3"/>
                 <a:stretch>
-                  <a:fillRect b="-3704"/>
+                  <a:fillRect/>
                 </a:stretch>
               </a:blipFill>
             </p:spPr>
@@ -7851,7 +8019,7 @@
             </p:nvSpPr>
             <p:spPr>
               <a:xfrm>
-                <a:off x="4511081" y="4255879"/>
+                <a:off x="4862310" y="4691844"/>
                 <a:ext cx="4026359" cy="470706"/>
               </a:xfrm>
               <a:prstGeom prst="rect">
@@ -7999,7 +8167,7 @@
             </p:nvSpPr>
             <p:spPr>
               <a:xfrm>
-                <a:off x="4511081" y="4255879"/>
+                <a:off x="4862310" y="4691844"/>
                 <a:ext cx="4026359" cy="470706"/>
               </a:xfrm>
               <a:prstGeom prst="rect">
@@ -8008,7 +8176,7 @@
               <a:blipFill>
                 <a:blip r:embed="rId4"/>
                 <a:stretch>
-                  <a:fillRect b="-10526"/>
+                  <a:fillRect b="-7692"/>
                 </a:stretch>
               </a:blipFill>
             </p:spPr>
@@ -8041,7 +8209,7 @@
         </p:nvSpPr>
         <p:spPr>
           <a:xfrm>
-            <a:off x="1828800" y="1142970"/>
+            <a:off x="2971800" y="1444764"/>
             <a:ext cx="188929" cy="352084"/>
           </a:xfrm>
           <a:prstGeom prst="rect">
@@ -8081,7 +8249,7 @@
         </p:nvSpPr>
         <p:spPr>
           <a:xfrm rot="16200000">
-            <a:off x="1988085" y="743292"/>
+            <a:off x="3131085" y="1045086"/>
             <a:ext cx="188929" cy="352084"/>
           </a:xfrm>
           <a:prstGeom prst="rect">
@@ -8121,7 +8289,7 @@
         </p:nvSpPr>
         <p:spPr>
           <a:xfrm>
-            <a:off x="2556081" y="1115004"/>
+            <a:off x="3699081" y="1416798"/>
             <a:ext cx="188929" cy="352084"/>
           </a:xfrm>
           <a:prstGeom prst="rect">
@@ -8161,7 +8329,7 @@
         </p:nvSpPr>
         <p:spPr>
           <a:xfrm>
-            <a:off x="3018476" y="1112515"/>
+            <a:off x="4161476" y="1414309"/>
             <a:ext cx="188929" cy="352084"/>
           </a:xfrm>
           <a:prstGeom prst="rect">
@@ -8201,7 +8369,7 @@
         </p:nvSpPr>
         <p:spPr>
           <a:xfrm rot="16200000">
-            <a:off x="2920162" y="2583919"/>
+            <a:off x="4063162" y="2885713"/>
             <a:ext cx="188929" cy="352084"/>
           </a:xfrm>
           <a:prstGeom prst="rect">
@@ -8238,7 +8406,7 @@
         </p:nvSpPr>
         <p:spPr>
           <a:xfrm>
-            <a:off x="2519848" y="2906262"/>
+            <a:off x="3662848" y="3208056"/>
             <a:ext cx="188929" cy="352084"/>
           </a:xfrm>
           <a:prstGeom prst="rect">
@@ -8277,7 +8445,7 @@
             </p:nvSpPr>
             <p:spPr>
               <a:xfrm rot="16200000">
-                <a:off x="1359447" y="2561339"/>
+                <a:off x="2502447" y="2863133"/>
                 <a:ext cx="552669" cy="346249"/>
               </a:xfrm>
               <a:prstGeom prst="rect">
@@ -8331,7 +8499,7 @@
             </p:nvSpPr>
             <p:spPr>
               <a:xfrm rot="16200000">
-                <a:off x="1359447" y="2561339"/>
+                <a:off x="2502447" y="2863133"/>
                 <a:ext cx="552669" cy="346249"/>
               </a:xfrm>
               <a:prstGeom prst="rect">
@@ -8340,7 +8508,7 @@
               <a:blipFill>
                 <a:blip r:embed="rId5"/>
                 <a:stretch>
-                  <a:fillRect r="-7143"/>
+                  <a:fillRect r="-3571"/>
                 </a:stretch>
               </a:blipFill>
             </p:spPr>
@@ -8375,7 +8543,7 @@
             </p:nvSpPr>
             <p:spPr>
               <a:xfrm rot="16200000">
-                <a:off x="1040525" y="784958"/>
+                <a:off x="2183525" y="1086752"/>
                 <a:ext cx="552669" cy="346249"/>
               </a:xfrm>
               <a:prstGeom prst="rect">
@@ -8429,7 +8597,7 @@
             </p:nvSpPr>
             <p:spPr>
               <a:xfrm rot="16200000">
-                <a:off x="1040525" y="784958"/>
+                <a:off x="2183525" y="1086752"/>
                 <a:ext cx="552669" cy="346249"/>
               </a:xfrm>
               <a:prstGeom prst="rect">
@@ -8438,7 +8606,7 @@
               <a:blipFill>
                 <a:blip r:embed="rId6"/>
                 <a:stretch>
-                  <a:fillRect r="-3571"/>
+                  <a:fillRect r="-3704"/>
                 </a:stretch>
               </a:blipFill>
             </p:spPr>
@@ -8471,7 +8639,7 @@
         </p:nvSpPr>
         <p:spPr>
           <a:xfrm>
-            <a:off x="990601" y="2200298"/>
+            <a:off x="2133601" y="2502092"/>
             <a:ext cx="1300826" cy="212449"/>
           </a:xfrm>
           <a:prstGeom prst="rect">
@@ -8527,7 +8695,7 @@
         </p:nvSpPr>
         <p:spPr>
           <a:xfrm>
-            <a:off x="990601" y="3036487"/>
+            <a:off x="2133601" y="3338281"/>
             <a:ext cx="1300827" cy="212449"/>
           </a:xfrm>
           <a:prstGeom prst="rect">
@@ -8583,14 +8751,14 @@
         </p:nvSpPr>
         <p:spPr>
           <a:xfrm>
-            <a:off x="990600" y="3940430"/>
+            <a:off x="2133600" y="4242224"/>
             <a:ext cx="2371347" cy="212449"/>
           </a:xfrm>
           <a:prstGeom prst="rect">
             <a:avLst/>
           </a:prstGeom>
           <a:solidFill>
-            <a:schemeClr val="accent2"/>
+            <a:srgbClr val="000000"/>
           </a:solidFill>
           <a:ln>
             <a:noFill/>
@@ -8639,7 +8807,7 @@
         </p:nvSpPr>
         <p:spPr>
           <a:xfrm>
-            <a:off x="2883814" y="3039449"/>
+            <a:off x="4026814" y="3341243"/>
             <a:ext cx="189412" cy="212449"/>
           </a:xfrm>
           <a:prstGeom prst="rect">
@@ -8691,7 +8859,7 @@
         </p:nvSpPr>
         <p:spPr>
           <a:xfrm>
-            <a:off x="3172535" y="3039449"/>
+            <a:off x="4315535" y="3341243"/>
             <a:ext cx="189412" cy="212449"/>
           </a:xfrm>
           <a:prstGeom prst="rect">
@@ -8743,7 +8911,7 @@
         </p:nvSpPr>
         <p:spPr>
           <a:xfrm>
-            <a:off x="2883814" y="2200298"/>
+            <a:off x="4026814" y="2502092"/>
             <a:ext cx="189412" cy="212449"/>
           </a:xfrm>
           <a:prstGeom prst="rect">
@@ -8795,7 +8963,7 @@
         </p:nvSpPr>
         <p:spPr>
           <a:xfrm>
-            <a:off x="3172535" y="2200298"/>
+            <a:off x="4315535" y="2502092"/>
             <a:ext cx="189412" cy="212449"/>
           </a:xfrm>
           <a:prstGeom prst="rect">
@@ -8847,7 +9015,7 @@
         </p:nvSpPr>
         <p:spPr>
           <a:xfrm>
-            <a:off x="2082550" y="1255174"/>
+            <a:off x="3225550" y="1556968"/>
             <a:ext cx="139972" cy="212449"/>
           </a:xfrm>
           <a:prstGeom prst="rect">
@@ -8896,7 +9064,7 @@
         </p:nvSpPr>
         <p:spPr>
           <a:xfrm>
-            <a:off x="990600" y="425385"/>
+            <a:off x="2133600" y="727179"/>
             <a:ext cx="763507" cy="212449"/>
           </a:xfrm>
           <a:prstGeom prst="rect">
@@ -8949,7 +9117,7 @@
         </p:nvSpPr>
         <p:spPr>
           <a:xfrm>
-            <a:off x="2299374" y="1254254"/>
+            <a:off x="3442374" y="1556048"/>
             <a:ext cx="139972" cy="212449"/>
           </a:xfrm>
           <a:prstGeom prst="rect">
@@ -8998,7 +9166,7 @@
         </p:nvSpPr>
         <p:spPr>
           <a:xfrm>
-            <a:off x="2087046" y="415398"/>
+            <a:off x="3230046" y="717192"/>
             <a:ext cx="139972" cy="212449"/>
           </a:xfrm>
           <a:prstGeom prst="rect">
@@ -9047,7 +9215,7 @@
         </p:nvSpPr>
         <p:spPr>
           <a:xfrm>
-            <a:off x="2303870" y="414479"/>
+            <a:off x="3446870" y="716273"/>
             <a:ext cx="139972" cy="212449"/>
           </a:xfrm>
           <a:prstGeom prst="rect">
@@ -9096,7 +9264,7 @@
         </p:nvSpPr>
         <p:spPr>
           <a:xfrm>
-            <a:off x="2883242" y="1244947"/>
+            <a:off x="4026242" y="1546741"/>
             <a:ext cx="68580" cy="212449"/>
           </a:xfrm>
           <a:prstGeom prst="rect">
@@ -9145,7 +9313,7 @@
         </p:nvSpPr>
         <p:spPr>
           <a:xfrm>
-            <a:off x="2885987" y="405365"/>
+            <a:off x="4028987" y="707159"/>
             <a:ext cx="68580" cy="212449"/>
           </a:xfrm>
           <a:prstGeom prst="rect">
@@ -9194,7 +9362,7 @@
         </p:nvSpPr>
         <p:spPr>
           <a:xfrm>
-            <a:off x="3284373" y="1242260"/>
+            <a:off x="4427373" y="1544054"/>
             <a:ext cx="68580" cy="212449"/>
           </a:xfrm>
           <a:prstGeom prst="rect">
@@ -9243,7 +9411,7 @@
         </p:nvSpPr>
         <p:spPr>
           <a:xfrm>
-            <a:off x="3288830" y="405365"/>
+            <a:off x="4431830" y="707159"/>
             <a:ext cx="68580" cy="212449"/>
           </a:xfrm>
           <a:prstGeom prst="rect">
@@ -9292,7 +9460,7 @@
         </p:nvSpPr>
         <p:spPr>
           <a:xfrm>
-            <a:off x="990600" y="1259257"/>
+            <a:off x="2133600" y="1561051"/>
             <a:ext cx="763507" cy="212449"/>
           </a:xfrm>
           <a:prstGeom prst="rect">
@@ -9345,7 +9513,7 @@
         </p:nvSpPr>
         <p:spPr>
           <a:xfrm>
-            <a:off x="1835130" y="286640"/>
+            <a:off x="2978130" y="483869"/>
             <a:ext cx="188929" cy="352084"/>
           </a:xfrm>
           <a:prstGeom prst="rect">
@@ -9385,7 +9553,7 @@
         </p:nvSpPr>
         <p:spPr>
           <a:xfrm>
-            <a:off x="2556081" y="288239"/>
+            <a:off x="3699081" y="485468"/>
             <a:ext cx="188929" cy="352084"/>
           </a:xfrm>
           <a:prstGeom prst="rect">
@@ -9425,7 +9593,7 @@
         </p:nvSpPr>
         <p:spPr>
           <a:xfrm>
-            <a:off x="3018476" y="285750"/>
+            <a:off x="4161476" y="482979"/>
             <a:ext cx="188929" cy="352084"/>
           </a:xfrm>
           <a:prstGeom prst="rect">
@@ -9465,7 +9633,7 @@
         </p:nvSpPr>
         <p:spPr>
           <a:xfrm>
-            <a:off x="2514600" y="2060663"/>
+            <a:off x="3657600" y="2362457"/>
             <a:ext cx="188929" cy="352084"/>
           </a:xfrm>
           <a:prstGeom prst="rect">
@@ -9504,7 +9672,7 @@
             </p:nvSpPr>
             <p:spPr>
               <a:xfrm rot="16200000">
-                <a:off x="6247928" y="2548108"/>
+                <a:off x="6599157" y="2913025"/>
                 <a:ext cx="552669" cy="346249"/>
               </a:xfrm>
               <a:prstGeom prst="rect">
@@ -9558,16 +9726,16 @@
             </p:nvSpPr>
             <p:spPr>
               <a:xfrm rot="16200000">
-                <a:off x="6247928" y="2548108"/>
+                <a:off x="6599157" y="2913025"/>
                 <a:ext cx="552669" cy="346249"/>
               </a:xfrm>
               <a:prstGeom prst="rect">
                 <a:avLst/>
               </a:prstGeom>
               <a:blipFill>
-                <a:blip r:embed="rId6"/>
+                <a:blip r:embed="rId7"/>
                 <a:stretch>
-                  <a:fillRect r="-3571"/>
+                  <a:fillRect r="-3704"/>
                 </a:stretch>
               </a:blipFill>
             </p:spPr>
@@ -9602,7 +9770,7 @@
             </p:nvSpPr>
             <p:spPr>
               <a:xfrm rot="16200000">
-                <a:off x="6247927" y="750541"/>
+                <a:off x="6599156" y="1115458"/>
                 <a:ext cx="552669" cy="346249"/>
               </a:xfrm>
               <a:prstGeom prst="rect">
@@ -9656,16 +9824,16 @@
             </p:nvSpPr>
             <p:spPr>
               <a:xfrm rot="16200000">
-                <a:off x="6247927" y="750541"/>
+                <a:off x="6599156" y="1115458"/>
                 <a:ext cx="552669" cy="346249"/>
               </a:xfrm>
               <a:prstGeom prst="rect">
                 <a:avLst/>
               </a:prstGeom>
               <a:blipFill>
-                <a:blip r:embed="rId7"/>
+                <a:blip r:embed="rId8"/>
                 <a:stretch>
-                  <a:fillRect r="-3571"/>
+                  <a:fillRect r="-3704"/>
                 </a:stretch>
               </a:blipFill>
             </p:spPr>
@@ -9700,7 +9868,7 @@
             </p:nvSpPr>
             <p:spPr>
               <a:xfrm rot="16200000">
-                <a:off x="6250972" y="1658900"/>
+                <a:off x="6602201" y="2023817"/>
                 <a:ext cx="552669" cy="346249"/>
               </a:xfrm>
               <a:prstGeom prst="rect">
@@ -9754,16 +9922,16 @@
             </p:nvSpPr>
             <p:spPr>
               <a:xfrm rot="16200000">
-                <a:off x="6250972" y="1658900"/>
+                <a:off x="6602201" y="2023817"/>
                 <a:ext cx="552669" cy="346249"/>
               </a:xfrm>
               <a:prstGeom prst="rect">
                 <a:avLst/>
               </a:prstGeom>
               <a:blipFill>
-                <a:blip r:embed="rId8"/>
+                <a:blip r:embed="rId7"/>
                 <a:stretch>
-                  <a:fillRect/>
+                  <a:fillRect r="-3704"/>
                 </a:stretch>
               </a:blipFill>
             </p:spPr>
@@ -9798,7 +9966,7 @@
             </p:nvSpPr>
             <p:spPr>
               <a:xfrm rot="16200000">
-                <a:off x="1040525" y="1658364"/>
+                <a:off x="2183525" y="1960158"/>
                 <a:ext cx="552669" cy="346249"/>
               </a:xfrm>
               <a:prstGeom prst="rect">
@@ -9852,16 +10020,16 @@
             </p:nvSpPr>
             <p:spPr>
               <a:xfrm rot="16200000">
-                <a:off x="1040525" y="1658364"/>
+                <a:off x="2183525" y="1960158"/>
                 <a:ext cx="552669" cy="346249"/>
               </a:xfrm>
               <a:prstGeom prst="rect">
                 <a:avLst/>
               </a:prstGeom>
               <a:blipFill>
-                <a:blip r:embed="rId8"/>
+                <a:blip r:embed="rId7"/>
                 <a:stretch>
-                  <a:fillRect r="-3571"/>
+                  <a:fillRect r="-3704"/>
                 </a:stretch>
               </a:blipFill>
             </p:spPr>
@@ -9896,7 +10064,7 @@
             </p:nvSpPr>
             <p:spPr>
               <a:xfrm rot="16200000">
-                <a:off x="1826939" y="3418581"/>
+                <a:off x="2969939" y="3720375"/>
                 <a:ext cx="552669" cy="346249"/>
               </a:xfrm>
               <a:prstGeom prst="rect">
@@ -9950,7 +10118,7 @@
             </p:nvSpPr>
             <p:spPr>
               <a:xfrm rot="16200000">
-                <a:off x="1826939" y="3418581"/>
+                <a:off x="2969939" y="3720375"/>
                 <a:ext cx="552669" cy="346249"/>
               </a:xfrm>
               <a:prstGeom prst="rect">
@@ -9994,7 +10162,7 @@
             </p:nvSpPr>
             <p:spPr>
               <a:xfrm rot="16200000">
-                <a:off x="6256141" y="3432251"/>
+                <a:off x="6607370" y="3797168"/>
                 <a:ext cx="552669" cy="346249"/>
               </a:xfrm>
               <a:prstGeom prst="rect">
@@ -10048,14 +10216,14 @@
             </p:nvSpPr>
             <p:spPr>
               <a:xfrm rot="16200000">
-                <a:off x="6256141" y="3432251"/>
+                <a:off x="6607370" y="3797168"/>
                 <a:ext cx="552669" cy="346249"/>
               </a:xfrm>
               <a:prstGeom prst="rect">
                 <a:avLst/>
               </a:prstGeom>
               <a:blipFill>
-                <a:blip r:embed="rId9"/>
+                <a:blip r:embed="rId10"/>
                 <a:stretch>
                   <a:fillRect r="-3571"/>
                 </a:stretch>
@@ -10092,7 +10260,7 @@
             </p:nvSpPr>
             <p:spPr>
               <a:xfrm>
-                <a:off x="4966424" y="362262"/>
+                <a:off x="5317653" y="727179"/>
                 <a:ext cx="3133229" cy="327334"/>
               </a:xfrm>
               <a:prstGeom prst="rect">
@@ -10155,11 +10323,11 @@
                                 </m:dPr>
                                 <m:e>
                                   <m:r>
-                                    <a:rPr lang="en-US" sz="1400" b="1" i="1" dirty="0" smtClean="0">
+                                    <a:rPr lang="en-US" sz="1400" b="0" i="1" dirty="0" smtClean="0">
                                       <a:latin typeface="Cambria Math" panose="02040503050406030204" pitchFamily="18" charset="0"/>
                                       <a:ea typeface="Cambria Math" panose="02040503050406030204" pitchFamily="18" charset="0"/>
                                     </a:rPr>
-                                    <m:t>𝒕𝒊𝒅</m:t>
+                                    <m:t>𝑡𝑖𝑑</m:t>
                                   </m:r>
                                   <m:r>
                                     <a:rPr lang="en-US" sz="1400" b="1" i="1" dirty="0" smtClean="0">
@@ -10248,7 +10416,7 @@
                           <m:sSub>
                             <m:sSubPr>
                               <m:ctrlPr>
-                                <a:rPr lang="en-US" sz="1400" b="0" dirty="0" smtClean="0">
+                                <a:rPr lang="en-US" sz="1400" b="0" i="1" dirty="0" smtClean="0">
                                   <a:latin typeface="Cambria Math" panose="02040503050406030204" pitchFamily="18" charset="0"/>
                                   <a:ea typeface="Cambria Math" panose="02040503050406030204" pitchFamily="18" charset="0"/>
                                 </a:rPr>
@@ -10316,16 +10484,16 @@
             </p:nvSpPr>
             <p:spPr>
               <a:xfrm>
-                <a:off x="4966424" y="362262"/>
+                <a:off x="5317653" y="727179"/>
                 <a:ext cx="3133229" cy="327334"/>
               </a:xfrm>
               <a:prstGeom prst="rect">
                 <a:avLst/>
               </a:prstGeom>
               <a:blipFill>
-                <a:blip r:embed="rId10"/>
+                <a:blip r:embed="rId11"/>
                 <a:stretch>
-                  <a:fillRect b="-3846"/>
+                  <a:fillRect b="-3704"/>
                 </a:stretch>
               </a:blipFill>
             </p:spPr>
@@ -10360,7 +10528,7 @@
             </p:nvSpPr>
             <p:spPr>
               <a:xfrm>
-                <a:off x="4473300" y="2099428"/>
+                <a:off x="4824529" y="2464345"/>
                 <a:ext cx="4113370" cy="398186"/>
               </a:xfrm>
               <a:prstGeom prst="rect">
@@ -10423,18 +10591,11 @@
                                 </m:dPr>
                                 <m:e>
                                   <m:r>
-                                    <a:rPr lang="en-US" sz="1400" b="1" i="1" dirty="0" smtClean="0">
+                                    <a:rPr lang="en-US" sz="1400" b="0" i="1" dirty="0" smtClean="0">
                                       <a:latin typeface="Cambria Math" panose="02040503050406030204" pitchFamily="18" charset="0"/>
                                       <a:ea typeface="Cambria Math" panose="02040503050406030204" pitchFamily="18" charset="0"/>
                                     </a:rPr>
-                                    <m:t>𝒄</m:t>
-                                  </m:r>
-                                  <m:r>
-                                    <a:rPr lang="en-US" sz="1400" b="1" i="1" dirty="0" smtClean="0">
-                                      <a:latin typeface="Cambria Math" panose="02040503050406030204" pitchFamily="18" charset="0"/>
-                                      <a:ea typeface="Cambria Math" panose="02040503050406030204" pitchFamily="18" charset="0"/>
-                                    </a:rPr>
-                                    <m:t>𝒊𝒅</m:t>
+                                    <m:t>𝑐𝑖𝑑</m:t>
                                   </m:r>
                                   <m:r>
                                     <a:rPr lang="en-US" sz="1400" b="1" i="1" dirty="0" smtClean="0">
@@ -10565,7 +10726,7 @@
                           <m:sSub>
                             <m:sSubPr>
                               <m:ctrlPr>
-                                <a:rPr lang="en-US" sz="1400" b="0" dirty="0" smtClean="0">
+                                <a:rPr lang="en-US" sz="1400" b="0" i="1" dirty="0" smtClean="0">
                                   <a:latin typeface="Cambria Math" panose="02040503050406030204" pitchFamily="18" charset="0"/>
                                   <a:ea typeface="Cambria Math" panose="02040503050406030204" pitchFamily="18" charset="0"/>
                                 </a:rPr>
@@ -10633,14 +10794,14 @@
             </p:nvSpPr>
             <p:spPr>
               <a:xfrm>
-                <a:off x="4473300" y="2099428"/>
+                <a:off x="4824529" y="2464345"/>
                 <a:ext cx="4113370" cy="398186"/>
               </a:xfrm>
               <a:prstGeom prst="rect">
                 <a:avLst/>
               </a:prstGeom>
               <a:blipFill>
-                <a:blip r:embed="rId11"/>
+                <a:blip r:embed="rId12"/>
                 <a:stretch>
                   <a:fillRect/>
                 </a:stretch>
@@ -10677,7 +10838,7 @@
             </p:nvSpPr>
             <p:spPr>
               <a:xfrm>
-                <a:off x="4526729" y="2943618"/>
+                <a:off x="4877958" y="3308535"/>
                 <a:ext cx="4022961" cy="398186"/>
               </a:xfrm>
               <a:prstGeom prst="rect">
@@ -10740,11 +10901,11 @@
                                 </m:dPr>
                                 <m:e>
                                   <m:r>
-                                    <a:rPr lang="en-US" sz="1400" b="1" i="1" dirty="0" smtClean="0">
+                                    <a:rPr lang="en-US" sz="1400" b="0" i="1" dirty="0" smtClean="0">
                                       <a:latin typeface="Cambria Math" panose="02040503050406030204" pitchFamily="18" charset="0"/>
                                       <a:ea typeface="Cambria Math" panose="02040503050406030204" pitchFamily="18" charset="0"/>
                                     </a:rPr>
-                                    <m:t>𝒄𝒊𝒅</m:t>
+                                    <m:t>𝑐𝑖𝑑</m:t>
                                   </m:r>
                                   <m:r>
                                     <a:rPr lang="en-US" sz="1400" b="1" i="1" dirty="0" smtClean="0">
@@ -10845,7 +11006,7 @@
                           <m:sSub>
                             <m:sSubPr>
                               <m:ctrlPr>
-                                <a:rPr lang="en-US" sz="1400" b="0" dirty="0" smtClean="0">
+                                <a:rPr lang="en-US" sz="1400" b="0" i="1" dirty="0" smtClean="0">
                                   <a:latin typeface="Cambria Math" panose="02040503050406030204" pitchFamily="18" charset="0"/>
                                   <a:ea typeface="Cambria Math" panose="02040503050406030204" pitchFamily="18" charset="0"/>
                                 </a:rPr>
@@ -10913,14 +11074,14 @@
             </p:nvSpPr>
             <p:spPr>
               <a:xfrm>
-                <a:off x="4526729" y="2943618"/>
+                <a:off x="4877958" y="3308535"/>
                 <a:ext cx="4022961" cy="398186"/>
               </a:xfrm>
               <a:prstGeom prst="rect">
                 <a:avLst/>
               </a:prstGeom>
               <a:blipFill>
-                <a:blip r:embed="rId12"/>
+                <a:blip r:embed="rId13"/>
                 <a:stretch>
                   <a:fillRect/>
                 </a:stretch>
@@ -10957,7 +11118,7 @@
             </p:nvSpPr>
             <p:spPr>
               <a:xfrm>
-                <a:off x="5032748" y="3881710"/>
+                <a:off x="5383977" y="4246627"/>
                 <a:ext cx="2994474" cy="327654"/>
               </a:xfrm>
               <a:prstGeom prst="rect">
@@ -11066,7 +11227,7 @@
                           <m:sSub>
                             <m:sSubPr>
                               <m:ctrlPr>
-                                <a:rPr lang="en-US" sz="1400" b="0" dirty="0" smtClean="0">
+                                <a:rPr lang="en-US" sz="1400" b="0" i="1" dirty="0" smtClean="0">
                                   <a:latin typeface="Cambria Math" panose="02040503050406030204" pitchFamily="18" charset="0"/>
                                   <a:ea typeface="Cambria Math" panose="02040503050406030204" pitchFamily="18" charset="0"/>
                                 </a:rPr>
@@ -11141,16 +11302,16 @@
             </p:nvSpPr>
             <p:spPr>
               <a:xfrm>
-                <a:off x="5032748" y="3881710"/>
+                <a:off x="5383977" y="4246627"/>
                 <a:ext cx="2994474" cy="327654"/>
               </a:xfrm>
               <a:prstGeom prst="rect">
                 <a:avLst/>
               </a:prstGeom>
               <a:blipFill>
-                <a:blip r:embed="rId13"/>
+                <a:blip r:embed="rId14"/>
                 <a:stretch>
-                  <a:fillRect b="-3846"/>
+                  <a:fillRect b="-3704"/>
                 </a:stretch>
               </a:blipFill>
             </p:spPr>
@@ -11183,8 +11344,8 @@
         </p:nvSpPr>
         <p:spPr>
           <a:xfrm>
-            <a:off x="3873022" y="2526938"/>
-            <a:ext cx="466794" cy="369332"/>
+            <a:off x="57408" y="2878129"/>
+            <a:ext cx="1685077" cy="369332"/>
           </a:xfrm>
           <a:prstGeom prst="rect">
             <a:avLst/>
@@ -11199,7 +11360,7 @@
           <a:p>
             <a:r>
               <a:rPr lang="en-US" dirty="0"/>
-              <a:t>(1)</a:t>
+              <a:t>(1) Section 5.1</a:t>
             </a:r>
           </a:p>
         </p:txBody>
@@ -11218,8 +11379,8 @@
         </p:nvSpPr>
         <p:spPr>
           <a:xfrm>
-            <a:off x="3873022" y="644314"/>
-            <a:ext cx="466794" cy="369332"/>
+            <a:off x="57407" y="1012248"/>
+            <a:ext cx="1685077" cy="369332"/>
           </a:xfrm>
           <a:prstGeom prst="rect">
             <a:avLst/>
@@ -11234,7 +11395,7 @@
           <a:p>
             <a:r>
               <a:rPr lang="en-US" dirty="0"/>
-              <a:t>(2)</a:t>
+              <a:t>(2) Section 5.2</a:t>
             </a:r>
           </a:p>
         </p:txBody>
@@ -11253,8 +11414,8 @@
         </p:nvSpPr>
         <p:spPr>
           <a:xfrm>
-            <a:off x="3873022" y="1585626"/>
-            <a:ext cx="466794" cy="369332"/>
+            <a:off x="57407" y="1977338"/>
+            <a:ext cx="1685077" cy="369332"/>
           </a:xfrm>
           <a:prstGeom prst="rect">
             <a:avLst/>
@@ -11269,7 +11430,7 @@
           <a:p>
             <a:r>
               <a:rPr lang="en-US" dirty="0"/>
-              <a:t>(3)</a:t>
+              <a:t>(3) Section 5.3</a:t>
             </a:r>
           </a:p>
         </p:txBody>
@@ -11288,8 +11449,8 @@
         </p:nvSpPr>
         <p:spPr>
           <a:xfrm>
-            <a:off x="3871570" y="3407039"/>
-            <a:ext cx="466794" cy="369332"/>
+            <a:off x="57406" y="3761827"/>
+            <a:ext cx="1685077" cy="369332"/>
           </a:xfrm>
           <a:prstGeom prst="rect">
             <a:avLst/>
@@ -11304,8 +11465,373 @@
           <a:p>
             <a:r>
               <a:rPr lang="en-US" dirty="0"/>
-              <a:t>(4)</a:t>
-            </a:r>
+              <a:t>(4) Section 5.4</a:t>
+            </a:r>
+          </a:p>
+        </p:txBody>
+      </p:sp>
+      <p:sp>
+        <p:nvSpPr>
+          <p:cNvPr id="56" name="Rectangle 55">
+            <a:extLst>
+              <a:ext uri="{FF2B5EF4-FFF2-40B4-BE49-F238E27FC236}">
+                <a16:creationId xmlns:a16="http://schemas.microsoft.com/office/drawing/2014/main" id="{21ED84DC-EBBD-EC4C-BDC1-73FE619FB651}"/>
+              </a:ext>
+            </a:extLst>
+          </p:cNvPr>
+          <p:cNvSpPr/>
+          <p:nvPr/>
+        </p:nvSpPr>
+        <p:spPr bwMode="auto">
+          <a:xfrm>
+            <a:off x="4802880" y="57150"/>
+            <a:ext cx="45719" cy="5082187"/>
+          </a:xfrm>
+          <a:prstGeom prst="rect">
+            <a:avLst/>
+          </a:prstGeom>
+          <a:solidFill>
+            <a:schemeClr val="accent1"/>
+          </a:solidFill>
+          <a:ln w="9525" cap="flat" cmpd="sng" algn="ctr">
+            <a:solidFill>
+              <a:schemeClr val="tx1"/>
+            </a:solidFill>
+            <a:prstDash val="solid"/>
+            <a:round/>
+            <a:headEnd type="none" w="med" len="med"/>
+            <a:tailEnd type="none" w="med" len="med"/>
+          </a:ln>
+          <a:effectLst/>
+          <a:extLst>
+            <a:ext uri="{AF507438-7753-43e0-B8FC-AC1667EBCBE1}">
+              <a14:hiddenEffects xmlns:a14="http://schemas.microsoft.com/office/drawing/2010/main" xmlns="">
+                <a:effectLst>
+                  <a:outerShdw blurRad="63500" dist="38099" dir="2700000" algn="ctr" rotWithShape="0">
+                    <a:schemeClr val="bg2">
+                      <a:alpha val="74998"/>
+                    </a:schemeClr>
+                  </a:outerShdw>
+                </a:effectLst>
+              </a14:hiddenEffects>
+            </a:ext>
+          </a:extLst>
+        </p:spPr>
+        <p:txBody>
+          <a:bodyPr vert="horz" wrap="square" lIns="91440" tIns="45720" rIns="91440" bIns="45720" numCol="1" rtlCol="0" anchor="t" anchorCtr="0" compatLnSpc="1">
+            <a:prstTxWarp prst="textNoShape">
+              <a:avLst/>
+            </a:prstTxWarp>
+          </a:bodyPr>
+          <a:lstStyle/>
+          <a:p>
+            <a:pPr marL="0" marR="0" indent="0" algn="l" defTabSz="914400" rtl="0" eaLnBrk="1" fontAlgn="base" latinLnBrk="0" hangingPunct="1">
+              <a:lnSpc>
+                <a:spcPct val="100000"/>
+              </a:lnSpc>
+              <a:spcBef>
+                <a:spcPct val="0"/>
+              </a:spcBef>
+              <a:spcAft>
+                <a:spcPct val="0"/>
+              </a:spcAft>
+              <a:buClrTx/>
+              <a:buSzTx/>
+              <a:buFontTx/>
+              <a:buNone/>
+              <a:tabLst/>
+            </a:pPr>
+            <a:endParaRPr kumimoji="0" lang="en-US" sz="1600" b="0" i="0" u="none" strike="noStrike" cap="none" normalizeH="0" baseline="0" dirty="0">
+              <a:ln>
+                <a:noFill/>
+              </a:ln>
+              <a:solidFill>
+                <a:schemeClr val="tx1"/>
+              </a:solidFill>
+              <a:effectLst/>
+              <a:latin typeface="Arial" charset="0"/>
+              <a:ea typeface="ＭＳ Ｐゴシック" charset="0"/>
+              <a:cs typeface="Arial" charset="0"/>
+            </a:endParaRPr>
+          </a:p>
+        </p:txBody>
+      </p:sp>
+      <p:sp>
+        <p:nvSpPr>
+          <p:cNvPr id="61" name="TextBox 60">
+            <a:extLst>
+              <a:ext uri="{FF2B5EF4-FFF2-40B4-BE49-F238E27FC236}">
+                <a16:creationId xmlns:a16="http://schemas.microsoft.com/office/drawing/2014/main" id="{24D39148-0EFE-A14A-BAD6-B9F318B80B0C}"/>
+              </a:ext>
+            </a:extLst>
+          </p:cNvPr>
+          <p:cNvSpPr txBox="1"/>
+          <p:nvPr/>
+        </p:nvSpPr>
+        <p:spPr>
+          <a:xfrm>
+            <a:off x="2285739" y="78683"/>
+            <a:ext cx="2159566" cy="369332"/>
+          </a:xfrm>
+          <a:prstGeom prst="rect">
+            <a:avLst/>
+          </a:prstGeom>
+          <a:noFill/>
+        </p:spPr>
+        <p:txBody>
+          <a:bodyPr wrap="none" rtlCol="0">
+            <a:spAutoFit/>
+          </a:bodyPr>
+          <a:lstStyle/>
+          <a:p>
+            <a:r>
+              <a:rPr lang="en-US" dirty="0" err="1"/>
+              <a:t>CertiKOS</a:t>
+            </a:r>
+            <a:r>
+              <a:rPr lang="en-US" dirty="0"/>
+              <a:t> Structure</a:t>
+            </a:r>
+          </a:p>
+        </p:txBody>
+      </p:sp>
+      <p:sp>
+        <p:nvSpPr>
+          <p:cNvPr id="62" name="TextBox 61">
+            <a:extLst>
+              <a:ext uri="{FF2B5EF4-FFF2-40B4-BE49-F238E27FC236}">
+                <a16:creationId xmlns:a16="http://schemas.microsoft.com/office/drawing/2014/main" id="{147030E6-0F7D-7C48-B4E8-45B66A9933F8}"/>
+              </a:ext>
+            </a:extLst>
+          </p:cNvPr>
+          <p:cNvSpPr txBox="1"/>
+          <p:nvPr/>
+        </p:nvSpPr>
+        <p:spPr>
+          <a:xfrm>
+            <a:off x="6232081" y="78683"/>
+            <a:ext cx="1223412" cy="369332"/>
+          </a:xfrm>
+          <a:prstGeom prst="rect">
+            <a:avLst/>
+          </a:prstGeom>
+          <a:noFill/>
+        </p:spPr>
+        <p:txBody>
+          <a:bodyPr wrap="none" rtlCol="0">
+            <a:spAutoFit/>
+          </a:bodyPr>
+          <a:lstStyle/>
+          <a:p>
+            <a:r>
+              <a:rPr lang="en-US" dirty="0"/>
+              <a:t>Theorems</a:t>
+            </a:r>
+          </a:p>
+        </p:txBody>
+      </p:sp>
+      <p:sp>
+        <p:nvSpPr>
+          <p:cNvPr id="66" name="Rectangle 65">
+            <a:extLst>
+              <a:ext uri="{FF2B5EF4-FFF2-40B4-BE49-F238E27FC236}">
+                <a16:creationId xmlns:a16="http://schemas.microsoft.com/office/drawing/2014/main" id="{8280E300-A8B6-204E-B6E2-BAA515E377BB}"/>
+              </a:ext>
+            </a:extLst>
+          </p:cNvPr>
+          <p:cNvSpPr/>
+          <p:nvPr/>
+        </p:nvSpPr>
+        <p:spPr bwMode="auto">
+          <a:xfrm>
+            <a:off x="2133600" y="4830930"/>
+            <a:ext cx="879423" cy="247483"/>
+          </a:xfrm>
+          <a:prstGeom prst="rect">
+            <a:avLst/>
+          </a:prstGeom>
+          <a:solidFill>
+            <a:srgbClr val="FFFF00"/>
+          </a:solidFill>
+          <a:ln w="9525" cap="flat" cmpd="sng" algn="ctr">
+            <a:noFill/>
+            <a:prstDash val="solid"/>
+            <a:round/>
+            <a:headEnd type="none" w="med" len="med"/>
+            <a:tailEnd type="none" w="med" len="med"/>
+          </a:ln>
+          <a:effectLst/>
+          <a:extLst>
+            <a:ext uri="{AF507438-7753-43e0-B8FC-AC1667EBCBE1}">
+              <a14:hiddenEffects xmlns:a14="http://schemas.microsoft.com/office/drawing/2010/main" xmlns="">
+                <a:effectLst>
+                  <a:outerShdw blurRad="63500" dist="38099" dir="2700000" algn="ctr" rotWithShape="0">
+                    <a:schemeClr val="bg2">
+                      <a:alpha val="74998"/>
+                    </a:schemeClr>
+                  </a:outerShdw>
+                </a:effectLst>
+              </a14:hiddenEffects>
+            </a:ext>
+          </a:extLst>
+        </p:spPr>
+        <p:txBody>
+          <a:bodyPr vert="horz" wrap="square" lIns="91440" tIns="45720" rIns="91440" bIns="45720" numCol="1" rtlCol="0" anchor="t" anchorCtr="0" compatLnSpc="1">
+            <a:prstTxWarp prst="textNoShape">
+              <a:avLst/>
+            </a:prstTxWarp>
+          </a:bodyPr>
+          <a:lstStyle/>
+          <a:p>
+            <a:pPr marL="0" marR="0" indent="0" algn="l" defTabSz="914400" rtl="0" eaLnBrk="1" fontAlgn="base" latinLnBrk="0" hangingPunct="1">
+              <a:lnSpc>
+                <a:spcPct val="100000"/>
+              </a:lnSpc>
+              <a:spcBef>
+                <a:spcPct val="0"/>
+              </a:spcBef>
+              <a:spcAft>
+                <a:spcPct val="0"/>
+              </a:spcAft>
+              <a:buClrTx/>
+              <a:buSzTx/>
+              <a:buFontTx/>
+              <a:buNone/>
+              <a:tabLst/>
+            </a:pPr>
+            <a:endParaRPr kumimoji="0" lang="en-US" sz="1600" b="0" i="0" u="none" strike="noStrike" cap="none" normalizeH="0" baseline="0" dirty="0">
+              <a:ln>
+                <a:noFill/>
+              </a:ln>
+              <a:solidFill>
+                <a:schemeClr val="tx1"/>
+              </a:solidFill>
+              <a:effectLst/>
+              <a:latin typeface="Arial" charset="0"/>
+              <a:ea typeface="ＭＳ Ｐゴシック" charset="0"/>
+              <a:cs typeface="Arial" charset="0"/>
+            </a:endParaRPr>
+          </a:p>
+        </p:txBody>
+      </p:sp>
+      <p:sp>
+        <p:nvSpPr>
+          <p:cNvPr id="67" name="TextBox 66">
+            <a:extLst>
+              <a:ext uri="{FF2B5EF4-FFF2-40B4-BE49-F238E27FC236}">
+                <a16:creationId xmlns:a16="http://schemas.microsoft.com/office/drawing/2014/main" id="{1EC8C0BE-3FB0-8F40-B83F-71DEE17AC687}"/>
+              </a:ext>
+            </a:extLst>
+          </p:cNvPr>
+          <p:cNvSpPr txBox="1"/>
+          <p:nvPr/>
+        </p:nvSpPr>
+        <p:spPr>
+          <a:xfrm>
+            <a:off x="2952614" y="4770005"/>
+            <a:ext cx="1723549" cy="369332"/>
+          </a:xfrm>
+          <a:prstGeom prst="rect">
+            <a:avLst/>
+          </a:prstGeom>
+          <a:noFill/>
+        </p:spPr>
+        <p:txBody>
+          <a:bodyPr wrap="none" rtlCol="0">
+            <a:spAutoFit/>
+          </a:bodyPr>
+          <a:lstStyle/>
+          <a:p>
+            <a:r>
+              <a:rPr lang="en-US" dirty="0"/>
+              <a:t>: Environments</a:t>
+            </a:r>
+          </a:p>
+        </p:txBody>
+      </p:sp>
+      <p:sp>
+        <p:nvSpPr>
+          <p:cNvPr id="64" name="Rectangle 63">
+            <a:extLst>
+              <a:ext uri="{FF2B5EF4-FFF2-40B4-BE49-F238E27FC236}">
+                <a16:creationId xmlns:a16="http://schemas.microsoft.com/office/drawing/2014/main" id="{F4B3320D-3A39-B749-888C-345CAB42F5C1}"/>
+              </a:ext>
+            </a:extLst>
+          </p:cNvPr>
+          <p:cNvSpPr/>
+          <p:nvPr/>
+        </p:nvSpPr>
+        <p:spPr bwMode="auto">
+          <a:xfrm>
+            <a:off x="1841133" y="78683"/>
+            <a:ext cx="45719" cy="5082187"/>
+          </a:xfrm>
+          <a:prstGeom prst="rect">
+            <a:avLst/>
+          </a:prstGeom>
+          <a:solidFill>
+            <a:schemeClr val="accent1"/>
+          </a:solidFill>
+          <a:ln w="9525" cap="flat" cmpd="sng" algn="ctr">
+            <a:solidFill>
+              <a:schemeClr val="tx1"/>
+            </a:solidFill>
+            <a:prstDash val="solid"/>
+            <a:round/>
+            <a:headEnd type="none" w="med" len="med"/>
+            <a:tailEnd type="none" w="med" len="med"/>
+          </a:ln>
+          <a:effectLst/>
+          <a:extLst>
+            <a:ext uri="{AF507438-7753-43e0-B8FC-AC1667EBCBE1}">
+              <a14:hiddenEffects xmlns:a14="http://schemas.microsoft.com/office/drawing/2010/main" xmlns="">
+                <a:effectLst>
+                  <a:outerShdw blurRad="63500" dist="38099" dir="2700000" algn="ctr" rotWithShape="0">
+                    <a:schemeClr val="bg2">
+                      <a:alpha val="74998"/>
+                    </a:schemeClr>
+                  </a:outerShdw>
+                </a:effectLst>
+              </a14:hiddenEffects>
+            </a:ext>
+          </a:extLst>
+        </p:spPr>
+        <p:txBody>
+          <a:bodyPr vert="horz" wrap="square" lIns="91440" tIns="45720" rIns="91440" bIns="45720" numCol="1" rtlCol="0" anchor="t" anchorCtr="0" compatLnSpc="1">
+            <a:prstTxWarp prst="textNoShape">
+              <a:avLst/>
+            </a:prstTxWarp>
+          </a:bodyPr>
+          <a:lstStyle/>
+          <a:p>
+            <a:pPr marL="0" marR="0" indent="0" algn="l" defTabSz="914400" rtl="0" eaLnBrk="1" fontAlgn="base" latinLnBrk="0" hangingPunct="1">
+              <a:lnSpc>
+                <a:spcPct val="100000"/>
+              </a:lnSpc>
+              <a:spcBef>
+                <a:spcPct val="0"/>
+              </a:spcBef>
+              <a:spcAft>
+                <a:spcPct val="0"/>
+              </a:spcAft>
+              <a:buClrTx/>
+              <a:buSzTx/>
+              <a:buFontTx/>
+              <a:buNone/>
+              <a:tabLst/>
+            </a:pPr>
+            <a:endParaRPr kumimoji="0" lang="en-US" sz="1600" b="0" i="0" u="none" strike="noStrike" cap="none" normalizeH="0" baseline="0" dirty="0">
+              <a:ln>
+                <a:noFill/>
+              </a:ln>
+              <a:solidFill>
+                <a:schemeClr val="tx1"/>
+              </a:solidFill>
+              <a:effectLst/>
+              <a:latin typeface="Arial" charset="0"/>
+              <a:ea typeface="ＭＳ Ｐゴシック" charset="0"/>
+              <a:cs typeface="Arial" charset="0"/>
+            </a:endParaRPr>
           </a:p>
         </p:txBody>
       </p:sp>
@@ -14476,8 +15002,8 @@
           <a:chExt cx="0" cy="0"/>
         </a:xfrm>
       </p:grpSpPr>
-      <mc:AlternateContent xmlns:mc="http://schemas.openxmlformats.org/markup-compatibility/2006">
-        <mc:Choice xmlns:a14="http://schemas.microsoft.com/office/drawing/2010/main" Requires="a14">
+      <mc:AlternateContent xmlns:mc="http://schemas.openxmlformats.org/markup-compatibility/2006" xmlns:a14="http://schemas.microsoft.com/office/drawing/2010/main">
+        <mc:Choice Requires="a14">
           <p:sp>
             <p:nvSpPr>
               <p:cNvPr id="12" name="TextBox 11">
@@ -14623,7 +15149,7 @@
             </p:txBody>
           </p:sp>
         </mc:Choice>
-        <mc:Fallback>
+        <mc:Fallback xmlns="">
           <p:sp>
             <p:nvSpPr>
               <p:cNvPr id="12" name="TextBox 11">
@@ -14742,8 +15268,8 @@
           </a:p>
         </p:txBody>
       </p:sp>
-      <mc:AlternateContent xmlns:mc="http://schemas.openxmlformats.org/markup-compatibility/2006">
-        <mc:Choice xmlns:a14="http://schemas.microsoft.com/office/drawing/2010/main" Requires="a14">
+      <mc:AlternateContent xmlns:mc="http://schemas.openxmlformats.org/markup-compatibility/2006" xmlns:a14="http://schemas.microsoft.com/office/drawing/2010/main">
+        <mc:Choice Requires="a14">
           <p:sp>
             <p:nvSpPr>
               <p:cNvPr id="20" name="TextBox 19">
@@ -14795,7 +15321,7 @@
             </p:txBody>
           </p:sp>
         </mc:Choice>
-        <mc:Fallback>
+        <mc:Fallback xmlns="">
           <p:sp>
             <p:nvSpPr>
               <p:cNvPr id="20" name="TextBox 19">
@@ -15197,8 +15723,8 @@
           </a:p>
         </p:txBody>
       </p:sp>
-      <mc:AlternateContent xmlns:mc="http://schemas.openxmlformats.org/markup-compatibility/2006">
-        <mc:Choice xmlns:a14="http://schemas.microsoft.com/office/drawing/2010/main" Requires="a14">
+      <mc:AlternateContent xmlns:mc="http://schemas.openxmlformats.org/markup-compatibility/2006" xmlns:a14="http://schemas.microsoft.com/office/drawing/2010/main">
+        <mc:Choice Requires="a14">
           <p:sp>
             <p:nvSpPr>
               <p:cNvPr id="47" name="TextBox 46">
@@ -15250,7 +15776,7 @@
             </p:txBody>
           </p:sp>
         </mc:Choice>
-        <mc:Fallback>
+        <mc:Fallback xmlns="">
           <p:sp>
             <p:nvSpPr>
               <p:cNvPr id="47" name="TextBox 46">
@@ -15295,8 +15821,8 @@
           </p:sp>
         </mc:Fallback>
       </mc:AlternateContent>
-      <mc:AlternateContent xmlns:mc="http://schemas.openxmlformats.org/markup-compatibility/2006">
-        <mc:Choice xmlns:a14="http://schemas.microsoft.com/office/drawing/2010/main" Requires="a14">
+      <mc:AlternateContent xmlns:mc="http://schemas.openxmlformats.org/markup-compatibility/2006" xmlns:a14="http://schemas.microsoft.com/office/drawing/2010/main">
+        <mc:Choice Requires="a14">
           <p:sp>
             <p:nvSpPr>
               <p:cNvPr id="51" name="TextBox 50">
@@ -15378,14 +15904,7 @@
                                       <a:latin typeface="Cambria Math" panose="02040503050406030204" pitchFamily="18" charset="0"/>
                                       <a:ea typeface="Cambria Math" panose="02040503050406030204" pitchFamily="18" charset="0"/>
                                     </a:rPr>
-                                    <m:t>𝒄</m:t>
-                                  </m:r>
-                                  <m:r>
-                                    <a:rPr lang="en-US" sz="1400" b="1" i="1" dirty="0" smtClean="0">
-                                      <a:latin typeface="Cambria Math" panose="02040503050406030204" pitchFamily="18" charset="0"/>
-                                      <a:ea typeface="Cambria Math" panose="02040503050406030204" pitchFamily="18" charset="0"/>
-                                    </a:rPr>
-                                    <m:t>𝒊𝒅</m:t>
+                                    <m:t>𝒄𝒊𝒅</m:t>
                                   </m:r>
                                   <m:r>
                                     <a:rPr lang="en-US" sz="1400" b="1" i="1" dirty="0" smtClean="0">
@@ -15516,7 +16035,7 @@
                           <m:sSub>
                             <m:sSubPr>
                               <m:ctrlPr>
-                                <a:rPr lang="en-US" sz="1400" b="0" dirty="0" smtClean="0">
+                                <a:rPr lang="en-US" sz="1400" b="0" i="1" dirty="0" smtClean="0">
                                   <a:latin typeface="Cambria Math" panose="02040503050406030204" pitchFamily="18" charset="0"/>
                                   <a:ea typeface="Cambria Math" panose="02040503050406030204" pitchFamily="18" charset="0"/>
                                 </a:rPr>
@@ -15567,7 +16086,7 @@
             </p:txBody>
           </p:sp>
         </mc:Choice>
-        <mc:Fallback>
+        <mc:Fallback xmlns="">
           <p:sp>
             <p:nvSpPr>
               <p:cNvPr id="51" name="TextBox 50">
@@ -15612,8 +16131,8 @@
           </p:sp>
         </mc:Fallback>
       </mc:AlternateContent>
-      <mc:AlternateContent xmlns:mc="http://schemas.openxmlformats.org/markup-compatibility/2006">
-        <mc:Choice xmlns:a14="http://schemas.microsoft.com/office/drawing/2010/main" Requires="a14">
+      <mc:AlternateContent xmlns:mc="http://schemas.openxmlformats.org/markup-compatibility/2006" xmlns:a14="http://schemas.microsoft.com/office/drawing/2010/main">
+        <mc:Choice Requires="a14">
           <p:sp>
             <p:nvSpPr>
               <p:cNvPr id="52" name="TextBox 51">
@@ -15796,7 +16315,7 @@
                           <m:sSub>
                             <m:sSubPr>
                               <m:ctrlPr>
-                                <a:rPr lang="en-US" sz="1400" b="0" dirty="0" smtClean="0">
+                                <a:rPr lang="en-US" sz="1400" b="0" i="1" dirty="0" smtClean="0">
                                   <a:latin typeface="Cambria Math" panose="02040503050406030204" pitchFamily="18" charset="0"/>
                                   <a:ea typeface="Cambria Math" panose="02040503050406030204" pitchFamily="18" charset="0"/>
                                 </a:rPr>
@@ -15847,7 +16366,7 @@
             </p:txBody>
           </p:sp>
         </mc:Choice>
-        <mc:Fallback>
+        <mc:Fallback xmlns="">
           <p:sp>
             <p:nvSpPr>
               <p:cNvPr id="52" name="TextBox 51">
@@ -16119,8 +16638,8 @@
           <a:chExt cx="0" cy="0"/>
         </a:xfrm>
       </p:grpSpPr>
-      <mc:AlternateContent xmlns:mc="http://schemas.openxmlformats.org/markup-compatibility/2006">
-        <mc:Choice xmlns:a14="http://schemas.microsoft.com/office/drawing/2010/main" Requires="a14">
+      <mc:AlternateContent xmlns:mc="http://schemas.openxmlformats.org/markup-compatibility/2006" xmlns:a14="http://schemas.microsoft.com/office/drawing/2010/main">
+        <mc:Choice Requires="a14">
           <p:sp>
             <p:nvSpPr>
               <p:cNvPr id="6" name="TextBox 5">
@@ -16324,7 +16843,7 @@
                           <m:sSub>
                             <m:sSubPr>
                               <m:ctrlPr>
-                                <a:rPr lang="en-US" sz="1400" b="0" dirty="0" smtClean="0">
+                                <a:rPr lang="en-US" sz="1400" b="0" i="1" dirty="0" smtClean="0">
                                   <a:latin typeface="Cambria Math" panose="02040503050406030204" pitchFamily="18" charset="0"/>
                                   <a:ea typeface="Cambria Math" panose="02040503050406030204" pitchFamily="18" charset="0"/>
                                 </a:rPr>
@@ -16375,7 +16894,7 @@
             </p:txBody>
           </p:sp>
         </mc:Choice>
-        <mc:Fallback>
+        <mc:Fallback xmlns="">
           <p:sp>
             <p:nvSpPr>
               <p:cNvPr id="6" name="TextBox 5">
@@ -16420,8 +16939,8 @@
           </p:sp>
         </mc:Fallback>
       </mc:AlternateContent>
-      <mc:AlternateContent xmlns:mc="http://schemas.openxmlformats.org/markup-compatibility/2006">
-        <mc:Choice xmlns:a14="http://schemas.microsoft.com/office/drawing/2010/main" Requires="a14">
+      <mc:AlternateContent xmlns:mc="http://schemas.openxmlformats.org/markup-compatibility/2006" xmlns:a14="http://schemas.microsoft.com/office/drawing/2010/main">
+        <mc:Choice Requires="a14">
           <p:sp>
             <p:nvSpPr>
               <p:cNvPr id="12" name="TextBox 11">
@@ -16567,7 +17086,7 @@
             </p:txBody>
           </p:sp>
         </mc:Choice>
-        <mc:Fallback>
+        <mc:Fallback xmlns="">
           <p:sp>
             <p:nvSpPr>
               <p:cNvPr id="12" name="TextBox 11">
@@ -16846,8 +17365,8 @@
           </a:p>
         </p:txBody>
       </p:sp>
-      <mc:AlternateContent xmlns:mc="http://schemas.openxmlformats.org/markup-compatibility/2006">
-        <mc:Choice xmlns:a14="http://schemas.microsoft.com/office/drawing/2010/main" Requires="a14">
+      <mc:AlternateContent xmlns:mc="http://schemas.openxmlformats.org/markup-compatibility/2006" xmlns:a14="http://schemas.microsoft.com/office/drawing/2010/main">
+        <mc:Choice Requires="a14">
           <p:sp>
             <p:nvSpPr>
               <p:cNvPr id="20" name="TextBox 19">
@@ -16899,7 +17418,7 @@
             </p:txBody>
           </p:sp>
         </mc:Choice>
-        <mc:Fallback>
+        <mc:Fallback xmlns="">
           <p:sp>
             <p:nvSpPr>
               <p:cNvPr id="20" name="TextBox 19">
@@ -16944,8 +17463,8 @@
           </p:sp>
         </mc:Fallback>
       </mc:AlternateContent>
-      <mc:AlternateContent xmlns:mc="http://schemas.openxmlformats.org/markup-compatibility/2006">
-        <mc:Choice xmlns:a14="http://schemas.microsoft.com/office/drawing/2010/main" Requires="a14">
+      <mc:AlternateContent xmlns:mc="http://schemas.openxmlformats.org/markup-compatibility/2006" xmlns:a14="http://schemas.microsoft.com/office/drawing/2010/main">
+        <mc:Choice Requires="a14">
           <p:sp>
             <p:nvSpPr>
               <p:cNvPr id="21" name="TextBox 20">
@@ -16997,7 +17516,7 @@
             </p:txBody>
           </p:sp>
         </mc:Choice>
-        <mc:Fallback>
+        <mc:Fallback xmlns="">
           <p:sp>
             <p:nvSpPr>
               <p:cNvPr id="21" name="TextBox 20">
@@ -18017,8 +18536,8 @@
           </a:p>
         </p:txBody>
       </p:sp>
-      <mc:AlternateContent xmlns:mc="http://schemas.openxmlformats.org/markup-compatibility/2006">
-        <mc:Choice xmlns:a14="http://schemas.microsoft.com/office/drawing/2010/main" Requires="a14">
+      <mc:AlternateContent xmlns:mc="http://schemas.openxmlformats.org/markup-compatibility/2006" xmlns:a14="http://schemas.microsoft.com/office/drawing/2010/main">
+        <mc:Choice Requires="a14">
           <p:sp>
             <p:nvSpPr>
               <p:cNvPr id="47" name="TextBox 46">
@@ -18070,7 +18589,7 @@
             </p:txBody>
           </p:sp>
         </mc:Choice>
-        <mc:Fallback>
+        <mc:Fallback xmlns="">
           <p:sp>
             <p:nvSpPr>
               <p:cNvPr id="47" name="TextBox 46">
@@ -18115,8 +18634,8 @@
           </p:sp>
         </mc:Fallback>
       </mc:AlternateContent>
-      <mc:AlternateContent xmlns:mc="http://schemas.openxmlformats.org/markup-compatibility/2006">
-        <mc:Choice xmlns:a14="http://schemas.microsoft.com/office/drawing/2010/main" Requires="a14">
+      <mc:AlternateContent xmlns:mc="http://schemas.openxmlformats.org/markup-compatibility/2006" xmlns:a14="http://schemas.microsoft.com/office/drawing/2010/main">
+        <mc:Choice Requires="a14">
           <p:sp>
             <p:nvSpPr>
               <p:cNvPr id="48" name="TextBox 47">
@@ -18168,7 +18687,7 @@
             </p:txBody>
           </p:sp>
         </mc:Choice>
-        <mc:Fallback>
+        <mc:Fallback xmlns="">
           <p:sp>
             <p:nvSpPr>
               <p:cNvPr id="48" name="TextBox 47">
@@ -18213,8 +18732,8 @@
           </p:sp>
         </mc:Fallback>
       </mc:AlternateContent>
-      <mc:AlternateContent xmlns:mc="http://schemas.openxmlformats.org/markup-compatibility/2006">
-        <mc:Choice xmlns:a14="http://schemas.microsoft.com/office/drawing/2010/main" Requires="a14">
+      <mc:AlternateContent xmlns:mc="http://schemas.openxmlformats.org/markup-compatibility/2006" xmlns:a14="http://schemas.microsoft.com/office/drawing/2010/main">
+        <mc:Choice Requires="a14">
           <p:sp>
             <p:nvSpPr>
               <p:cNvPr id="50" name="TextBox 49">
@@ -18385,7 +18904,7 @@
                           <m:sSub>
                             <m:sSubPr>
                               <m:ctrlPr>
-                                <a:rPr lang="en-US" sz="1400" b="0" dirty="0" smtClean="0">
+                                <a:rPr lang="en-US" sz="1400" b="0" i="1" dirty="0" smtClean="0">
                                   <a:latin typeface="Cambria Math" panose="02040503050406030204" pitchFamily="18" charset="0"/>
                                   <a:ea typeface="Cambria Math" panose="02040503050406030204" pitchFamily="18" charset="0"/>
                                 </a:rPr>
@@ -18436,7 +18955,7 @@
             </p:txBody>
           </p:sp>
         </mc:Choice>
-        <mc:Fallback>
+        <mc:Fallback xmlns="">
           <p:sp>
             <p:nvSpPr>
               <p:cNvPr id="50" name="TextBox 49">
@@ -18481,8 +19000,8 @@
           </p:sp>
         </mc:Fallback>
       </mc:AlternateContent>
-      <mc:AlternateContent xmlns:mc="http://schemas.openxmlformats.org/markup-compatibility/2006">
-        <mc:Choice xmlns:a14="http://schemas.microsoft.com/office/drawing/2010/main" Requires="a14">
+      <mc:AlternateContent xmlns:mc="http://schemas.openxmlformats.org/markup-compatibility/2006" xmlns:a14="http://schemas.microsoft.com/office/drawing/2010/main">
+        <mc:Choice Requires="a14">
           <p:sp>
             <p:nvSpPr>
               <p:cNvPr id="51" name="TextBox 50">
@@ -18564,14 +19083,7 @@
                                       <a:latin typeface="Cambria Math" panose="02040503050406030204" pitchFamily="18" charset="0"/>
                                       <a:ea typeface="Cambria Math" panose="02040503050406030204" pitchFamily="18" charset="0"/>
                                     </a:rPr>
-                                    <m:t>𝒄</m:t>
-                                  </m:r>
-                                  <m:r>
-                                    <a:rPr lang="en-US" sz="1400" b="1" i="1" dirty="0" smtClean="0">
-                                      <a:latin typeface="Cambria Math" panose="02040503050406030204" pitchFamily="18" charset="0"/>
-                                      <a:ea typeface="Cambria Math" panose="02040503050406030204" pitchFamily="18" charset="0"/>
-                                    </a:rPr>
-                                    <m:t>𝒊𝒅</m:t>
+                                    <m:t>𝒄𝒊𝒅</m:t>
                                   </m:r>
                                   <m:r>
                                     <a:rPr lang="en-US" sz="1400" b="1" i="1" dirty="0" smtClean="0">
@@ -18702,7 +19214,7 @@
                           <m:sSub>
                             <m:sSubPr>
                               <m:ctrlPr>
-                                <a:rPr lang="en-US" sz="1400" b="0" dirty="0" smtClean="0">
+                                <a:rPr lang="en-US" sz="1400" b="0" i="1" dirty="0" smtClean="0">
                                   <a:latin typeface="Cambria Math" panose="02040503050406030204" pitchFamily="18" charset="0"/>
                                   <a:ea typeface="Cambria Math" panose="02040503050406030204" pitchFamily="18" charset="0"/>
                                 </a:rPr>
@@ -18753,7 +19265,7 @@
             </p:txBody>
           </p:sp>
         </mc:Choice>
-        <mc:Fallback>
+        <mc:Fallback xmlns="">
           <p:sp>
             <p:nvSpPr>
               <p:cNvPr id="51" name="TextBox 50">
@@ -18798,8 +19310,8 @@
           </p:sp>
         </mc:Fallback>
       </mc:AlternateContent>
-      <mc:AlternateContent xmlns:mc="http://schemas.openxmlformats.org/markup-compatibility/2006">
-        <mc:Choice xmlns:a14="http://schemas.microsoft.com/office/drawing/2010/main" Requires="a14">
+      <mc:AlternateContent xmlns:mc="http://schemas.openxmlformats.org/markup-compatibility/2006" xmlns:a14="http://schemas.microsoft.com/office/drawing/2010/main">
+        <mc:Choice Requires="a14">
           <p:sp>
             <p:nvSpPr>
               <p:cNvPr id="52" name="TextBox 51">
@@ -18982,7 +19494,7 @@
                           <m:sSub>
                             <m:sSubPr>
                               <m:ctrlPr>
-                                <a:rPr lang="en-US" sz="1400" b="0" dirty="0" smtClean="0">
+                                <a:rPr lang="en-US" sz="1400" b="0" i="1" dirty="0" smtClean="0">
                                   <a:latin typeface="Cambria Math" panose="02040503050406030204" pitchFamily="18" charset="0"/>
                                   <a:ea typeface="Cambria Math" panose="02040503050406030204" pitchFamily="18" charset="0"/>
                                 </a:rPr>
@@ -19033,7 +19545,7 @@
             </p:txBody>
           </p:sp>
         </mc:Choice>
-        <mc:Fallback>
+        <mc:Fallback xmlns="">
           <p:sp>
             <p:nvSpPr>
               <p:cNvPr id="52" name="TextBox 51">
@@ -19394,8 +19906,8 @@
           <a:chExt cx="0" cy="0"/>
         </a:xfrm>
       </p:grpSpPr>
-      <mc:AlternateContent xmlns:mc="http://schemas.openxmlformats.org/markup-compatibility/2006">
-        <mc:Choice xmlns:a14="http://schemas.microsoft.com/office/drawing/2010/main" Requires="a14">
+      <mc:AlternateContent xmlns:mc="http://schemas.openxmlformats.org/markup-compatibility/2006" xmlns:a14="http://schemas.microsoft.com/office/drawing/2010/main">
+        <mc:Choice Requires="a14">
           <p:sp>
             <p:nvSpPr>
               <p:cNvPr id="6" name="TextBox 5">
@@ -19599,7 +20111,7 @@
                           <m:sSub>
                             <m:sSubPr>
                               <m:ctrlPr>
-                                <a:rPr lang="en-US" sz="1400" b="0" dirty="0" smtClean="0">
+                                <a:rPr lang="en-US" sz="1400" b="0" i="1" dirty="0" smtClean="0">
                                   <a:latin typeface="Cambria Math" panose="02040503050406030204" pitchFamily="18" charset="0"/>
                                   <a:ea typeface="Cambria Math" panose="02040503050406030204" pitchFamily="18" charset="0"/>
                                 </a:rPr>
@@ -19650,7 +20162,7 @@
             </p:txBody>
           </p:sp>
         </mc:Choice>
-        <mc:Fallback>
+        <mc:Fallback xmlns="">
           <p:sp>
             <p:nvSpPr>
               <p:cNvPr id="6" name="TextBox 5">
@@ -19695,8 +20207,8 @@
           </p:sp>
         </mc:Fallback>
       </mc:AlternateContent>
-      <mc:AlternateContent xmlns:mc="http://schemas.openxmlformats.org/markup-compatibility/2006">
-        <mc:Choice xmlns:a14="http://schemas.microsoft.com/office/drawing/2010/main" Requires="a14">
+      <mc:AlternateContent xmlns:mc="http://schemas.openxmlformats.org/markup-compatibility/2006" xmlns:a14="http://schemas.microsoft.com/office/drawing/2010/main">
+        <mc:Choice Requires="a14">
           <p:sp>
             <p:nvSpPr>
               <p:cNvPr id="12" name="TextBox 11">
@@ -19842,7 +20354,7 @@
             </p:txBody>
           </p:sp>
         </mc:Choice>
-        <mc:Fallback>
+        <mc:Fallback xmlns="">
           <p:sp>
             <p:nvSpPr>
               <p:cNvPr id="12" name="TextBox 11">
@@ -20121,8 +20633,8 @@
           </a:p>
         </p:txBody>
       </p:sp>
-      <mc:AlternateContent xmlns:mc="http://schemas.openxmlformats.org/markup-compatibility/2006">
-        <mc:Choice xmlns:a14="http://schemas.microsoft.com/office/drawing/2010/main" Requires="a14">
+      <mc:AlternateContent xmlns:mc="http://schemas.openxmlformats.org/markup-compatibility/2006" xmlns:a14="http://schemas.microsoft.com/office/drawing/2010/main">
+        <mc:Choice Requires="a14">
           <p:sp>
             <p:nvSpPr>
               <p:cNvPr id="20" name="TextBox 19">
@@ -20174,7 +20686,7 @@
             </p:txBody>
           </p:sp>
         </mc:Choice>
-        <mc:Fallback>
+        <mc:Fallback xmlns="">
           <p:sp>
             <p:nvSpPr>
               <p:cNvPr id="20" name="TextBox 19">
@@ -20219,8 +20731,8 @@
           </p:sp>
         </mc:Fallback>
       </mc:AlternateContent>
-      <mc:AlternateContent xmlns:mc="http://schemas.openxmlformats.org/markup-compatibility/2006">
-        <mc:Choice xmlns:a14="http://schemas.microsoft.com/office/drawing/2010/main" Requires="a14">
+      <mc:AlternateContent xmlns:mc="http://schemas.openxmlformats.org/markup-compatibility/2006" xmlns:a14="http://schemas.microsoft.com/office/drawing/2010/main">
+        <mc:Choice Requires="a14">
           <p:sp>
             <p:nvSpPr>
               <p:cNvPr id="21" name="TextBox 20">
@@ -20272,7 +20784,7 @@
             </p:txBody>
           </p:sp>
         </mc:Choice>
-        <mc:Fallback>
+        <mc:Fallback xmlns="">
           <p:sp>
             <p:nvSpPr>
               <p:cNvPr id="21" name="TextBox 20">
@@ -21292,8 +21804,8 @@
           </a:p>
         </p:txBody>
       </p:sp>
-      <mc:AlternateContent xmlns:mc="http://schemas.openxmlformats.org/markup-compatibility/2006">
-        <mc:Choice xmlns:a14="http://schemas.microsoft.com/office/drawing/2010/main" Requires="a14">
+      <mc:AlternateContent xmlns:mc="http://schemas.openxmlformats.org/markup-compatibility/2006" xmlns:a14="http://schemas.microsoft.com/office/drawing/2010/main">
+        <mc:Choice Requires="a14">
           <p:sp>
             <p:nvSpPr>
               <p:cNvPr id="47" name="TextBox 46">
@@ -21345,7 +21857,7 @@
             </p:txBody>
           </p:sp>
         </mc:Choice>
-        <mc:Fallback>
+        <mc:Fallback xmlns="">
           <p:sp>
             <p:nvSpPr>
               <p:cNvPr id="47" name="TextBox 46">
@@ -21390,8 +21902,8 @@
           </p:sp>
         </mc:Fallback>
       </mc:AlternateContent>
-      <mc:AlternateContent xmlns:mc="http://schemas.openxmlformats.org/markup-compatibility/2006">
-        <mc:Choice xmlns:a14="http://schemas.microsoft.com/office/drawing/2010/main" Requires="a14">
+      <mc:AlternateContent xmlns:mc="http://schemas.openxmlformats.org/markup-compatibility/2006" xmlns:a14="http://schemas.microsoft.com/office/drawing/2010/main">
+        <mc:Choice Requires="a14">
           <p:sp>
             <p:nvSpPr>
               <p:cNvPr id="48" name="TextBox 47">
@@ -21443,7 +21955,7 @@
             </p:txBody>
           </p:sp>
         </mc:Choice>
-        <mc:Fallback>
+        <mc:Fallback xmlns="">
           <p:sp>
             <p:nvSpPr>
               <p:cNvPr id="48" name="TextBox 47">
@@ -21488,8 +22000,8 @@
           </p:sp>
         </mc:Fallback>
       </mc:AlternateContent>
-      <mc:AlternateContent xmlns:mc="http://schemas.openxmlformats.org/markup-compatibility/2006">
-        <mc:Choice xmlns:a14="http://schemas.microsoft.com/office/drawing/2010/main" Requires="a14">
+      <mc:AlternateContent xmlns:mc="http://schemas.openxmlformats.org/markup-compatibility/2006" xmlns:a14="http://schemas.microsoft.com/office/drawing/2010/main">
+        <mc:Choice Requires="a14">
           <p:sp>
             <p:nvSpPr>
               <p:cNvPr id="53" name="TextBox 52">
@@ -21541,7 +22053,7 @@
             </p:txBody>
           </p:sp>
         </mc:Choice>
-        <mc:Fallback>
+        <mc:Fallback xmlns="">
           <p:sp>
             <p:nvSpPr>
               <p:cNvPr id="53" name="TextBox 52">
@@ -21586,8 +22098,8 @@
           </p:sp>
         </mc:Fallback>
       </mc:AlternateContent>
-      <mc:AlternateContent xmlns:mc="http://schemas.openxmlformats.org/markup-compatibility/2006">
-        <mc:Choice xmlns:a14="http://schemas.microsoft.com/office/drawing/2010/main" Requires="a14">
+      <mc:AlternateContent xmlns:mc="http://schemas.openxmlformats.org/markup-compatibility/2006" xmlns:a14="http://schemas.microsoft.com/office/drawing/2010/main">
+        <mc:Choice Requires="a14">
           <p:sp>
             <p:nvSpPr>
               <p:cNvPr id="54" name="TextBox 53">
@@ -21639,7 +22151,7 @@
             </p:txBody>
           </p:sp>
         </mc:Choice>
-        <mc:Fallback>
+        <mc:Fallback xmlns="">
           <p:sp>
             <p:nvSpPr>
               <p:cNvPr id="54" name="TextBox 53">
@@ -21684,8 +22196,8 @@
           </p:sp>
         </mc:Fallback>
       </mc:AlternateContent>
-      <mc:AlternateContent xmlns:mc="http://schemas.openxmlformats.org/markup-compatibility/2006">
-        <mc:Choice xmlns:a14="http://schemas.microsoft.com/office/drawing/2010/main" Requires="a14">
+      <mc:AlternateContent xmlns:mc="http://schemas.openxmlformats.org/markup-compatibility/2006" xmlns:a14="http://schemas.microsoft.com/office/drawing/2010/main">
+        <mc:Choice Requires="a14">
           <p:sp>
             <p:nvSpPr>
               <p:cNvPr id="50" name="TextBox 49">
@@ -21856,7 +22368,7 @@
                           <m:sSub>
                             <m:sSubPr>
                               <m:ctrlPr>
-                                <a:rPr lang="en-US" sz="1400" b="0" dirty="0" smtClean="0">
+                                <a:rPr lang="en-US" sz="1400" b="0" i="1" dirty="0" smtClean="0">
                                   <a:latin typeface="Cambria Math" panose="02040503050406030204" pitchFamily="18" charset="0"/>
                                   <a:ea typeface="Cambria Math" panose="02040503050406030204" pitchFamily="18" charset="0"/>
                                 </a:rPr>
@@ -21907,7 +22419,7 @@
             </p:txBody>
           </p:sp>
         </mc:Choice>
-        <mc:Fallback>
+        <mc:Fallback xmlns="">
           <p:sp>
             <p:nvSpPr>
               <p:cNvPr id="50" name="TextBox 49">
@@ -21952,8 +22464,8 @@
           </p:sp>
         </mc:Fallback>
       </mc:AlternateContent>
-      <mc:AlternateContent xmlns:mc="http://schemas.openxmlformats.org/markup-compatibility/2006">
-        <mc:Choice xmlns:a14="http://schemas.microsoft.com/office/drawing/2010/main" Requires="a14">
+      <mc:AlternateContent xmlns:mc="http://schemas.openxmlformats.org/markup-compatibility/2006" xmlns:a14="http://schemas.microsoft.com/office/drawing/2010/main">
+        <mc:Choice Requires="a14">
           <p:sp>
             <p:nvSpPr>
               <p:cNvPr id="51" name="TextBox 50">
@@ -22035,14 +22547,7 @@
                                       <a:latin typeface="Cambria Math" panose="02040503050406030204" pitchFamily="18" charset="0"/>
                                       <a:ea typeface="Cambria Math" panose="02040503050406030204" pitchFamily="18" charset="0"/>
                                     </a:rPr>
-                                    <m:t>𝒄</m:t>
-                                  </m:r>
-                                  <m:r>
-                                    <a:rPr lang="en-US" sz="1400" b="1" i="1" dirty="0" smtClean="0">
-                                      <a:latin typeface="Cambria Math" panose="02040503050406030204" pitchFamily="18" charset="0"/>
-                                      <a:ea typeface="Cambria Math" panose="02040503050406030204" pitchFamily="18" charset="0"/>
-                                    </a:rPr>
-                                    <m:t>𝒊𝒅</m:t>
+                                    <m:t>𝒄𝒊𝒅</m:t>
                                   </m:r>
                                   <m:r>
                                     <a:rPr lang="en-US" sz="1400" b="1" i="1" dirty="0" smtClean="0">
@@ -22173,7 +22678,7 @@
                           <m:sSub>
                             <m:sSubPr>
                               <m:ctrlPr>
-                                <a:rPr lang="en-US" sz="1400" b="0" dirty="0" smtClean="0">
+                                <a:rPr lang="en-US" sz="1400" b="0" i="1" dirty="0" smtClean="0">
                                   <a:latin typeface="Cambria Math" panose="02040503050406030204" pitchFamily="18" charset="0"/>
                                   <a:ea typeface="Cambria Math" panose="02040503050406030204" pitchFamily="18" charset="0"/>
                                 </a:rPr>
@@ -22224,7 +22729,7 @@
             </p:txBody>
           </p:sp>
         </mc:Choice>
-        <mc:Fallback>
+        <mc:Fallback xmlns="">
           <p:sp>
             <p:nvSpPr>
               <p:cNvPr id="51" name="TextBox 50">
@@ -22269,8 +22774,8 @@
           </p:sp>
         </mc:Fallback>
       </mc:AlternateContent>
-      <mc:AlternateContent xmlns:mc="http://schemas.openxmlformats.org/markup-compatibility/2006">
-        <mc:Choice xmlns:a14="http://schemas.microsoft.com/office/drawing/2010/main" Requires="a14">
+      <mc:AlternateContent xmlns:mc="http://schemas.openxmlformats.org/markup-compatibility/2006" xmlns:a14="http://schemas.microsoft.com/office/drawing/2010/main">
+        <mc:Choice Requires="a14">
           <p:sp>
             <p:nvSpPr>
               <p:cNvPr id="52" name="TextBox 51">
@@ -22453,7 +22958,7 @@
                           <m:sSub>
                             <m:sSubPr>
                               <m:ctrlPr>
-                                <a:rPr lang="en-US" sz="1400" b="0" dirty="0" smtClean="0">
+                                <a:rPr lang="en-US" sz="1400" b="0" i="1" dirty="0" smtClean="0">
                                   <a:latin typeface="Cambria Math" panose="02040503050406030204" pitchFamily="18" charset="0"/>
                                   <a:ea typeface="Cambria Math" panose="02040503050406030204" pitchFamily="18" charset="0"/>
                                 </a:rPr>
@@ -22504,7 +23009,7 @@
             </p:txBody>
           </p:sp>
         </mc:Choice>
-        <mc:Fallback>
+        <mc:Fallback xmlns="">
           <p:sp>
             <p:nvSpPr>
               <p:cNvPr id="52" name="TextBox 51">
@@ -22684,8 +23189,8 @@
           <a:chExt cx="0" cy="0"/>
         </a:xfrm>
       </p:grpSpPr>
-      <mc:AlternateContent xmlns:mc="http://schemas.openxmlformats.org/markup-compatibility/2006">
-        <mc:Choice xmlns:a14="http://schemas.microsoft.com/office/drawing/2010/main" Requires="a14">
+      <mc:AlternateContent xmlns:mc="http://schemas.openxmlformats.org/markup-compatibility/2006" xmlns:a14="http://schemas.microsoft.com/office/drawing/2010/main">
+        <mc:Choice Requires="a14">
           <p:sp>
             <p:nvSpPr>
               <p:cNvPr id="6" name="TextBox 5">
@@ -22889,7 +23394,7 @@
                           <m:sSub>
                             <m:sSubPr>
                               <m:ctrlPr>
-                                <a:rPr lang="en-US" sz="1400" b="0" dirty="0" smtClean="0">
+                                <a:rPr lang="en-US" sz="1400" b="0" i="1" dirty="0" smtClean="0">
                                   <a:latin typeface="Cambria Math" panose="02040503050406030204" pitchFamily="18" charset="0"/>
                                   <a:ea typeface="Cambria Math" panose="02040503050406030204" pitchFamily="18" charset="0"/>
                                 </a:rPr>
@@ -22940,7 +23445,7 @@
             </p:txBody>
           </p:sp>
         </mc:Choice>
-        <mc:Fallback>
+        <mc:Fallback xmlns="">
           <p:sp>
             <p:nvSpPr>
               <p:cNvPr id="6" name="TextBox 5">
@@ -22985,8 +23490,8 @@
           </p:sp>
         </mc:Fallback>
       </mc:AlternateContent>
-      <mc:AlternateContent xmlns:mc="http://schemas.openxmlformats.org/markup-compatibility/2006">
-        <mc:Choice xmlns:a14="http://schemas.microsoft.com/office/drawing/2010/main" Requires="a14">
+      <mc:AlternateContent xmlns:mc="http://schemas.openxmlformats.org/markup-compatibility/2006" xmlns:a14="http://schemas.microsoft.com/office/drawing/2010/main">
+        <mc:Choice Requires="a14">
           <p:sp>
             <p:nvSpPr>
               <p:cNvPr id="12" name="TextBox 11">
@@ -23132,7 +23637,7 @@
             </p:txBody>
           </p:sp>
         </mc:Choice>
-        <mc:Fallback>
+        <mc:Fallback xmlns="">
           <p:sp>
             <p:nvSpPr>
               <p:cNvPr id="12" name="TextBox 11">
@@ -23411,8 +23916,8 @@
           </a:p>
         </p:txBody>
       </p:sp>
-      <mc:AlternateContent xmlns:mc="http://schemas.openxmlformats.org/markup-compatibility/2006">
-        <mc:Choice xmlns:a14="http://schemas.microsoft.com/office/drawing/2010/main" Requires="a14">
+      <mc:AlternateContent xmlns:mc="http://schemas.openxmlformats.org/markup-compatibility/2006" xmlns:a14="http://schemas.microsoft.com/office/drawing/2010/main">
+        <mc:Choice Requires="a14">
           <p:sp>
             <p:nvSpPr>
               <p:cNvPr id="20" name="TextBox 19">
@@ -23464,7 +23969,7 @@
             </p:txBody>
           </p:sp>
         </mc:Choice>
-        <mc:Fallback>
+        <mc:Fallback xmlns="">
           <p:sp>
             <p:nvSpPr>
               <p:cNvPr id="20" name="TextBox 19">
@@ -23509,8 +24014,8 @@
           </p:sp>
         </mc:Fallback>
       </mc:AlternateContent>
-      <mc:AlternateContent xmlns:mc="http://schemas.openxmlformats.org/markup-compatibility/2006">
-        <mc:Choice xmlns:a14="http://schemas.microsoft.com/office/drawing/2010/main" Requires="a14">
+      <mc:AlternateContent xmlns:mc="http://schemas.openxmlformats.org/markup-compatibility/2006" xmlns:a14="http://schemas.microsoft.com/office/drawing/2010/main">
+        <mc:Choice Requires="a14">
           <p:sp>
             <p:nvSpPr>
               <p:cNvPr id="21" name="TextBox 20">
@@ -23562,7 +24067,7 @@
             </p:txBody>
           </p:sp>
         </mc:Choice>
-        <mc:Fallback>
+        <mc:Fallback xmlns="">
           <p:sp>
             <p:nvSpPr>
               <p:cNvPr id="21" name="TextBox 20">
@@ -24638,8 +25143,8 @@
           </a:p>
         </p:txBody>
       </p:sp>
-      <mc:AlternateContent xmlns:mc="http://schemas.openxmlformats.org/markup-compatibility/2006">
-        <mc:Choice xmlns:a14="http://schemas.microsoft.com/office/drawing/2010/main" Requires="a14">
+      <mc:AlternateContent xmlns:mc="http://schemas.openxmlformats.org/markup-compatibility/2006" xmlns:a14="http://schemas.microsoft.com/office/drawing/2010/main">
+        <mc:Choice Requires="a14">
           <p:sp>
             <p:nvSpPr>
               <p:cNvPr id="47" name="TextBox 46">
@@ -24691,7 +25196,7 @@
             </p:txBody>
           </p:sp>
         </mc:Choice>
-        <mc:Fallback>
+        <mc:Fallback xmlns="">
           <p:sp>
             <p:nvSpPr>
               <p:cNvPr id="47" name="TextBox 46">
@@ -24736,8 +25241,8 @@
           </p:sp>
         </mc:Fallback>
       </mc:AlternateContent>
-      <mc:AlternateContent xmlns:mc="http://schemas.openxmlformats.org/markup-compatibility/2006">
-        <mc:Choice xmlns:a14="http://schemas.microsoft.com/office/drawing/2010/main" Requires="a14">
+      <mc:AlternateContent xmlns:mc="http://schemas.openxmlformats.org/markup-compatibility/2006" xmlns:a14="http://schemas.microsoft.com/office/drawing/2010/main">
+        <mc:Choice Requires="a14">
           <p:sp>
             <p:nvSpPr>
               <p:cNvPr id="48" name="TextBox 47">
@@ -24789,7 +25294,7 @@
             </p:txBody>
           </p:sp>
         </mc:Choice>
-        <mc:Fallback>
+        <mc:Fallback xmlns="">
           <p:sp>
             <p:nvSpPr>
               <p:cNvPr id="48" name="TextBox 47">
@@ -24834,8 +25339,8 @@
           </p:sp>
         </mc:Fallback>
       </mc:AlternateContent>
-      <mc:AlternateContent xmlns:mc="http://schemas.openxmlformats.org/markup-compatibility/2006">
-        <mc:Choice xmlns:a14="http://schemas.microsoft.com/office/drawing/2010/main" Requires="a14">
+      <mc:AlternateContent xmlns:mc="http://schemas.openxmlformats.org/markup-compatibility/2006" xmlns:a14="http://schemas.microsoft.com/office/drawing/2010/main">
+        <mc:Choice Requires="a14">
           <p:sp>
             <p:nvSpPr>
               <p:cNvPr id="53" name="TextBox 52">
@@ -24887,7 +25392,7 @@
             </p:txBody>
           </p:sp>
         </mc:Choice>
-        <mc:Fallback>
+        <mc:Fallback xmlns="">
           <p:sp>
             <p:nvSpPr>
               <p:cNvPr id="53" name="TextBox 52">
@@ -24932,8 +25437,8 @@
           </p:sp>
         </mc:Fallback>
       </mc:AlternateContent>
-      <mc:AlternateContent xmlns:mc="http://schemas.openxmlformats.org/markup-compatibility/2006">
-        <mc:Choice xmlns:a14="http://schemas.microsoft.com/office/drawing/2010/main" Requires="a14">
+      <mc:AlternateContent xmlns:mc="http://schemas.openxmlformats.org/markup-compatibility/2006" xmlns:a14="http://schemas.microsoft.com/office/drawing/2010/main">
+        <mc:Choice Requires="a14">
           <p:sp>
             <p:nvSpPr>
               <p:cNvPr id="54" name="TextBox 53">
@@ -24985,7 +25490,7 @@
             </p:txBody>
           </p:sp>
         </mc:Choice>
-        <mc:Fallback>
+        <mc:Fallback xmlns="">
           <p:sp>
             <p:nvSpPr>
               <p:cNvPr id="54" name="TextBox 53">
@@ -25030,8 +25535,8 @@
           </p:sp>
         </mc:Fallback>
       </mc:AlternateContent>
-      <mc:AlternateContent xmlns:mc="http://schemas.openxmlformats.org/markup-compatibility/2006">
-        <mc:Choice xmlns:a14="http://schemas.microsoft.com/office/drawing/2010/main" Requires="a14">
+      <mc:AlternateContent xmlns:mc="http://schemas.openxmlformats.org/markup-compatibility/2006" xmlns:a14="http://schemas.microsoft.com/office/drawing/2010/main">
+        <mc:Choice Requires="a14">
           <p:sp>
             <p:nvSpPr>
               <p:cNvPr id="55" name="TextBox 54">
@@ -25083,7 +25588,7 @@
             </p:txBody>
           </p:sp>
         </mc:Choice>
-        <mc:Fallback>
+        <mc:Fallback xmlns="">
           <p:sp>
             <p:nvSpPr>
               <p:cNvPr id="55" name="TextBox 54">
@@ -25128,8 +25633,8 @@
           </p:sp>
         </mc:Fallback>
       </mc:AlternateContent>
-      <mc:AlternateContent xmlns:mc="http://schemas.openxmlformats.org/markup-compatibility/2006">
-        <mc:Choice xmlns:a14="http://schemas.microsoft.com/office/drawing/2010/main" Requires="a14">
+      <mc:AlternateContent xmlns:mc="http://schemas.openxmlformats.org/markup-compatibility/2006" xmlns:a14="http://schemas.microsoft.com/office/drawing/2010/main">
+        <mc:Choice Requires="a14">
           <p:sp>
             <p:nvSpPr>
               <p:cNvPr id="63" name="TextBox 62">
@@ -25181,7 +25686,7 @@
             </p:txBody>
           </p:sp>
         </mc:Choice>
-        <mc:Fallback>
+        <mc:Fallback xmlns="">
           <p:sp>
             <p:nvSpPr>
               <p:cNvPr id="63" name="TextBox 62">
@@ -25226,8 +25731,8 @@
           </p:sp>
         </mc:Fallback>
       </mc:AlternateContent>
-      <mc:AlternateContent xmlns:mc="http://schemas.openxmlformats.org/markup-compatibility/2006">
-        <mc:Choice xmlns:a14="http://schemas.microsoft.com/office/drawing/2010/main" Requires="a14">
+      <mc:AlternateContent xmlns:mc="http://schemas.openxmlformats.org/markup-compatibility/2006" xmlns:a14="http://schemas.microsoft.com/office/drawing/2010/main">
+        <mc:Choice Requires="a14">
           <p:sp>
             <p:nvSpPr>
               <p:cNvPr id="50" name="TextBox 49">
@@ -25398,7 +25903,7 @@
                           <m:sSub>
                             <m:sSubPr>
                               <m:ctrlPr>
-                                <a:rPr lang="en-US" sz="1400" b="0" dirty="0" smtClean="0">
+                                <a:rPr lang="en-US" sz="1400" b="0" i="1" dirty="0" smtClean="0">
                                   <a:latin typeface="Cambria Math" panose="02040503050406030204" pitchFamily="18" charset="0"/>
                                   <a:ea typeface="Cambria Math" panose="02040503050406030204" pitchFamily="18" charset="0"/>
                                 </a:rPr>
@@ -25449,7 +25954,7 @@
             </p:txBody>
           </p:sp>
         </mc:Choice>
-        <mc:Fallback>
+        <mc:Fallback xmlns="">
           <p:sp>
             <p:nvSpPr>
               <p:cNvPr id="50" name="TextBox 49">
@@ -25494,8 +25999,8 @@
           </p:sp>
         </mc:Fallback>
       </mc:AlternateContent>
-      <mc:AlternateContent xmlns:mc="http://schemas.openxmlformats.org/markup-compatibility/2006">
-        <mc:Choice xmlns:a14="http://schemas.microsoft.com/office/drawing/2010/main" Requires="a14">
+      <mc:AlternateContent xmlns:mc="http://schemas.openxmlformats.org/markup-compatibility/2006" xmlns:a14="http://schemas.microsoft.com/office/drawing/2010/main">
+        <mc:Choice Requires="a14">
           <p:sp>
             <p:nvSpPr>
               <p:cNvPr id="51" name="TextBox 50">
@@ -25577,14 +26082,7 @@
                                       <a:latin typeface="Cambria Math" panose="02040503050406030204" pitchFamily="18" charset="0"/>
                                       <a:ea typeface="Cambria Math" panose="02040503050406030204" pitchFamily="18" charset="0"/>
                                     </a:rPr>
-                                    <m:t>𝒄</m:t>
-                                  </m:r>
-                                  <m:r>
-                                    <a:rPr lang="en-US" sz="1400" b="1" i="1" dirty="0" smtClean="0">
-                                      <a:latin typeface="Cambria Math" panose="02040503050406030204" pitchFamily="18" charset="0"/>
-                                      <a:ea typeface="Cambria Math" panose="02040503050406030204" pitchFamily="18" charset="0"/>
-                                    </a:rPr>
-                                    <m:t>𝒊𝒅</m:t>
+                                    <m:t>𝒄𝒊𝒅</m:t>
                                   </m:r>
                                   <m:r>
                                     <a:rPr lang="en-US" sz="1400" b="1" i="1" dirty="0" smtClean="0">
@@ -25715,7 +26213,7 @@
                           <m:sSub>
                             <m:sSubPr>
                               <m:ctrlPr>
-                                <a:rPr lang="en-US" sz="1400" b="0" dirty="0" smtClean="0">
+                                <a:rPr lang="en-US" sz="1400" b="0" i="1" dirty="0" smtClean="0">
                                   <a:latin typeface="Cambria Math" panose="02040503050406030204" pitchFamily="18" charset="0"/>
                                   <a:ea typeface="Cambria Math" panose="02040503050406030204" pitchFamily="18" charset="0"/>
                                 </a:rPr>
@@ -25766,7 +26264,7 @@
             </p:txBody>
           </p:sp>
         </mc:Choice>
-        <mc:Fallback>
+        <mc:Fallback xmlns="">
           <p:sp>
             <p:nvSpPr>
               <p:cNvPr id="51" name="TextBox 50">
@@ -25811,8 +26309,8 @@
           </p:sp>
         </mc:Fallback>
       </mc:AlternateContent>
-      <mc:AlternateContent xmlns:mc="http://schemas.openxmlformats.org/markup-compatibility/2006">
-        <mc:Choice xmlns:a14="http://schemas.microsoft.com/office/drawing/2010/main" Requires="a14">
+      <mc:AlternateContent xmlns:mc="http://schemas.openxmlformats.org/markup-compatibility/2006" xmlns:a14="http://schemas.microsoft.com/office/drawing/2010/main">
+        <mc:Choice Requires="a14">
           <p:sp>
             <p:nvSpPr>
               <p:cNvPr id="52" name="TextBox 51">
@@ -25995,7 +26493,7 @@
                           <m:sSub>
                             <m:sSubPr>
                               <m:ctrlPr>
-                                <a:rPr lang="en-US" sz="1400" b="0" dirty="0" smtClean="0">
+                                <a:rPr lang="en-US" sz="1400" b="0" i="1" dirty="0" smtClean="0">
                                   <a:latin typeface="Cambria Math" panose="02040503050406030204" pitchFamily="18" charset="0"/>
                                   <a:ea typeface="Cambria Math" panose="02040503050406030204" pitchFamily="18" charset="0"/>
                                 </a:rPr>
@@ -26046,7 +26544,7 @@
             </p:txBody>
           </p:sp>
         </mc:Choice>
-        <mc:Fallback>
+        <mc:Fallback xmlns="">
           <p:sp>
             <p:nvSpPr>
               <p:cNvPr id="52" name="TextBox 51">
@@ -26091,8 +26589,8 @@
           </p:sp>
         </mc:Fallback>
       </mc:AlternateContent>
-      <mc:AlternateContent xmlns:mc="http://schemas.openxmlformats.org/markup-compatibility/2006">
-        <mc:Choice xmlns:a14="http://schemas.microsoft.com/office/drawing/2010/main" Requires="a14">
+      <mc:AlternateContent xmlns:mc="http://schemas.openxmlformats.org/markup-compatibility/2006" xmlns:a14="http://schemas.microsoft.com/office/drawing/2010/main">
+        <mc:Choice Requires="a14">
           <p:sp>
             <p:nvSpPr>
               <p:cNvPr id="57" name="TextBox 56">
@@ -26216,7 +26714,7 @@
                           <m:sSub>
                             <m:sSubPr>
                               <m:ctrlPr>
-                                <a:rPr lang="en-US" sz="1400" b="0" dirty="0" smtClean="0">
+                                <a:rPr lang="en-US" sz="1400" b="0" i="1" dirty="0" smtClean="0">
                                   <a:latin typeface="Cambria Math" panose="02040503050406030204" pitchFamily="18" charset="0"/>
                                   <a:ea typeface="Cambria Math" panose="02040503050406030204" pitchFamily="18" charset="0"/>
                                 </a:rPr>
@@ -26274,7 +26772,7 @@
             </p:txBody>
           </p:sp>
         </mc:Choice>
-        <mc:Fallback>
+        <mc:Fallback xmlns="">
           <p:sp>
             <p:nvSpPr>
               <p:cNvPr id="57" name="TextBox 56">
@@ -26489,8 +26987,8 @@
           <a:chExt cx="0" cy="0"/>
         </a:xfrm>
       </p:grpSpPr>
-      <mc:AlternateContent xmlns:mc="http://schemas.openxmlformats.org/markup-compatibility/2006">
-        <mc:Choice xmlns:a14="http://schemas.microsoft.com/office/drawing/2010/main" Requires="a14">
+      <mc:AlternateContent xmlns:mc="http://schemas.openxmlformats.org/markup-compatibility/2006" xmlns:a14="http://schemas.microsoft.com/office/drawing/2010/main">
+        <mc:Choice Requires="a14">
           <p:sp>
             <p:nvSpPr>
               <p:cNvPr id="6" name="TextBox 5">
@@ -26694,7 +27192,7 @@
                           <m:sSub>
                             <m:sSubPr>
                               <m:ctrlPr>
-                                <a:rPr lang="en-US" sz="1400" b="0" dirty="0" smtClean="0">
+                                <a:rPr lang="en-US" sz="1400" b="0" i="1" dirty="0" smtClean="0">
                                   <a:latin typeface="Cambria Math" panose="02040503050406030204" pitchFamily="18" charset="0"/>
                                   <a:ea typeface="Cambria Math" panose="02040503050406030204" pitchFamily="18" charset="0"/>
                                 </a:rPr>
@@ -26745,7 +27243,7 @@
             </p:txBody>
           </p:sp>
         </mc:Choice>
-        <mc:Fallback>
+        <mc:Fallback xmlns="">
           <p:sp>
             <p:nvSpPr>
               <p:cNvPr id="6" name="TextBox 5">
@@ -26790,8 +27288,8 @@
           </p:sp>
         </mc:Fallback>
       </mc:AlternateContent>
-      <mc:AlternateContent xmlns:mc="http://schemas.openxmlformats.org/markup-compatibility/2006">
-        <mc:Choice xmlns:a14="http://schemas.microsoft.com/office/drawing/2010/main" Requires="a14">
+      <mc:AlternateContent xmlns:mc="http://schemas.openxmlformats.org/markup-compatibility/2006" xmlns:a14="http://schemas.microsoft.com/office/drawing/2010/main">
+        <mc:Choice Requires="a14">
           <p:sp>
             <p:nvSpPr>
               <p:cNvPr id="12" name="TextBox 11">
@@ -26937,7 +27435,7 @@
             </p:txBody>
           </p:sp>
         </mc:Choice>
-        <mc:Fallback>
+        <mc:Fallback xmlns="">
           <p:sp>
             <p:nvSpPr>
               <p:cNvPr id="12" name="TextBox 11">
@@ -27216,8 +27714,8 @@
           </a:p>
         </p:txBody>
       </p:sp>
-      <mc:AlternateContent xmlns:mc="http://schemas.openxmlformats.org/markup-compatibility/2006">
-        <mc:Choice xmlns:a14="http://schemas.microsoft.com/office/drawing/2010/main" Requires="a14">
+      <mc:AlternateContent xmlns:mc="http://schemas.openxmlformats.org/markup-compatibility/2006" xmlns:a14="http://schemas.microsoft.com/office/drawing/2010/main">
+        <mc:Choice Requires="a14">
           <p:sp>
             <p:nvSpPr>
               <p:cNvPr id="20" name="TextBox 19">
@@ -27269,7 +27767,7 @@
             </p:txBody>
           </p:sp>
         </mc:Choice>
-        <mc:Fallback>
+        <mc:Fallback xmlns="">
           <p:sp>
             <p:nvSpPr>
               <p:cNvPr id="20" name="TextBox 19">
@@ -27314,8 +27812,8 @@
           </p:sp>
         </mc:Fallback>
       </mc:AlternateContent>
-      <mc:AlternateContent xmlns:mc="http://schemas.openxmlformats.org/markup-compatibility/2006">
-        <mc:Choice xmlns:a14="http://schemas.microsoft.com/office/drawing/2010/main" Requires="a14">
+      <mc:AlternateContent xmlns:mc="http://schemas.openxmlformats.org/markup-compatibility/2006" xmlns:a14="http://schemas.microsoft.com/office/drawing/2010/main">
+        <mc:Choice Requires="a14">
           <p:sp>
             <p:nvSpPr>
               <p:cNvPr id="21" name="TextBox 20">
@@ -27367,7 +27865,7 @@
             </p:txBody>
           </p:sp>
         </mc:Choice>
-        <mc:Fallback>
+        <mc:Fallback xmlns="">
           <p:sp>
             <p:nvSpPr>
               <p:cNvPr id="21" name="TextBox 20">
@@ -28443,8 +28941,8 @@
           </a:p>
         </p:txBody>
       </p:sp>
-      <mc:AlternateContent xmlns:mc="http://schemas.openxmlformats.org/markup-compatibility/2006">
-        <mc:Choice xmlns:a14="http://schemas.microsoft.com/office/drawing/2010/main" Requires="a14">
+      <mc:AlternateContent xmlns:mc="http://schemas.openxmlformats.org/markup-compatibility/2006" xmlns:a14="http://schemas.microsoft.com/office/drawing/2010/main">
+        <mc:Choice Requires="a14">
           <p:sp>
             <p:nvSpPr>
               <p:cNvPr id="47" name="TextBox 46">
@@ -28496,7 +28994,7 @@
             </p:txBody>
           </p:sp>
         </mc:Choice>
-        <mc:Fallback>
+        <mc:Fallback xmlns="">
           <p:sp>
             <p:nvSpPr>
               <p:cNvPr id="47" name="TextBox 46">
@@ -28541,8 +29039,8 @@
           </p:sp>
         </mc:Fallback>
       </mc:AlternateContent>
-      <mc:AlternateContent xmlns:mc="http://schemas.openxmlformats.org/markup-compatibility/2006">
-        <mc:Choice xmlns:a14="http://schemas.microsoft.com/office/drawing/2010/main" Requires="a14">
+      <mc:AlternateContent xmlns:mc="http://schemas.openxmlformats.org/markup-compatibility/2006" xmlns:a14="http://schemas.microsoft.com/office/drawing/2010/main">
+        <mc:Choice Requires="a14">
           <p:sp>
             <p:nvSpPr>
               <p:cNvPr id="48" name="TextBox 47">
@@ -28594,7 +29092,7 @@
             </p:txBody>
           </p:sp>
         </mc:Choice>
-        <mc:Fallback>
+        <mc:Fallback xmlns="">
           <p:sp>
             <p:nvSpPr>
               <p:cNvPr id="48" name="TextBox 47">
@@ -28639,8 +29137,8 @@
           </p:sp>
         </mc:Fallback>
       </mc:AlternateContent>
-      <mc:AlternateContent xmlns:mc="http://schemas.openxmlformats.org/markup-compatibility/2006">
-        <mc:Choice xmlns:a14="http://schemas.microsoft.com/office/drawing/2010/main" Requires="a14">
+      <mc:AlternateContent xmlns:mc="http://schemas.openxmlformats.org/markup-compatibility/2006" xmlns:a14="http://schemas.microsoft.com/office/drawing/2010/main">
+        <mc:Choice Requires="a14">
           <p:sp>
             <p:nvSpPr>
               <p:cNvPr id="53" name="TextBox 52">
@@ -28692,7 +29190,7 @@
             </p:txBody>
           </p:sp>
         </mc:Choice>
-        <mc:Fallback>
+        <mc:Fallback xmlns="">
           <p:sp>
             <p:nvSpPr>
               <p:cNvPr id="53" name="TextBox 52">
@@ -28737,8 +29235,8 @@
           </p:sp>
         </mc:Fallback>
       </mc:AlternateContent>
-      <mc:AlternateContent xmlns:mc="http://schemas.openxmlformats.org/markup-compatibility/2006">
-        <mc:Choice xmlns:a14="http://schemas.microsoft.com/office/drawing/2010/main" Requires="a14">
+      <mc:AlternateContent xmlns:mc="http://schemas.openxmlformats.org/markup-compatibility/2006" xmlns:a14="http://schemas.microsoft.com/office/drawing/2010/main">
+        <mc:Choice Requires="a14">
           <p:sp>
             <p:nvSpPr>
               <p:cNvPr id="54" name="TextBox 53">
@@ -28790,7 +29288,7 @@
             </p:txBody>
           </p:sp>
         </mc:Choice>
-        <mc:Fallback>
+        <mc:Fallback xmlns="">
           <p:sp>
             <p:nvSpPr>
               <p:cNvPr id="54" name="TextBox 53">
@@ -28835,8 +29333,8 @@
           </p:sp>
         </mc:Fallback>
       </mc:AlternateContent>
-      <mc:AlternateContent xmlns:mc="http://schemas.openxmlformats.org/markup-compatibility/2006">
-        <mc:Choice xmlns:a14="http://schemas.microsoft.com/office/drawing/2010/main" Requires="a14">
+      <mc:AlternateContent xmlns:mc="http://schemas.openxmlformats.org/markup-compatibility/2006" xmlns:a14="http://schemas.microsoft.com/office/drawing/2010/main">
+        <mc:Choice Requires="a14">
           <p:sp>
             <p:nvSpPr>
               <p:cNvPr id="55" name="TextBox 54">
@@ -28888,7 +29386,7 @@
             </p:txBody>
           </p:sp>
         </mc:Choice>
-        <mc:Fallback>
+        <mc:Fallback xmlns="">
           <p:sp>
             <p:nvSpPr>
               <p:cNvPr id="55" name="TextBox 54">
@@ -28933,8 +29431,8 @@
           </p:sp>
         </mc:Fallback>
       </mc:AlternateContent>
-      <mc:AlternateContent xmlns:mc="http://schemas.openxmlformats.org/markup-compatibility/2006">
-        <mc:Choice xmlns:a14="http://schemas.microsoft.com/office/drawing/2010/main" Requires="a14">
+      <mc:AlternateContent xmlns:mc="http://schemas.openxmlformats.org/markup-compatibility/2006" xmlns:a14="http://schemas.microsoft.com/office/drawing/2010/main">
+        <mc:Choice Requires="a14">
           <p:sp>
             <p:nvSpPr>
               <p:cNvPr id="63" name="TextBox 62">
@@ -28986,7 +29484,7 @@
             </p:txBody>
           </p:sp>
         </mc:Choice>
-        <mc:Fallback>
+        <mc:Fallback xmlns="">
           <p:sp>
             <p:nvSpPr>
               <p:cNvPr id="63" name="TextBox 62">
@@ -29031,8 +29529,8 @@
           </p:sp>
         </mc:Fallback>
       </mc:AlternateContent>
-      <mc:AlternateContent xmlns:mc="http://schemas.openxmlformats.org/markup-compatibility/2006">
-        <mc:Choice xmlns:a14="http://schemas.microsoft.com/office/drawing/2010/main" Requires="a14">
+      <mc:AlternateContent xmlns:mc="http://schemas.openxmlformats.org/markup-compatibility/2006" xmlns:a14="http://schemas.microsoft.com/office/drawing/2010/main">
+        <mc:Choice Requires="a14">
           <p:sp>
             <p:nvSpPr>
               <p:cNvPr id="50" name="TextBox 49">
@@ -29203,7 +29701,7 @@
                           <m:sSub>
                             <m:sSubPr>
                               <m:ctrlPr>
-                                <a:rPr lang="en-US" sz="1400" b="0" dirty="0" smtClean="0">
+                                <a:rPr lang="en-US" sz="1400" b="0" i="1" dirty="0" smtClean="0">
                                   <a:latin typeface="Cambria Math" panose="02040503050406030204" pitchFamily="18" charset="0"/>
                                   <a:ea typeface="Cambria Math" panose="02040503050406030204" pitchFamily="18" charset="0"/>
                                 </a:rPr>
@@ -29254,7 +29752,7 @@
             </p:txBody>
           </p:sp>
         </mc:Choice>
-        <mc:Fallback>
+        <mc:Fallback xmlns="">
           <p:sp>
             <p:nvSpPr>
               <p:cNvPr id="50" name="TextBox 49">
@@ -29299,8 +29797,8 @@
           </p:sp>
         </mc:Fallback>
       </mc:AlternateContent>
-      <mc:AlternateContent xmlns:mc="http://schemas.openxmlformats.org/markup-compatibility/2006">
-        <mc:Choice xmlns:a14="http://schemas.microsoft.com/office/drawing/2010/main" Requires="a14">
+      <mc:AlternateContent xmlns:mc="http://schemas.openxmlformats.org/markup-compatibility/2006" xmlns:a14="http://schemas.microsoft.com/office/drawing/2010/main">
+        <mc:Choice Requires="a14">
           <p:sp>
             <p:nvSpPr>
               <p:cNvPr id="51" name="TextBox 50">
@@ -29382,14 +29880,7 @@
                                       <a:latin typeface="Cambria Math" panose="02040503050406030204" pitchFamily="18" charset="0"/>
                                       <a:ea typeface="Cambria Math" panose="02040503050406030204" pitchFamily="18" charset="0"/>
                                     </a:rPr>
-                                    <m:t>𝒄</m:t>
-                                  </m:r>
-                                  <m:r>
-                                    <a:rPr lang="en-US" sz="1400" b="1" i="1" dirty="0" smtClean="0">
-                                      <a:latin typeface="Cambria Math" panose="02040503050406030204" pitchFamily="18" charset="0"/>
-                                      <a:ea typeface="Cambria Math" panose="02040503050406030204" pitchFamily="18" charset="0"/>
-                                    </a:rPr>
-                                    <m:t>𝒊𝒅</m:t>
+                                    <m:t>𝒄𝒊𝒅</m:t>
                                   </m:r>
                                   <m:r>
                                     <a:rPr lang="en-US" sz="1400" b="1" i="1" dirty="0" smtClean="0">
@@ -29520,7 +30011,7 @@
                           <m:sSub>
                             <m:sSubPr>
                               <m:ctrlPr>
-                                <a:rPr lang="en-US" sz="1400" b="0" dirty="0" smtClean="0">
+                                <a:rPr lang="en-US" sz="1400" b="0" i="1" dirty="0" smtClean="0">
                                   <a:latin typeface="Cambria Math" panose="02040503050406030204" pitchFamily="18" charset="0"/>
                                   <a:ea typeface="Cambria Math" panose="02040503050406030204" pitchFamily="18" charset="0"/>
                                 </a:rPr>
@@ -29571,7 +30062,7 @@
             </p:txBody>
           </p:sp>
         </mc:Choice>
-        <mc:Fallback>
+        <mc:Fallback xmlns="">
           <p:sp>
             <p:nvSpPr>
               <p:cNvPr id="51" name="TextBox 50">
@@ -29616,8 +30107,8 @@
           </p:sp>
         </mc:Fallback>
       </mc:AlternateContent>
-      <mc:AlternateContent xmlns:mc="http://schemas.openxmlformats.org/markup-compatibility/2006">
-        <mc:Choice xmlns:a14="http://schemas.microsoft.com/office/drawing/2010/main" Requires="a14">
+      <mc:AlternateContent xmlns:mc="http://schemas.openxmlformats.org/markup-compatibility/2006" xmlns:a14="http://schemas.microsoft.com/office/drawing/2010/main">
+        <mc:Choice Requires="a14">
           <p:sp>
             <p:nvSpPr>
               <p:cNvPr id="52" name="TextBox 51">
@@ -29800,7 +30291,7 @@
                           <m:sSub>
                             <m:sSubPr>
                               <m:ctrlPr>
-                                <a:rPr lang="en-US" sz="1400" b="0" dirty="0" smtClean="0">
+                                <a:rPr lang="en-US" sz="1400" b="0" i="1" dirty="0" smtClean="0">
                                   <a:latin typeface="Cambria Math" panose="02040503050406030204" pitchFamily="18" charset="0"/>
                                   <a:ea typeface="Cambria Math" panose="02040503050406030204" pitchFamily="18" charset="0"/>
                                 </a:rPr>
@@ -29851,7 +30342,7 @@
             </p:txBody>
           </p:sp>
         </mc:Choice>
-        <mc:Fallback>
+        <mc:Fallback xmlns="">
           <p:sp>
             <p:nvSpPr>
               <p:cNvPr id="52" name="TextBox 51">
@@ -29896,8 +30387,8 @@
           </p:sp>
         </mc:Fallback>
       </mc:AlternateContent>
-      <mc:AlternateContent xmlns:mc="http://schemas.openxmlformats.org/markup-compatibility/2006">
-        <mc:Choice xmlns:a14="http://schemas.microsoft.com/office/drawing/2010/main" Requires="a14">
+      <mc:AlternateContent xmlns:mc="http://schemas.openxmlformats.org/markup-compatibility/2006" xmlns:a14="http://schemas.microsoft.com/office/drawing/2010/main">
+        <mc:Choice Requires="a14">
           <p:sp>
             <p:nvSpPr>
               <p:cNvPr id="57" name="TextBox 56">
@@ -30021,7 +30512,7 @@
                           <m:sSub>
                             <m:sSubPr>
                               <m:ctrlPr>
-                                <a:rPr lang="en-US" sz="1400" b="0" dirty="0" smtClean="0">
+                                <a:rPr lang="en-US" sz="1400" b="0" i="1" dirty="0" smtClean="0">
                                   <a:latin typeface="Cambria Math" panose="02040503050406030204" pitchFamily="18" charset="0"/>
                                   <a:ea typeface="Cambria Math" panose="02040503050406030204" pitchFamily="18" charset="0"/>
                                 </a:rPr>
@@ -30079,7 +30570,7 @@
             </p:txBody>
           </p:sp>
         </mc:Choice>
-        <mc:Fallback>
+        <mc:Fallback xmlns="">
           <p:sp>
             <p:nvSpPr>
               <p:cNvPr id="57" name="TextBox 56">

</xml_diff>

<commit_message>
add more texts until env-to-env in multicore case
</commit_message>
<xml_diff>
--- a/figs/certikos/concurrent_linking.pptx
+++ b/figs/certikos/concurrent_linking.pptx
@@ -721,219 +721,7 @@
           </a:bodyPr>
           <a:lstStyle/>
           <a:p>
-            <a:r>
-              <a:rPr lang="en-US" dirty="0"/>
-              <a:t>10min until this slide!!!!!!!!! </a:t>
-            </a:r>
-          </a:p>
-          <a:p>
             <a:endParaRPr lang="en-US" dirty="0"/>
-          </a:p>
-          <a:p>
-            <a:r>
-              <a:rPr lang="en-US" dirty="0"/>
-              <a:t>Keep in mind!!! </a:t>
-            </a:r>
-          </a:p>
-          <a:p>
-            <a:endParaRPr lang="en-US" dirty="0"/>
-          </a:p>
-          <a:p>
-            <a:r>
-              <a:rPr lang="en-US" dirty="0"/>
-              <a:t>A little bit more formally, </a:t>
-            </a:r>
-          </a:p>
-          <a:p>
-            <a:endParaRPr lang="en-US" dirty="0"/>
-          </a:p>
-          <a:p>
-            <a:r>
-              <a:rPr lang="en-US" dirty="0"/>
-              <a:t>The top-level theorem for </a:t>
-            </a:r>
-            <a:r>
-              <a:rPr lang="en-US" dirty="0" err="1"/>
-              <a:t>CertiKOS</a:t>
-            </a:r>
-            <a:r>
-              <a:rPr lang="en-US" dirty="0"/>
-              <a:t> that we want to provide is as follows: </a:t>
-            </a:r>
-          </a:p>
-          <a:p>
-            <a:endParaRPr lang="en-US" dirty="0"/>
-          </a:p>
-          <a:p>
-            <a:r>
-              <a:rPr lang="en-US" dirty="0"/>
-              <a:t>The meaning is any context program </a:t>
-            </a:r>
-            <a:r>
-              <a:rPr lang="en-US" dirty="0" err="1"/>
-              <a:t>Ctxt</a:t>
-            </a:r>
-            <a:r>
-              <a:rPr lang="en-US" dirty="0"/>
-              <a:t> plus </a:t>
-            </a:r>
-            <a:r>
-              <a:rPr lang="en-US" dirty="0" err="1"/>
-              <a:t>CertiKOS</a:t>
-            </a:r>
-            <a:r>
-              <a:rPr lang="en-US" dirty="0"/>
-              <a:t> running on Boot layer with Multicore assembly machine contextually refines the program </a:t>
-            </a:r>
-            <a:r>
-              <a:rPr lang="en-US" dirty="0" err="1"/>
-              <a:t>Ctxt</a:t>
-            </a:r>
-            <a:r>
-              <a:rPr lang="en-US" dirty="0"/>
-              <a:t> running on the </a:t>
-            </a:r>
-            <a:r>
-              <a:rPr lang="en-US" dirty="0" err="1"/>
-              <a:t>Syscall</a:t>
-            </a:r>
-            <a:r>
-              <a:rPr lang="en-US" dirty="0"/>
-              <a:t> layer that uses proper environmental context for CPU ci and thread </a:t>
-            </a:r>
-            <a:r>
-              <a:rPr lang="en-US" dirty="0" err="1"/>
-              <a:t>ti</a:t>
-            </a:r>
-            <a:r>
-              <a:rPr lang="en-US" dirty="0"/>
-              <a:t> with per-thread assembly machine.</a:t>
-            </a:r>
-          </a:p>
-          <a:p>
-            <a:endParaRPr lang="en-US" dirty="0"/>
-          </a:p>
-          <a:p>
-            <a:r>
-              <a:rPr lang="en-US" dirty="0"/>
-              <a:t>To prove this theorem, </a:t>
-            </a:r>
-          </a:p>
-          <a:p>
-            <a:endParaRPr lang="en-US" dirty="0"/>
-          </a:p>
-          <a:p>
-            <a:r>
-              <a:rPr lang="en-US" dirty="0"/>
-              <a:t>The proof contains multiple sub proofs, </a:t>
-            </a:r>
-          </a:p>
-          <a:p>
-            <a:endParaRPr lang="en-US" dirty="0"/>
-          </a:p>
-          <a:p>
-            <a:r>
-              <a:rPr lang="en-US" dirty="0"/>
-              <a:t>The first </a:t>
-            </a:r>
-            <a:r>
-              <a:rPr lang="en-US" dirty="0" err="1"/>
-              <a:t>compoment</a:t>
-            </a:r>
-            <a:r>
-              <a:rPr lang="en-US" dirty="0"/>
-              <a:t> is showing that …. Per </a:t>
-            </a:r>
-            <a:r>
-              <a:rPr lang="en-US" dirty="0" err="1"/>
-              <a:t>cpu</a:t>
-            </a:r>
-            <a:r>
-              <a:rPr lang="en-US" dirty="0"/>
-              <a:t> machine model </a:t>
-            </a:r>
-          </a:p>
-          <a:p>
-            <a:endParaRPr lang="en-US" dirty="0"/>
-          </a:p>
-          <a:p>
-            <a:endParaRPr lang="en-US" dirty="0"/>
-          </a:p>
-          <a:p>
-            <a:r>
-              <a:rPr lang="en-US" dirty="0"/>
-              <a:t>Those things are multicore linking and multithreaded linking. </a:t>
-            </a:r>
-          </a:p>
-          <a:p>
-            <a:endParaRPr lang="en-US" dirty="0"/>
-          </a:p>
-          <a:p>
-            <a:endParaRPr lang="en-US" dirty="0"/>
-          </a:p>
-          <a:p>
-            <a:r>
-              <a:rPr lang="en-US" dirty="0"/>
-              <a:t>And I will explain how we prove those parts in the </a:t>
-            </a:r>
-            <a:r>
-              <a:rPr lang="en-US" dirty="0" err="1"/>
-              <a:t>remaing</a:t>
-            </a:r>
-            <a:r>
-              <a:rPr lang="en-US" dirty="0"/>
-              <a:t> talk. </a:t>
-            </a:r>
-          </a:p>
-          <a:p>
-            <a:endParaRPr lang="en-US" dirty="0"/>
-          </a:p>
-          <a:p>
-            <a:r>
-              <a:rPr lang="en-US" dirty="0"/>
-              <a:t>Due to the time limit, I will only explain a brief structure of multicore linking, but I would be </a:t>
-            </a:r>
-            <a:r>
-              <a:rPr lang="en-US" dirty="0" err="1"/>
-              <a:t>realy</a:t>
-            </a:r>
-            <a:r>
-              <a:rPr lang="en-US" dirty="0"/>
-              <a:t> happy </a:t>
-            </a:r>
-            <a:r>
-              <a:rPr lang="en-US" dirty="0" err="1"/>
-              <a:t>iif</a:t>
-            </a:r>
-            <a:r>
-              <a:rPr lang="en-US" dirty="0"/>
-              <a:t> anyone wants to  talk about details </a:t>
-            </a:r>
-            <a:r>
-              <a:rPr lang="en-US" dirty="0" err="1"/>
-              <a:t>iin</a:t>
-            </a:r>
-            <a:r>
-              <a:rPr lang="en-US" dirty="0"/>
-              <a:t> offline. </a:t>
-            </a:r>
-          </a:p>
-          <a:p>
-            <a:endParaRPr lang="en-US" dirty="0"/>
-          </a:p>
-          <a:p>
-            <a:r>
-              <a:rPr lang="en-US" dirty="0"/>
-              <a:t>And, note that all works that I will explain in here will be associated wit low level machine model, which are assembly or </a:t>
-            </a:r>
-            <a:r>
-              <a:rPr lang="en-US" dirty="0" err="1"/>
-              <a:t>sudo</a:t>
-            </a:r>
-            <a:r>
-              <a:rPr lang="en-US" dirty="0"/>
-              <a:t>-assembly machine models. </a:t>
-            </a:r>
           </a:p>
         </p:txBody>
       </p:sp>
@@ -993,125 +781,6 @@
         <p:txBody>
           <a:bodyPr/>
           <a:lstStyle/>
-          <a:p>
-            <a:r>
-              <a:rPr lang="en-US" dirty="0"/>
-              <a:t>13 minutes until this slide!!!!! </a:t>
-            </a:r>
-          </a:p>
-          <a:p>
-            <a:endParaRPr lang="en-US" dirty="0"/>
-          </a:p>
-          <a:p>
-            <a:endParaRPr lang="en-US" dirty="0"/>
-          </a:p>
-          <a:p>
-            <a:r>
-              <a:rPr lang="en-US" dirty="0"/>
-              <a:t>It is quite hard to deal with all those challenges in a single shot, so we have introduced multiple intermediate languages in between x86mc machine model and per-CPU machine model. </a:t>
-            </a:r>
-          </a:p>
-          <a:p>
-            <a:endParaRPr lang="en-US" dirty="0"/>
-          </a:p>
-          <a:p>
-            <a:r>
-              <a:rPr lang="en-US" dirty="0"/>
-              <a:t>And, we hide non-determinism by introducing hardware </a:t>
-            </a:r>
-            <a:r>
-              <a:rPr lang="en-US" dirty="0" err="1"/>
-              <a:t>schedule,r</a:t>
-            </a:r>
-            <a:r>
-              <a:rPr lang="en-US" dirty="0"/>
-              <a:t> which gives us a </a:t>
-            </a:r>
-            <a:r>
-              <a:rPr lang="en-US" dirty="0" err="1"/>
-              <a:t>envriopmentla</a:t>
-            </a:r>
-            <a:r>
-              <a:rPr lang="en-US" dirty="0"/>
-              <a:t> context for one possible execution of the program, </a:t>
-            </a:r>
-          </a:p>
-          <a:p>
-            <a:endParaRPr lang="en-US" dirty="0"/>
-          </a:p>
-          <a:p>
-            <a:r>
-              <a:rPr lang="en-US" dirty="0"/>
-              <a:t>And, we have introduced partial machine that are quantified by a subset of CPUs , and prove that p</a:t>
-            </a:r>
-          </a:p>
-          <a:p>
-            <a:endParaRPr lang="en-US" dirty="0"/>
-          </a:p>
-          <a:p>
-            <a:r>
-              <a:rPr lang="en-US" dirty="0"/>
-              <a:t>As a </a:t>
-            </a:r>
-            <a:r>
-              <a:rPr lang="en-US" dirty="0" err="1"/>
-              <a:t>netxt</a:t>
-            </a:r>
-            <a:r>
-              <a:rPr lang="en-US" dirty="0"/>
-              <a:t> step, we have </a:t>
-            </a:r>
-            <a:r>
-              <a:rPr lang="en-US" dirty="0" err="1"/>
-              <a:t>optized</a:t>
-            </a:r>
-            <a:r>
-              <a:rPr lang="en-US" dirty="0"/>
-              <a:t> </a:t>
-            </a:r>
-            <a:r>
-              <a:rPr lang="en-US" dirty="0" err="1"/>
-              <a:t>enviromentla</a:t>
-            </a:r>
-            <a:r>
-              <a:rPr lang="en-US" dirty="0"/>
-              <a:t> context, by adding , removing or reordering the events</a:t>
-            </a:r>
-          </a:p>
-          <a:p>
-            <a:r>
-              <a:rPr lang="en-US" dirty="0"/>
-              <a:t>Then, we have linked those intermediated machine </a:t>
-            </a:r>
-            <a:r>
-              <a:rPr lang="en-US" dirty="0" err="1"/>
-              <a:t>modesl</a:t>
-            </a:r>
-            <a:r>
-              <a:rPr lang="en-US" dirty="0"/>
-              <a:t> with </a:t>
-            </a:r>
-            <a:r>
-              <a:rPr lang="en-US" dirty="0" err="1"/>
-              <a:t>Lasm</a:t>
-            </a:r>
-            <a:r>
-              <a:rPr lang="en-US" dirty="0"/>
-              <a:t>, a per-CPU machine model with …. </a:t>
-            </a:r>
-          </a:p>
-          <a:p>
-            <a:endParaRPr lang="en-US" dirty="0"/>
-          </a:p>
-          <a:p>
-            <a:endParaRPr lang="en-US" dirty="0"/>
-          </a:p>
-          <a:p>
-            <a:r>
-              <a:rPr lang="en-US" dirty="0"/>
-              <a:t>I do not want to show all details, but here are the actual steps that we were done to link …. </a:t>
-            </a:r>
-          </a:p>
           <a:p>
             <a:endParaRPr lang="en-US" dirty="0"/>
           </a:p>
@@ -1174,37 +843,7 @@
           <a:bodyPr/>
           <a:lstStyle/>
           <a:p>
-            <a:r>
-              <a:rPr lang="en-US" dirty="0"/>
-              <a:t>It is also quite hard to solve them at once, so we have introduced multiple steps to resolve those challenges. </a:t>
-            </a:r>
-          </a:p>
-          <a:p>
             <a:endParaRPr lang="en-US" dirty="0"/>
-          </a:p>
-          <a:p>
-            <a:r>
-              <a:rPr lang="en-US" dirty="0"/>
-              <a:t>We first introduce multithreaded machine and prove linking theorem to show the compositionality.</a:t>
-            </a:r>
-          </a:p>
-          <a:p>
-            <a:endParaRPr lang="en-US" dirty="0"/>
-          </a:p>
-          <a:p>
-            <a:r>
-              <a:rPr lang="en-US" dirty="0"/>
-              <a:t>Then, we introduce per-thread machines and link them with compiler. </a:t>
-            </a:r>
-          </a:p>
-          <a:p>
-            <a:endParaRPr lang="en-US" dirty="0"/>
-          </a:p>
-          <a:p>
-            <a:r>
-              <a:rPr lang="en-US" dirty="0"/>
-              <a:t>I'll explain interesting parts of each steps.</a:t>
-            </a:r>
           </a:p>
         </p:txBody>
       </p:sp>
@@ -6506,7 +6145,7 @@
             </p:nvSpPr>
             <p:spPr>
               <a:xfrm>
-                <a:off x="4862310" y="4691844"/>
+                <a:off x="4964753" y="4693806"/>
                 <a:ext cx="4026359" cy="470706"/>
               </a:xfrm>
               <a:prstGeom prst="rect">
@@ -6656,7 +6295,7 @@
             </p:nvSpPr>
             <p:spPr>
               <a:xfrm>
-                <a:off x="4862310" y="4691844"/>
+                <a:off x="4964753" y="4693806"/>
                 <a:ext cx="4026359" cy="470706"/>
               </a:xfrm>
               <a:prstGeom prst="rect">
@@ -6665,7 +6304,7 @@
               <a:blipFill>
                 <a:blip r:embed="rId4"/>
                 <a:stretch>
-                  <a:fillRect b="-7692"/>
+                  <a:fillRect b="-7895"/>
                 </a:stretch>
               </a:blipFill>
             </p:spPr>
@@ -10997,7 +10636,7 @@
             </p:nvSpPr>
             <p:spPr>
               <a:xfrm>
-                <a:off x="4811386" y="4651211"/>
+                <a:off x="4613770" y="4651211"/>
                 <a:ext cx="3232231" cy="307777"/>
               </a:xfrm>
               <a:prstGeom prst="rect">
@@ -11141,7 +10780,7 @@
             </p:nvSpPr>
             <p:spPr>
               <a:xfrm>
-                <a:off x="4811386" y="4651211"/>
+                <a:off x="4613770" y="4651211"/>
                 <a:ext cx="3232231" cy="307777"/>
               </a:xfrm>
               <a:prstGeom prst="rect">
@@ -11185,7 +10824,7 @@
             </p:nvSpPr>
             <p:spPr>
               <a:xfrm rot="16200000">
-                <a:off x="6139708" y="2023737"/>
+                <a:off x="5942092" y="2023737"/>
                 <a:ext cx="552669" cy="346249"/>
               </a:xfrm>
               <a:prstGeom prst="rect">
@@ -11239,7 +10878,7 @@
             </p:nvSpPr>
             <p:spPr>
               <a:xfrm rot="16200000">
-                <a:off x="6139708" y="2023737"/>
+                <a:off x="5942092" y="2023737"/>
                 <a:ext cx="552669" cy="346249"/>
               </a:xfrm>
               <a:prstGeom prst="rect">
@@ -11248,7 +10887,7 @@
               <a:blipFill>
                 <a:blip r:embed="rId4"/>
                 <a:stretch>
-                  <a:fillRect r="-3704"/>
+                  <a:fillRect r="-3571"/>
                 </a:stretch>
               </a:blipFill>
             </p:spPr>
@@ -11283,7 +10922,7 @@
             </p:nvSpPr>
             <p:spPr>
               <a:xfrm rot="16200000">
-                <a:off x="6143916" y="4448718"/>
+                <a:off x="5946300" y="4448718"/>
                 <a:ext cx="552669" cy="346249"/>
               </a:xfrm>
               <a:prstGeom prst="rect">
@@ -11337,7 +10976,7 @@
             </p:nvSpPr>
             <p:spPr>
               <a:xfrm rot="16200000">
-                <a:off x="6143916" y="4448718"/>
+                <a:off x="5946300" y="4448718"/>
                 <a:ext cx="552669" cy="346249"/>
               </a:xfrm>
               <a:prstGeom prst="rect">
@@ -11346,7 +10985,7 @@
               <a:blipFill>
                 <a:blip r:embed="rId5"/>
                 <a:stretch>
-                  <a:fillRect r="-3704"/>
+                  <a:fillRect/>
                 </a:stretch>
               </a:blipFill>
             </p:spPr>
@@ -11381,7 +11020,7 @@
             </p:nvSpPr>
             <p:spPr>
               <a:xfrm rot="16200000">
-                <a:off x="6135752" y="2443245"/>
+                <a:off x="5938136" y="2443245"/>
                 <a:ext cx="552669" cy="346249"/>
               </a:xfrm>
               <a:prstGeom prst="rect">
@@ -11435,16 +11074,16 @@
             </p:nvSpPr>
             <p:spPr>
               <a:xfrm rot="16200000">
-                <a:off x="6135752" y="2443245"/>
+                <a:off x="5938136" y="2443245"/>
                 <a:ext cx="552669" cy="346249"/>
               </a:xfrm>
               <a:prstGeom prst="rect">
                 <a:avLst/>
               </a:prstGeom>
               <a:blipFill>
-                <a:blip r:embed="rId6"/>
+                <a:blip r:embed="rId4"/>
                 <a:stretch>
-                  <a:fillRect/>
+                  <a:fillRect r="-3571"/>
                 </a:stretch>
               </a:blipFill>
             </p:spPr>
@@ -11479,7 +11118,7 @@
             </p:nvSpPr>
             <p:spPr>
               <a:xfrm>
-                <a:off x="4341563" y="4257696"/>
+                <a:off x="4143947" y="4257696"/>
                 <a:ext cx="4148956" cy="307777"/>
               </a:xfrm>
               <a:prstGeom prst="rect">
@@ -11665,14 +11304,14 @@
             </p:nvSpPr>
             <p:spPr>
               <a:xfrm>
-                <a:off x="4341563" y="4257696"/>
+                <a:off x="4143947" y="4257696"/>
                 <a:ext cx="4148956" cy="307777"/>
               </a:xfrm>
               <a:prstGeom prst="rect">
                 <a:avLst/>
               </a:prstGeom>
               <a:blipFill>
-                <a:blip r:embed="rId7"/>
+                <a:blip r:embed="rId6"/>
                 <a:stretch>
                   <a:fillRect b="-12000"/>
                 </a:stretch>
@@ -11709,7 +11348,7 @@
             </p:nvSpPr>
             <p:spPr>
               <a:xfrm rot="16200000">
-                <a:off x="6145883" y="4058760"/>
+                <a:off x="5948267" y="4058760"/>
                 <a:ext cx="552669" cy="346249"/>
               </a:xfrm>
               <a:prstGeom prst="rect">
@@ -11763,16 +11402,16 @@
             </p:nvSpPr>
             <p:spPr>
               <a:xfrm rot="16200000">
-                <a:off x="6145883" y="4058760"/>
+                <a:off x="5948267" y="4058760"/>
                 <a:ext cx="552669" cy="346249"/>
               </a:xfrm>
               <a:prstGeom prst="rect">
                 <a:avLst/>
               </a:prstGeom>
               <a:blipFill>
-                <a:blip r:embed="rId8"/>
+                <a:blip r:embed="rId7"/>
                 <a:stretch>
-                  <a:fillRect r="-3704"/>
+                  <a:fillRect r="-3448"/>
                 </a:stretch>
               </a:blipFill>
             </p:spPr>
@@ -11807,8 +11446,8 @@
             </p:nvSpPr>
             <p:spPr>
               <a:xfrm>
-                <a:off x="3838622" y="3916655"/>
-                <a:ext cx="5171287" cy="307777"/>
+                <a:off x="3352800" y="3917758"/>
+                <a:ext cx="5718232" cy="328873"/>
               </a:xfrm>
               <a:prstGeom prst="rect">
                 <a:avLst/>
@@ -11859,6 +11498,27 @@
                               <a:ea typeface="Cambria Math" panose="02040503050406030204" pitchFamily="18" charset="0"/>
                             </a:rPr>
                             <m:t>env</m:t>
+                          </m:r>
+                          <m:r>
+                            <a:rPr lang="en-US" sz="1400" b="0" i="1" smtClean="0">
+                              <a:latin typeface="Cambria Math" panose="02040503050406030204" pitchFamily="18" charset="0"/>
+                              <a:ea typeface="Cambria Math" panose="02040503050406030204" pitchFamily="18" charset="0"/>
+                            </a:rPr>
+                            <m:t>[</m:t>
+                          </m:r>
+                          <m:r>
+                            <a:rPr lang="en-US" sz="1400" b="0" i="1" smtClean="0">
+                              <a:latin typeface="Cambria Math" panose="02040503050406030204" pitchFamily="18" charset="0"/>
+                              <a:ea typeface="Cambria Math" panose="02040503050406030204" pitchFamily="18" charset="0"/>
+                            </a:rPr>
+                            <m:t>𝐶𝑜𝑟𝑒𝑆𝑒𝑡</m:t>
+                          </m:r>
+                          <m:r>
+                            <a:rPr lang="en-US" sz="1400" b="0" i="1" smtClean="0">
+                              <a:latin typeface="Cambria Math" panose="02040503050406030204" pitchFamily="18" charset="0"/>
+                              <a:ea typeface="Cambria Math" panose="02040503050406030204" pitchFamily="18" charset="0"/>
+                            </a:rPr>
+                            <m:t>]</m:t>
                           </m:r>
                         </m:sub>
                       </m:sSub>
@@ -12056,16 +11716,16 @@
             </p:nvSpPr>
             <p:spPr>
               <a:xfrm>
-                <a:off x="3838622" y="3916655"/>
-                <a:ext cx="5171287" cy="307777"/>
+                <a:off x="3352800" y="3917758"/>
+                <a:ext cx="5718232" cy="328873"/>
               </a:xfrm>
               <a:prstGeom prst="rect">
                 <a:avLst/>
               </a:prstGeom>
               <a:blipFill>
-                <a:blip r:embed="rId9"/>
+                <a:blip r:embed="rId8"/>
                 <a:stretch>
-                  <a:fillRect b="-11538"/>
+                  <a:fillRect b="-3704"/>
                 </a:stretch>
               </a:blipFill>
             </p:spPr>
@@ -12100,8 +11760,8 @@
             </p:nvSpPr>
             <p:spPr>
               <a:xfrm>
-                <a:off x="4403601" y="3507716"/>
-                <a:ext cx="4011867" cy="307777"/>
+                <a:off x="4108235" y="3507716"/>
+                <a:ext cx="4207369" cy="328873"/>
               </a:xfrm>
               <a:prstGeom prst="rect">
                 <a:avLst/>
@@ -12152,6 +11812,27 @@
                               <a:ea typeface="Cambria Math" panose="02040503050406030204" pitchFamily="18" charset="0"/>
                             </a:rPr>
                             <m:t>env</m:t>
+                          </m:r>
+                          <m:r>
+                            <a:rPr lang="en-US" sz="1400" b="0" i="1" smtClean="0">
+                              <a:latin typeface="Cambria Math" panose="02040503050406030204" pitchFamily="18" charset="0"/>
+                              <a:ea typeface="Cambria Math" panose="02040503050406030204" pitchFamily="18" charset="0"/>
+                            </a:rPr>
+                            <m:t>[</m:t>
+                          </m:r>
+                          <m:r>
+                            <a:rPr lang="en-US" sz="1400" b="0" i="1" smtClean="0">
+                              <a:latin typeface="Cambria Math" panose="02040503050406030204" pitchFamily="18" charset="0"/>
+                              <a:ea typeface="Cambria Math" panose="02040503050406030204" pitchFamily="18" charset="0"/>
+                            </a:rPr>
+                            <m:t>𝑐𝑖𝑑</m:t>
+                          </m:r>
+                          <m:r>
+                            <a:rPr lang="en-US" sz="1400" b="0" i="1" smtClean="0">
+                              <a:latin typeface="Cambria Math" panose="02040503050406030204" pitchFamily="18" charset="0"/>
+                              <a:ea typeface="Cambria Math" panose="02040503050406030204" pitchFamily="18" charset="0"/>
+                            </a:rPr>
+                            <m:t>]</m:t>
                           </m:r>
                         </m:sub>
                       </m:sSub>
@@ -12300,16 +11981,16 @@
             </p:nvSpPr>
             <p:spPr>
               <a:xfrm>
-                <a:off x="4403601" y="3507716"/>
-                <a:ext cx="4011867" cy="307777"/>
+                <a:off x="4108235" y="3507716"/>
+                <a:ext cx="4207369" cy="328873"/>
               </a:xfrm>
               <a:prstGeom prst="rect">
                 <a:avLst/>
               </a:prstGeom>
               <a:blipFill>
-                <a:blip r:embed="rId10"/>
+                <a:blip r:embed="rId9"/>
                 <a:stretch>
-                  <a:fillRect b="-12500"/>
+                  <a:fillRect/>
                 </a:stretch>
               </a:blipFill>
             </p:spPr>
@@ -12344,7 +12025,7 @@
             </p:nvSpPr>
             <p:spPr>
               <a:xfrm>
-                <a:off x="4481686" y="3074356"/>
+                <a:off x="4284070" y="3074356"/>
                 <a:ext cx="3886385" cy="307777"/>
               </a:xfrm>
               <a:prstGeom prst="rect">
@@ -12544,14 +12225,14 @@
             </p:nvSpPr>
             <p:spPr>
               <a:xfrm>
-                <a:off x="4481686" y="3074356"/>
+                <a:off x="4284070" y="3074356"/>
                 <a:ext cx="3886385" cy="307777"/>
               </a:xfrm>
               <a:prstGeom prst="rect">
                 <a:avLst/>
               </a:prstGeom>
               <a:blipFill>
-                <a:blip r:embed="rId11"/>
+                <a:blip r:embed="rId10"/>
                 <a:stretch>
                   <a:fillRect b="-12000"/>
                 </a:stretch>
@@ -12588,7 +12269,7 @@
             </p:nvSpPr>
             <p:spPr>
               <a:xfrm>
-                <a:off x="4350666" y="2671673"/>
+                <a:off x="4153050" y="2671673"/>
                 <a:ext cx="4132092" cy="328103"/>
               </a:xfrm>
               <a:prstGeom prst="rect">
@@ -12805,14 +12486,14 @@
             </p:nvSpPr>
             <p:spPr>
               <a:xfrm>
-                <a:off x="4350666" y="2671673"/>
+                <a:off x="4153050" y="2671673"/>
                 <a:ext cx="4132092" cy="328103"/>
               </a:xfrm>
               <a:prstGeom prst="rect">
                 <a:avLst/>
               </a:prstGeom>
               <a:blipFill>
-                <a:blip r:embed="rId12"/>
+                <a:blip r:embed="rId11"/>
                 <a:stretch>
                   <a:fillRect b="-3704"/>
                 </a:stretch>
@@ -12849,7 +12530,7 @@
             </p:nvSpPr>
             <p:spPr>
               <a:xfrm>
-                <a:off x="4326752" y="2235312"/>
+                <a:off x="4129136" y="2235312"/>
                 <a:ext cx="4178580" cy="328103"/>
               </a:xfrm>
               <a:prstGeom prst="rect">
@@ -13073,14 +12754,14 @@
             </p:nvSpPr>
             <p:spPr>
               <a:xfrm>
-                <a:off x="4326752" y="2235312"/>
+                <a:off x="4129136" y="2235312"/>
                 <a:ext cx="4178580" cy="328103"/>
               </a:xfrm>
               <a:prstGeom prst="rect">
                 <a:avLst/>
               </a:prstGeom>
               <a:blipFill>
-                <a:blip r:embed="rId13"/>
+                <a:blip r:embed="rId12"/>
                 <a:stretch>
                   <a:fillRect b="-3704"/>
                 </a:stretch>
@@ -13117,7 +12798,7 @@
             </p:nvSpPr>
             <p:spPr>
               <a:xfrm>
-                <a:off x="4360445" y="1835257"/>
+                <a:off x="4162829" y="1835257"/>
                 <a:ext cx="4063164" cy="326949"/>
               </a:xfrm>
               <a:prstGeom prst="rect">
@@ -13317,14 +12998,14 @@
             </p:nvSpPr>
             <p:spPr>
               <a:xfrm>
-                <a:off x="4360445" y="1835257"/>
+                <a:off x="4162829" y="1835257"/>
                 <a:ext cx="4063164" cy="326949"/>
               </a:xfrm>
               <a:prstGeom prst="rect">
                 <a:avLst/>
               </a:prstGeom>
               <a:blipFill>
-                <a:blip r:embed="rId14"/>
+                <a:blip r:embed="rId13"/>
                 <a:stretch>
                   <a:fillRect/>
                 </a:stretch>
@@ -13361,7 +13042,7 @@
             </p:nvSpPr>
             <p:spPr>
               <a:xfrm>
-                <a:off x="4128650" y="1414264"/>
+                <a:off x="3931034" y="1414264"/>
                 <a:ext cx="4574779" cy="307777"/>
               </a:xfrm>
               <a:prstGeom prst="rect">
@@ -13561,14 +13242,14 @@
             </p:nvSpPr>
             <p:spPr>
               <a:xfrm>
-                <a:off x="4128650" y="1414264"/>
+                <a:off x="3931034" y="1414264"/>
                 <a:ext cx="4574779" cy="307777"/>
               </a:xfrm>
               <a:prstGeom prst="rect">
                 <a:avLst/>
               </a:prstGeom>
               <a:blipFill>
-                <a:blip r:embed="rId15"/>
+                <a:blip r:embed="rId14"/>
                 <a:stretch>
                   <a:fillRect b="-7692"/>
                 </a:stretch>
@@ -13605,7 +13286,7 @@
             </p:nvSpPr>
             <p:spPr>
               <a:xfrm>
-                <a:off x="4415545" y="503130"/>
+                <a:off x="4217929" y="503130"/>
                 <a:ext cx="4018664" cy="342338"/>
               </a:xfrm>
               <a:prstGeom prst="rect">
@@ -13805,14 +13486,14 @@
             </p:nvSpPr>
             <p:spPr>
               <a:xfrm>
-                <a:off x="4415545" y="503130"/>
+                <a:off x="4217929" y="503130"/>
                 <a:ext cx="4018664" cy="342338"/>
               </a:xfrm>
               <a:prstGeom prst="rect">
                 <a:avLst/>
               </a:prstGeom>
               <a:blipFill>
-                <a:blip r:embed="rId16"/>
+                <a:blip r:embed="rId15"/>
                 <a:stretch>
                   <a:fillRect b="-3571"/>
                 </a:stretch>
@@ -13849,7 +13530,7 @@
             </p:nvSpPr>
             <p:spPr>
               <a:xfrm rot="16200000">
-                <a:off x="6139708" y="3691878"/>
+                <a:off x="5942092" y="3691878"/>
                 <a:ext cx="552669" cy="346249"/>
               </a:xfrm>
               <a:prstGeom prst="rect">
@@ -13903,16 +13584,16 @@
             </p:nvSpPr>
             <p:spPr>
               <a:xfrm rot="16200000">
-                <a:off x="6139708" y="3691878"/>
+                <a:off x="5942092" y="3691878"/>
                 <a:ext cx="552669" cy="346249"/>
               </a:xfrm>
               <a:prstGeom prst="rect">
                 <a:avLst/>
               </a:prstGeom>
               <a:blipFill>
-                <a:blip r:embed="rId17"/>
+                <a:blip r:embed="rId16"/>
                 <a:stretch>
-                  <a:fillRect r="-3704"/>
+                  <a:fillRect r="-3571"/>
                 </a:stretch>
               </a:blipFill>
             </p:spPr>
@@ -13947,7 +13628,7 @@
             </p:nvSpPr>
             <p:spPr>
               <a:xfrm rot="16200000">
-                <a:off x="6139709" y="3276893"/>
+                <a:off x="5942093" y="3276893"/>
                 <a:ext cx="552669" cy="346249"/>
               </a:xfrm>
               <a:prstGeom prst="rect">
@@ -14001,16 +13682,16 @@
             </p:nvSpPr>
             <p:spPr>
               <a:xfrm rot="16200000">
-                <a:off x="6139709" y="3276893"/>
+                <a:off x="5942093" y="3276893"/>
                 <a:ext cx="552669" cy="346249"/>
               </a:xfrm>
               <a:prstGeom prst="rect">
                 <a:avLst/>
               </a:prstGeom>
               <a:blipFill>
-                <a:blip r:embed="rId18"/>
+                <a:blip r:embed="rId17"/>
                 <a:stretch>
-                  <a:fillRect r="-3704"/>
+                  <a:fillRect r="-3571"/>
                 </a:stretch>
               </a:blipFill>
             </p:spPr>
@@ -14045,7 +13726,7 @@
             </p:nvSpPr>
             <p:spPr>
               <a:xfrm rot="16200000">
-                <a:off x="6139708" y="2867188"/>
+                <a:off x="5942092" y="2867188"/>
                 <a:ext cx="552669" cy="346249"/>
               </a:xfrm>
               <a:prstGeom prst="rect">
@@ -14099,16 +13780,16 @@
             </p:nvSpPr>
             <p:spPr>
               <a:xfrm rot="16200000">
-                <a:off x="6139708" y="2867188"/>
+                <a:off x="5942092" y="2867188"/>
                 <a:ext cx="552669" cy="346249"/>
               </a:xfrm>
               <a:prstGeom prst="rect">
                 <a:avLst/>
               </a:prstGeom>
               <a:blipFill>
-                <a:blip r:embed="rId17"/>
+                <a:blip r:embed="rId16"/>
                 <a:stretch>
-                  <a:fillRect r="-3704"/>
+                  <a:fillRect r="-3571"/>
                 </a:stretch>
               </a:blipFill>
             </p:spPr>
@@ -14143,7 +13824,7 @@
             </p:nvSpPr>
             <p:spPr>
               <a:xfrm rot="16200000">
-                <a:off x="6139708" y="1628122"/>
+                <a:off x="5942092" y="1628122"/>
                 <a:ext cx="552669" cy="346249"/>
               </a:xfrm>
               <a:prstGeom prst="rect">
@@ -14197,16 +13878,16 @@
             </p:nvSpPr>
             <p:spPr>
               <a:xfrm rot="16200000">
-                <a:off x="6139708" y="1628122"/>
+                <a:off x="5942092" y="1628122"/>
                 <a:ext cx="552669" cy="346249"/>
               </a:xfrm>
               <a:prstGeom prst="rect">
                 <a:avLst/>
               </a:prstGeom>
               <a:blipFill>
-                <a:blip r:embed="rId19"/>
+                <a:blip r:embed="rId18"/>
                 <a:stretch>
-                  <a:fillRect r="-3704"/>
+                  <a:fillRect r="-3571"/>
                 </a:stretch>
               </a:blipFill>
             </p:spPr>
@@ -14241,7 +13922,7 @@
             </p:nvSpPr>
             <p:spPr>
               <a:xfrm rot="16200000">
-                <a:off x="6140322" y="723747"/>
+                <a:off x="5942706" y="723747"/>
                 <a:ext cx="552669" cy="346249"/>
               </a:xfrm>
               <a:prstGeom prst="rect">
@@ -14295,16 +13976,16 @@
             </p:nvSpPr>
             <p:spPr>
               <a:xfrm rot="16200000">
-                <a:off x="6140322" y="723747"/>
+                <a:off x="5942706" y="723747"/>
                 <a:ext cx="552669" cy="346249"/>
               </a:xfrm>
               <a:prstGeom prst="rect">
                 <a:avLst/>
               </a:prstGeom>
               <a:blipFill>
-                <a:blip r:embed="rId20"/>
+                <a:blip r:embed="rId19"/>
                 <a:stretch>
-                  <a:fillRect r="-3704"/>
+                  <a:fillRect r="-3571"/>
                 </a:stretch>
               </a:blipFill>
             </p:spPr>
@@ -14339,7 +14020,7 @@
             </p:nvSpPr>
             <p:spPr>
               <a:xfrm>
-                <a:off x="4139536" y="958312"/>
+                <a:off x="3941920" y="958312"/>
                 <a:ext cx="4574779" cy="307777"/>
               </a:xfrm>
               <a:prstGeom prst="rect">
@@ -14548,14 +14229,14 @@
             </p:nvSpPr>
             <p:spPr>
               <a:xfrm>
-                <a:off x="4139536" y="958312"/>
+                <a:off x="3941920" y="958312"/>
                 <a:ext cx="4574779" cy="307777"/>
               </a:xfrm>
               <a:prstGeom prst="rect">
                 <a:avLst/>
               </a:prstGeom>
               <a:blipFill>
-                <a:blip r:embed="rId21"/>
+                <a:blip r:embed="rId20"/>
                 <a:stretch>
                   <a:fillRect b="-3846"/>
                 </a:stretch>
@@ -14592,7 +14273,7 @@
             </p:nvSpPr>
             <p:spPr>
               <a:xfrm rot="16200000">
-                <a:off x="6133198" y="1189692"/>
+                <a:off x="5935582" y="1189692"/>
                 <a:ext cx="552669" cy="346249"/>
               </a:xfrm>
               <a:prstGeom prst="rect">
@@ -14646,16 +14327,16 @@
             </p:nvSpPr>
             <p:spPr>
               <a:xfrm rot="16200000">
-                <a:off x="6133198" y="1189692"/>
+                <a:off x="5935582" y="1189692"/>
                 <a:ext cx="552669" cy="346249"/>
               </a:xfrm>
               <a:prstGeom prst="rect">
                 <a:avLst/>
               </a:prstGeom>
               <a:blipFill>
-                <a:blip r:embed="rId22"/>
+                <a:blip r:embed="rId21"/>
                 <a:stretch>
-                  <a:fillRect r="-3571"/>
+                  <a:fillRect r="-3448"/>
                 </a:stretch>
               </a:blipFill>
             </p:spPr>
@@ -15082,7 +14763,7 @@
             </p:nvSpPr>
             <p:spPr>
               <a:xfrm>
-                <a:off x="4360020" y="28664"/>
+                <a:off x="4162404" y="28664"/>
                 <a:ext cx="4115357" cy="307777"/>
               </a:xfrm>
               <a:prstGeom prst="rect">
@@ -15282,14 +14963,14 @@
             </p:nvSpPr>
             <p:spPr>
               <a:xfrm>
-                <a:off x="4360020" y="28664"/>
+                <a:off x="4162404" y="28664"/>
                 <a:ext cx="4115357" cy="307777"/>
               </a:xfrm>
               <a:prstGeom prst="rect">
                 <a:avLst/>
               </a:prstGeom>
               <a:blipFill>
-                <a:blip r:embed="rId23"/>
+                <a:blip r:embed="rId22"/>
                 <a:stretch>
                   <a:fillRect b="-12000"/>
                 </a:stretch>
@@ -15433,7 +15114,7 @@
             </p:nvSpPr>
             <p:spPr>
               <a:xfrm rot="16200000">
-                <a:off x="6143916" y="294685"/>
+                <a:off x="5946300" y="294685"/>
                 <a:ext cx="552669" cy="346249"/>
               </a:xfrm>
               <a:prstGeom prst="rect">
@@ -15487,7 +15168,7 @@
             </p:nvSpPr>
             <p:spPr>
               <a:xfrm rot="16200000">
-                <a:off x="6143916" y="294685"/>
+                <a:off x="5946300" y="294685"/>
                 <a:ext cx="552669" cy="346249"/>
               </a:xfrm>
               <a:prstGeom prst="rect">
@@ -15496,7 +15177,7 @@
               <a:blipFill>
                 <a:blip r:embed="rId5"/>
                 <a:stretch>
-                  <a:fillRect r="-3704"/>
+                  <a:fillRect/>
                 </a:stretch>
               </a:blipFill>
             </p:spPr>
@@ -16091,7 +15772,7 @@
             </p:nvSpPr>
             <p:spPr>
               <a:xfrm>
-                <a:off x="3982340" y="3306953"/>
+                <a:off x="3838179" y="3306953"/>
                 <a:ext cx="4504375" cy="307969"/>
               </a:xfrm>
               <a:prstGeom prst="rect">
@@ -16333,7 +16014,7 @@
             </p:nvSpPr>
             <p:spPr>
               <a:xfrm>
-                <a:off x="3982340" y="3306953"/>
+                <a:off x="3838179" y="3306953"/>
                 <a:ext cx="4504375" cy="307969"/>
               </a:xfrm>
               <a:prstGeom prst="rect">
@@ -16377,7 +16058,7 @@
             </p:nvSpPr>
             <p:spPr>
               <a:xfrm>
-                <a:off x="3944540" y="596398"/>
+                <a:off x="3800379" y="596398"/>
                 <a:ext cx="4520404" cy="302840"/>
               </a:xfrm>
               <a:prstGeom prst="rect">
@@ -16610,7 +16291,7 @@
             </p:nvSpPr>
             <p:spPr>
               <a:xfrm>
-                <a:off x="3944540" y="596398"/>
+                <a:off x="3800379" y="596398"/>
                 <a:ext cx="4520404" cy="302840"/>
               </a:xfrm>
               <a:prstGeom prst="rect">
@@ -16638,1840 +16319,1962 @@
           </p:sp>
         </mc:Fallback>
       </mc:AlternateContent>
-      <p:grpSp>
-        <p:nvGrpSpPr>
-          <p:cNvPr id="49" name="Group 48">
-            <a:extLst>
-              <a:ext uri="{FF2B5EF4-FFF2-40B4-BE49-F238E27FC236}">
-                <a16:creationId xmlns:a16="http://schemas.microsoft.com/office/drawing/2014/main" id="{EB946E67-104A-3F44-88A6-C9FD53AE7F5C}"/>
-              </a:ext>
-            </a:extLst>
-          </p:cNvPr>
-          <p:cNvGrpSpPr/>
-          <p:nvPr/>
-        </p:nvGrpSpPr>
-        <p:grpSpPr>
-          <a:xfrm>
-            <a:off x="3341681" y="749664"/>
-            <a:ext cx="5726119" cy="2743490"/>
-            <a:chOff x="3901541" y="1723226"/>
-            <a:chExt cx="5726119" cy="2743490"/>
-          </a:xfrm>
-        </p:grpSpPr>
-        <mc:AlternateContent xmlns:mc="http://schemas.openxmlformats.org/markup-compatibility/2006" xmlns:a14="http://schemas.microsoft.com/office/drawing/2010/main">
-          <mc:Choice Requires="a14">
-            <p:sp>
-              <p:nvSpPr>
-                <p:cNvPr id="50" name="TextBox 49">
-                  <a:extLst>
-                    <a:ext uri="{FF2B5EF4-FFF2-40B4-BE49-F238E27FC236}">
-                      <a16:creationId xmlns:a16="http://schemas.microsoft.com/office/drawing/2014/main" id="{5E562659-E130-0F4B-9614-545D7C02C94D}"/>
-                    </a:ext>
-                  </a:extLst>
-                </p:cNvPr>
-                <p:cNvSpPr txBox="1"/>
-                <p:nvPr/>
-              </p:nvSpPr>
-              <p:spPr>
-                <a:xfrm rot="16200000">
-                  <a:off x="6529190" y="4017257"/>
-                  <a:ext cx="552669" cy="346249"/>
-                </a:xfrm>
-                <a:prstGeom prst="rect">
-                  <a:avLst/>
-                </a:prstGeom>
-                <a:noFill/>
-              </p:spPr>
-              <p:txBody>
-                <a:bodyPr wrap="square" lIns="0" tIns="0" rIns="0" bIns="0" rtlCol="0">
-                  <a:spAutoFit/>
-                </a:bodyPr>
-                <a:lstStyle/>
-                <a:p>
-                  <a:pPr/>
-                  <a14:m>
-                    <m:oMathPara xmlns:m="http://schemas.openxmlformats.org/officeDocument/2006/math">
-                      <m:oMathParaPr>
-                        <m:jc m:val="centerGroup"/>
-                      </m:oMathParaPr>
-                      <m:oMath xmlns:m="http://schemas.openxmlformats.org/officeDocument/2006/math">
-                        <m:r>
-                          <a:rPr lang="en-US" sz="2250" b="1" i="1">
-                            <a:latin typeface="Cambria Math" panose="02040503050406030204" pitchFamily="18" charset="0"/>
-                            <a:ea typeface="Cambria Math" panose="02040503050406030204" pitchFamily="18" charset="0"/>
-                            <a:cs typeface="Cambria Math" charset="0"/>
-                          </a:rPr>
-                          <m:t>⊑</m:t>
-                        </m:r>
-                      </m:oMath>
-                    </m:oMathPara>
-                  </a14:m>
-                  <a:endParaRPr lang="en-US" sz="2250" b="1" dirty="0">
-                    <a:latin typeface="Cambria Math" panose="02040503050406030204" pitchFamily="18" charset="0"/>
-                    <a:ea typeface="Cambria Math" panose="02040503050406030204" pitchFamily="18" charset="0"/>
-                  </a:endParaRPr>
-                </a:p>
-              </p:txBody>
-            </p:sp>
-          </mc:Choice>
-          <mc:Fallback xmlns="">
-            <p:sp>
-              <p:nvSpPr>
-                <p:cNvPr id="50" name="TextBox 49">
-                  <a:extLst>
-                    <a:ext uri="{FF2B5EF4-FFF2-40B4-BE49-F238E27FC236}">
-                      <a16:creationId xmlns:a16="http://schemas.microsoft.com/office/drawing/2014/main" id="{5E562659-E130-0F4B-9614-545D7C02C94D}"/>
-                    </a:ext>
-                  </a:extLst>
-                </p:cNvPr>
-                <p:cNvSpPr txBox="1">
-                  <a:spLocks noRot="1" noChangeAspect="1" noMove="1" noResize="1" noEditPoints="1" noAdjustHandles="1" noChangeArrowheads="1" noChangeShapeType="1" noTextEdit="1"/>
-                </p:cNvSpPr>
-                <p:nvPr/>
-              </p:nvSpPr>
-              <p:spPr>
-                <a:xfrm rot="16200000">
-                  <a:off x="6529190" y="4017257"/>
-                  <a:ext cx="552669" cy="346249"/>
-                </a:xfrm>
-                <a:prstGeom prst="rect">
-                  <a:avLst/>
-                </a:prstGeom>
-                <a:blipFill>
-                  <a:blip r:embed="rId5"/>
-                  <a:stretch>
-                    <a:fillRect/>
-                  </a:stretch>
-                </a:blipFill>
-              </p:spPr>
-              <p:txBody>
-                <a:bodyPr/>
-                <a:lstStyle/>
-                <a:p>
-                  <a:r>
-                    <a:rPr lang="en-US">
-                      <a:noFill/>
-                    </a:rPr>
-                    <a:t> </a:t>
-                  </a:r>
-                </a:p>
-              </p:txBody>
-            </p:sp>
-          </mc:Fallback>
-        </mc:AlternateContent>
-        <mc:AlternateContent xmlns:mc="http://schemas.openxmlformats.org/markup-compatibility/2006" xmlns:a14="http://schemas.microsoft.com/office/drawing/2010/main">
-          <mc:Choice Requires="a14">
-            <p:sp>
-              <p:nvSpPr>
-                <p:cNvPr id="51" name="TextBox 50">
-                  <a:extLst>
-                    <a:ext uri="{FF2B5EF4-FFF2-40B4-BE49-F238E27FC236}">
-                      <a16:creationId xmlns:a16="http://schemas.microsoft.com/office/drawing/2014/main" id="{AA83BD1F-A2EC-E14E-AD06-CD4F0DAF8410}"/>
-                    </a:ext>
-                  </a:extLst>
-                </p:cNvPr>
-                <p:cNvSpPr txBox="1"/>
-                <p:nvPr/>
-              </p:nvSpPr>
-              <p:spPr>
-                <a:xfrm rot="16200000">
-                  <a:off x="6497437" y="3528021"/>
-                  <a:ext cx="552669" cy="346249"/>
-                </a:xfrm>
-                <a:prstGeom prst="rect">
-                  <a:avLst/>
-                </a:prstGeom>
-                <a:noFill/>
-              </p:spPr>
-              <p:txBody>
-                <a:bodyPr wrap="square" lIns="0" tIns="0" rIns="0" bIns="0" rtlCol="0">
-                  <a:spAutoFit/>
-                </a:bodyPr>
-                <a:lstStyle/>
-                <a:p>
-                  <a:pPr/>
-                  <a14:m>
-                    <m:oMathPara xmlns:m="http://schemas.openxmlformats.org/officeDocument/2006/math">
-                      <m:oMathParaPr>
-                        <m:jc m:val="centerGroup"/>
-                      </m:oMathParaPr>
-                      <m:oMath xmlns:m="http://schemas.openxmlformats.org/officeDocument/2006/math">
-                        <m:r>
-                          <a:rPr lang="en-US" sz="2250" b="1" i="1">
-                            <a:latin typeface="Cambria Math" panose="02040503050406030204" pitchFamily="18" charset="0"/>
-                            <a:ea typeface="Cambria Math" panose="02040503050406030204" pitchFamily="18" charset="0"/>
-                            <a:cs typeface="Cambria Math" charset="0"/>
-                          </a:rPr>
-                          <m:t>⊑</m:t>
-                        </m:r>
-                      </m:oMath>
-                    </m:oMathPara>
-                  </a14:m>
-                  <a:endParaRPr lang="en-US" sz="2250" b="1" dirty="0">
-                    <a:latin typeface="Cambria Math" panose="02040503050406030204" pitchFamily="18" charset="0"/>
-                    <a:ea typeface="Cambria Math" panose="02040503050406030204" pitchFamily="18" charset="0"/>
-                  </a:endParaRPr>
-                </a:p>
-              </p:txBody>
-            </p:sp>
-          </mc:Choice>
-          <mc:Fallback xmlns="">
-            <p:sp>
-              <p:nvSpPr>
-                <p:cNvPr id="51" name="TextBox 50">
-                  <a:extLst>
-                    <a:ext uri="{FF2B5EF4-FFF2-40B4-BE49-F238E27FC236}">
-                      <a16:creationId xmlns:a16="http://schemas.microsoft.com/office/drawing/2014/main" id="{AA83BD1F-A2EC-E14E-AD06-CD4F0DAF8410}"/>
-                    </a:ext>
-                  </a:extLst>
-                </p:cNvPr>
-                <p:cNvSpPr txBox="1">
-                  <a:spLocks noRot="1" noChangeAspect="1" noMove="1" noResize="1" noEditPoints="1" noAdjustHandles="1" noChangeArrowheads="1" noChangeShapeType="1" noTextEdit="1"/>
-                </p:cNvSpPr>
-                <p:nvPr/>
-              </p:nvSpPr>
-              <p:spPr>
-                <a:xfrm rot="16200000">
-                  <a:off x="6497437" y="3528021"/>
-                  <a:ext cx="552669" cy="346249"/>
-                </a:xfrm>
-                <a:prstGeom prst="rect">
-                  <a:avLst/>
-                </a:prstGeom>
-                <a:blipFill>
-                  <a:blip r:embed="rId6"/>
-                  <a:stretch>
-                    <a:fillRect/>
-                  </a:stretch>
-                </a:blipFill>
-              </p:spPr>
-              <p:txBody>
-                <a:bodyPr/>
-                <a:lstStyle/>
-                <a:p>
-                  <a:r>
-                    <a:rPr lang="en-US">
-                      <a:noFill/>
-                    </a:rPr>
-                    <a:t> </a:t>
-                  </a:r>
-                </a:p>
-              </p:txBody>
-            </p:sp>
-          </mc:Fallback>
-        </mc:AlternateContent>
-        <mc:AlternateContent xmlns:mc="http://schemas.openxmlformats.org/markup-compatibility/2006" xmlns:a14="http://schemas.microsoft.com/office/drawing/2010/main">
-          <mc:Choice Requires="a14">
-            <p:sp>
-              <p:nvSpPr>
-                <p:cNvPr id="52" name="TextBox 51">
-                  <a:extLst>
-                    <a:ext uri="{FF2B5EF4-FFF2-40B4-BE49-F238E27FC236}">
-                      <a16:creationId xmlns:a16="http://schemas.microsoft.com/office/drawing/2014/main" id="{25109834-2B25-184D-AAAA-907697571C73}"/>
-                    </a:ext>
-                  </a:extLst>
-                </p:cNvPr>
-                <p:cNvSpPr txBox="1"/>
-                <p:nvPr/>
-              </p:nvSpPr>
-              <p:spPr>
-                <a:xfrm rot="16200000">
-                  <a:off x="6488271" y="2449983"/>
-                  <a:ext cx="552669" cy="346249"/>
-                </a:xfrm>
-                <a:prstGeom prst="rect">
-                  <a:avLst/>
-                </a:prstGeom>
-                <a:noFill/>
-              </p:spPr>
-              <p:txBody>
-                <a:bodyPr wrap="square" lIns="0" tIns="0" rIns="0" bIns="0" rtlCol="0">
-                  <a:spAutoFit/>
-                </a:bodyPr>
-                <a:lstStyle/>
-                <a:p>
-                  <a:pPr/>
-                  <a14:m>
-                    <m:oMathPara xmlns:m="http://schemas.openxmlformats.org/officeDocument/2006/math">
-                      <m:oMathParaPr>
-                        <m:jc m:val="centerGroup"/>
-                      </m:oMathParaPr>
-                      <m:oMath xmlns:m="http://schemas.openxmlformats.org/officeDocument/2006/math">
-                        <m:r>
-                          <a:rPr lang="en-US" sz="2250" b="1" i="1">
-                            <a:latin typeface="Cambria Math" panose="02040503050406030204" pitchFamily="18" charset="0"/>
-                            <a:ea typeface="Cambria Math" panose="02040503050406030204" pitchFamily="18" charset="0"/>
-                            <a:cs typeface="Cambria Math" charset="0"/>
-                          </a:rPr>
-                          <m:t>⊑</m:t>
-                        </m:r>
-                      </m:oMath>
-                    </m:oMathPara>
-                  </a14:m>
-                  <a:endParaRPr lang="en-US" sz="2250" b="1" dirty="0">
-                    <a:latin typeface="Cambria Math" panose="02040503050406030204" pitchFamily="18" charset="0"/>
-                    <a:ea typeface="Cambria Math" panose="02040503050406030204" pitchFamily="18" charset="0"/>
-                  </a:endParaRPr>
-                </a:p>
-              </p:txBody>
-            </p:sp>
-          </mc:Choice>
-          <mc:Fallback xmlns="">
-            <p:sp>
-              <p:nvSpPr>
-                <p:cNvPr id="52" name="TextBox 51">
-                  <a:extLst>
-                    <a:ext uri="{FF2B5EF4-FFF2-40B4-BE49-F238E27FC236}">
-                      <a16:creationId xmlns:a16="http://schemas.microsoft.com/office/drawing/2014/main" id="{25109834-2B25-184D-AAAA-907697571C73}"/>
-                    </a:ext>
-                  </a:extLst>
-                </p:cNvPr>
-                <p:cNvSpPr txBox="1">
-                  <a:spLocks noRot="1" noChangeAspect="1" noMove="1" noResize="1" noEditPoints="1" noAdjustHandles="1" noChangeArrowheads="1" noChangeShapeType="1" noTextEdit="1"/>
-                </p:cNvSpPr>
-                <p:nvPr/>
-              </p:nvSpPr>
-              <p:spPr>
-                <a:xfrm rot="16200000">
-                  <a:off x="6488271" y="2449983"/>
-                  <a:ext cx="552669" cy="346249"/>
-                </a:xfrm>
-                <a:prstGeom prst="rect">
-                  <a:avLst/>
-                </a:prstGeom>
-                <a:blipFill>
-                  <a:blip r:embed="rId7"/>
-                  <a:stretch>
-                    <a:fillRect/>
-                  </a:stretch>
-                </a:blipFill>
-              </p:spPr>
-              <p:txBody>
-                <a:bodyPr/>
-                <a:lstStyle/>
-                <a:p>
-                  <a:r>
-                    <a:rPr lang="en-US">
-                      <a:noFill/>
-                    </a:rPr>
-                    <a:t> </a:t>
-                  </a:r>
-                </a:p>
-              </p:txBody>
-            </p:sp>
-          </mc:Fallback>
-        </mc:AlternateContent>
-        <mc:AlternateContent xmlns:mc="http://schemas.openxmlformats.org/markup-compatibility/2006" xmlns:a14="http://schemas.microsoft.com/office/drawing/2010/main">
-          <mc:Choice Requires="a14">
-            <p:sp>
-              <p:nvSpPr>
-                <p:cNvPr id="53" name="TextBox 52">
-                  <a:extLst>
-                    <a:ext uri="{FF2B5EF4-FFF2-40B4-BE49-F238E27FC236}">
-                      <a16:creationId xmlns:a16="http://schemas.microsoft.com/office/drawing/2014/main" id="{F2E580FB-B760-7C4A-92CB-D12D033767A2}"/>
-                    </a:ext>
-                  </a:extLst>
-                </p:cNvPr>
-                <p:cNvSpPr txBox="1"/>
-                <p:nvPr/>
-              </p:nvSpPr>
-              <p:spPr>
-                <a:xfrm rot="16200000">
-                  <a:off x="6488269" y="1826436"/>
-                  <a:ext cx="552669" cy="346249"/>
-                </a:xfrm>
-                <a:prstGeom prst="rect">
-                  <a:avLst/>
-                </a:prstGeom>
-                <a:noFill/>
-              </p:spPr>
-              <p:txBody>
-                <a:bodyPr wrap="square" lIns="0" tIns="0" rIns="0" bIns="0" rtlCol="0">
-                  <a:spAutoFit/>
-                </a:bodyPr>
-                <a:lstStyle/>
-                <a:p>
-                  <a:pPr/>
-                  <a14:m>
-                    <m:oMathPara xmlns:m="http://schemas.openxmlformats.org/officeDocument/2006/math">
-                      <m:oMathParaPr>
-                        <m:jc m:val="centerGroup"/>
-                      </m:oMathParaPr>
-                      <m:oMath xmlns:m="http://schemas.openxmlformats.org/officeDocument/2006/math">
-                        <m:r>
-                          <a:rPr lang="en-US" sz="2250" b="1" i="1">
-                            <a:latin typeface="Cambria Math" panose="02040503050406030204" pitchFamily="18" charset="0"/>
-                            <a:ea typeface="Cambria Math" panose="02040503050406030204" pitchFamily="18" charset="0"/>
-                            <a:cs typeface="Cambria Math" charset="0"/>
-                          </a:rPr>
-                          <m:t>⊑</m:t>
-                        </m:r>
-                      </m:oMath>
-                    </m:oMathPara>
-                  </a14:m>
-                  <a:endParaRPr lang="en-US" sz="2250" b="1" dirty="0">
-                    <a:latin typeface="Cambria Math" panose="02040503050406030204" pitchFamily="18" charset="0"/>
-                    <a:ea typeface="Cambria Math" panose="02040503050406030204" pitchFamily="18" charset="0"/>
-                  </a:endParaRPr>
-                </a:p>
-              </p:txBody>
-            </p:sp>
-          </mc:Choice>
-          <mc:Fallback xmlns="">
-            <p:sp>
-              <p:nvSpPr>
-                <p:cNvPr id="53" name="TextBox 52">
-                  <a:extLst>
-                    <a:ext uri="{FF2B5EF4-FFF2-40B4-BE49-F238E27FC236}">
-                      <a16:creationId xmlns:a16="http://schemas.microsoft.com/office/drawing/2014/main" id="{F2E580FB-B760-7C4A-92CB-D12D033767A2}"/>
-                    </a:ext>
-                  </a:extLst>
-                </p:cNvPr>
-                <p:cNvSpPr txBox="1">
-                  <a:spLocks noRot="1" noChangeAspect="1" noMove="1" noResize="1" noEditPoints="1" noAdjustHandles="1" noChangeArrowheads="1" noChangeShapeType="1" noTextEdit="1"/>
-                </p:cNvSpPr>
-                <p:nvPr/>
-              </p:nvSpPr>
-              <p:spPr>
-                <a:xfrm rot="16200000">
-                  <a:off x="6488269" y="1826436"/>
-                  <a:ext cx="552669" cy="346249"/>
-                </a:xfrm>
-                <a:prstGeom prst="rect">
-                  <a:avLst/>
-                </a:prstGeom>
-                <a:blipFill>
-                  <a:blip r:embed="rId8"/>
-                  <a:stretch>
-                    <a:fillRect/>
-                  </a:stretch>
-                </a:blipFill>
-              </p:spPr>
-              <p:txBody>
-                <a:bodyPr/>
-                <a:lstStyle/>
-                <a:p>
-                  <a:r>
-                    <a:rPr lang="en-US">
-                      <a:noFill/>
-                    </a:rPr>
-                    <a:t> </a:t>
-                  </a:r>
-                </a:p>
-              </p:txBody>
-            </p:sp>
-          </mc:Fallback>
-        </mc:AlternateContent>
-        <mc:AlternateContent xmlns:mc="http://schemas.openxmlformats.org/markup-compatibility/2006" xmlns:a14="http://schemas.microsoft.com/office/drawing/2010/main">
-          <mc:Choice Requires="a14">
-            <p:sp>
-              <p:nvSpPr>
-                <p:cNvPr id="54" name="TextBox 53">
-                  <a:extLst>
-                    <a:ext uri="{FF2B5EF4-FFF2-40B4-BE49-F238E27FC236}">
-                      <a16:creationId xmlns:a16="http://schemas.microsoft.com/office/drawing/2014/main" id="{83AA2853-6A23-2B41-82F0-03E77DFFF0CB}"/>
-                    </a:ext>
-                  </a:extLst>
-                </p:cNvPr>
-                <p:cNvSpPr txBox="1"/>
-                <p:nvPr/>
-              </p:nvSpPr>
-              <p:spPr>
-                <a:xfrm>
-                  <a:off x="4076510" y="3787571"/>
-                  <a:ext cx="5430461" cy="351763"/>
-                </a:xfrm>
-                <a:prstGeom prst="rect">
-                  <a:avLst/>
-                </a:prstGeom>
-                <a:noFill/>
-              </p:spPr>
-              <p:txBody>
-                <a:bodyPr wrap="none" rtlCol="0">
-                  <a:spAutoFit/>
-                </a:bodyPr>
-                <a:lstStyle/>
-                <a:p>
-                  <a:pPr/>
-                  <a14:m>
-                    <m:oMathPara xmlns:m="http://schemas.openxmlformats.org/officeDocument/2006/math">
-                      <m:oMathParaPr>
-                        <m:jc m:val="centerGroup"/>
-                      </m:oMathParaPr>
-                      <m:oMath xmlns:m="http://schemas.openxmlformats.org/officeDocument/2006/math">
-                        <m:sSub>
-                          <m:sSubPr>
-                            <m:ctrlPr>
-                              <a:rPr lang="en-US" sz="1400" i="1" smtClean="0">
-                                <a:latin typeface="Cambria Math" panose="02040503050406030204" pitchFamily="18" charset="0"/>
-                                <a:ea typeface="Cambria Math" panose="02040503050406030204" pitchFamily="18" charset="0"/>
-                              </a:rPr>
-                            </m:ctrlPr>
-                          </m:sSubPr>
-                          <m:e>
-                            <m:r>
-                              <m:rPr>
-                                <m:sty m:val="p"/>
-                              </m:rPr>
-                              <a:rPr lang="en-US" sz="1400">
-                                <a:latin typeface="Cambria Math" panose="02040503050406030204" pitchFamily="18" charset="0"/>
-                                <a:ea typeface="Cambria Math" panose="02040503050406030204" pitchFamily="18" charset="0"/>
-                              </a:rPr>
-                              <m:t>Mach</m:t>
-                            </m:r>
-                          </m:e>
-                          <m:sub>
-                            <m:r>
-                              <m:rPr>
-                                <m:sty m:val="p"/>
-                              </m:rPr>
-                              <a:rPr lang="en-US" sz="1400" b="0" i="0" smtClean="0">
-                                <a:latin typeface="Cambria Math" panose="02040503050406030204" pitchFamily="18" charset="0"/>
-                                <a:ea typeface="Cambria Math" panose="02040503050406030204" pitchFamily="18" charset="0"/>
-                              </a:rPr>
-                              <m:t>EAsm</m:t>
-                            </m:r>
-                          </m:sub>
-                        </m:sSub>
-                        <m:r>
-                          <a:rPr lang="en-US" sz="1400">
-                            <a:latin typeface="Cambria Math" panose="02040503050406030204" pitchFamily="18" charset="0"/>
-                            <a:ea typeface="Cambria Math" panose="02040503050406030204" pitchFamily="18" charset="0"/>
-                          </a:rPr>
-                          <m:t>(</m:t>
-                        </m:r>
-                        <m:sSub>
-                          <m:sSubPr>
-                            <m:ctrlPr>
-                              <a:rPr lang="en-US" sz="1400" b="0" i="1" smtClean="0">
-                                <a:latin typeface="Cambria Math" panose="02040503050406030204" pitchFamily="18" charset="0"/>
-                                <a:ea typeface="Cambria Math" panose="02040503050406030204" pitchFamily="18" charset="0"/>
-                              </a:rPr>
-                            </m:ctrlPr>
-                          </m:sSubPr>
-                          <m:e>
-                            <m:r>
-                              <a:rPr lang="en-US" sz="1400" i="1">
-                                <a:latin typeface="Cambria Math" panose="02040503050406030204" pitchFamily="18" charset="0"/>
-                                <a:ea typeface="Cambria Math" panose="02040503050406030204" pitchFamily="18" charset="0"/>
-                              </a:rPr>
-                              <m:t>∥</m:t>
-                            </m:r>
-                          </m:e>
-                          <m:sub>
-                            <m:r>
-                              <a:rPr lang="en-US" sz="1400" b="0" i="1" smtClean="0">
-                                <a:latin typeface="Cambria Math" panose="02040503050406030204" pitchFamily="18" charset="0"/>
-                                <a:ea typeface="Cambria Math" panose="02040503050406030204" pitchFamily="18" charset="0"/>
-                              </a:rPr>
-                              <m:t>𝑡𝑖𝑑</m:t>
-                            </m:r>
-                            <m:r>
-                              <a:rPr lang="en-US" sz="1400" b="0" i="1" smtClean="0">
-                                <a:latin typeface="Cambria Math" panose="02040503050406030204" pitchFamily="18" charset="0"/>
-                                <a:ea typeface="Cambria Math" panose="02040503050406030204" pitchFamily="18" charset="0"/>
-                              </a:rPr>
-                              <m:t>∈</m:t>
-                            </m:r>
-                            <m:sSub>
-                              <m:sSubPr>
-                                <m:ctrlPr>
-                                  <a:rPr lang="en-US" sz="1400" b="0" i="1" smtClean="0">
-                                    <a:latin typeface="Cambria Math" panose="02040503050406030204" pitchFamily="18" charset="0"/>
-                                    <a:ea typeface="Cambria Math" panose="02040503050406030204" pitchFamily="18" charset="0"/>
-                                  </a:rPr>
-                                </m:ctrlPr>
-                              </m:sSubPr>
-                              <m:e>
-                                <m:r>
-                                  <a:rPr lang="en-US" sz="1400" b="0" i="1" smtClean="0">
-                                    <a:latin typeface="Cambria Math" panose="02040503050406030204" pitchFamily="18" charset="0"/>
-                                    <a:ea typeface="Cambria Math" panose="02040503050406030204" pitchFamily="18" charset="0"/>
-                                  </a:rPr>
-                                  <m:t>𝑇</m:t>
-                                </m:r>
-                              </m:e>
-                              <m:sub>
-                                <m:r>
-                                  <a:rPr lang="en-US" sz="1400" b="0" i="1" smtClean="0">
-                                    <a:latin typeface="Cambria Math" panose="02040503050406030204" pitchFamily="18" charset="0"/>
-                                    <a:ea typeface="Cambria Math" panose="02040503050406030204" pitchFamily="18" charset="0"/>
-                                  </a:rPr>
-                                  <m:t>[</m:t>
-                                </m:r>
-                                <m:r>
-                                  <a:rPr lang="en-US" sz="1400" b="0" i="1" smtClean="0">
-                                    <a:latin typeface="Cambria Math" panose="02040503050406030204" pitchFamily="18" charset="0"/>
-                                    <a:ea typeface="Cambria Math" panose="02040503050406030204" pitchFamily="18" charset="0"/>
-                                  </a:rPr>
-                                  <m:t>𝑐𝑖𝑑</m:t>
-                                </m:r>
-                                <m:r>
-                                  <a:rPr lang="en-US" sz="1400" b="0" i="1" smtClean="0">
-                                    <a:latin typeface="Cambria Math" panose="02040503050406030204" pitchFamily="18" charset="0"/>
-                                    <a:ea typeface="Cambria Math" panose="02040503050406030204" pitchFamily="18" charset="0"/>
-                                  </a:rPr>
-                                  <m:t>]</m:t>
-                                </m:r>
-                              </m:sub>
-                            </m:sSub>
-                          </m:sub>
-                        </m:sSub>
-                        <m:r>
-                          <m:rPr>
-                            <m:sty m:val="p"/>
-                          </m:rPr>
-                          <a:rPr lang="en-US" sz="1400">
-                            <a:latin typeface="Cambria Math" panose="02040503050406030204" pitchFamily="18" charset="0"/>
-                            <a:ea typeface="Cambria Math" panose="02040503050406030204" pitchFamily="18" charset="0"/>
-                          </a:rPr>
-                          <m:t>PHBThrd</m:t>
-                        </m:r>
-                        <m:d>
-                          <m:dPr>
-                            <m:begChr m:val="["/>
-                            <m:endChr m:val="]"/>
-                            <m:ctrlPr>
-                              <a:rPr lang="en-US" sz="1400" i="1">
-                                <a:latin typeface="Cambria Math" panose="02040503050406030204" pitchFamily="18" charset="0"/>
-                                <a:ea typeface="Cambria Math" panose="02040503050406030204" pitchFamily="18" charset="0"/>
-                              </a:rPr>
-                            </m:ctrlPr>
-                          </m:dPr>
-                          <m:e>
-                            <m:r>
-                              <a:rPr lang="en-US" sz="1400" b="0" i="1" smtClean="0">
-                                <a:latin typeface="Cambria Math" panose="02040503050406030204" pitchFamily="18" charset="0"/>
-                                <a:ea typeface="Cambria Math" panose="02040503050406030204" pitchFamily="18" charset="0"/>
-                              </a:rPr>
-                              <m:t>𝑐𝑖𝑑</m:t>
-                            </m:r>
-                            <m:r>
-                              <a:rPr lang="en-US" sz="1400" b="0" i="1" smtClean="0">
-                                <a:latin typeface="Cambria Math" panose="02040503050406030204" pitchFamily="18" charset="0"/>
-                                <a:ea typeface="Cambria Math" panose="02040503050406030204" pitchFamily="18" charset="0"/>
-                              </a:rPr>
-                              <m:t>,</m:t>
-                            </m:r>
-                            <m:sSubSup>
-                              <m:sSubSupPr>
-                                <m:ctrlPr>
-                                  <a:rPr lang="en-US" sz="1400" b="0" i="1" smtClean="0">
-                                    <a:latin typeface="Cambria Math" panose="02040503050406030204" pitchFamily="18" charset="0"/>
-                                    <a:ea typeface="Cambria Math" panose="02040503050406030204" pitchFamily="18" charset="0"/>
-                                  </a:rPr>
-                                </m:ctrlPr>
-                              </m:sSubSupPr>
-                              <m:e>
-                                <m:r>
-                                  <a:rPr lang="en-US" sz="1400" i="1">
-                                    <a:latin typeface="Cambria Math" panose="02040503050406030204" pitchFamily="18" charset="0"/>
-                                    <a:ea typeface="Cambria Math" panose="02040503050406030204" pitchFamily="18" charset="0"/>
-                                  </a:rPr>
-                                  <m:t>𝜀</m:t>
-                                </m:r>
-                              </m:e>
-                              <m:sub>
-                                <m:r>
-                                  <a:rPr lang="en-US" sz="1400" i="1">
-                                    <a:latin typeface="Cambria Math" panose="02040503050406030204" pitchFamily="18" charset="0"/>
-                                    <a:ea typeface="Cambria Math" panose="02040503050406030204" pitchFamily="18" charset="0"/>
-                                  </a:rPr>
-                                  <m:t>𝑐𝑖𝑑</m:t>
-                                </m:r>
-                              </m:sub>
-                              <m:sup>
-                                <m:r>
-                                  <a:rPr lang="en-US" sz="1400" b="0" i="1" smtClean="0">
-                                    <a:latin typeface="Cambria Math" panose="02040503050406030204" pitchFamily="18" charset="0"/>
-                                    <a:ea typeface="Cambria Math" panose="02040503050406030204" pitchFamily="18" charset="0"/>
-                                  </a:rPr>
-                                  <m:t>′</m:t>
-                                </m:r>
-                              </m:sup>
-                            </m:sSubSup>
-                          </m:e>
-                        </m:d>
-                        <m:r>
-                          <a:rPr lang="en-US" sz="1400" i="1">
-                            <a:latin typeface="Cambria Math" panose="02040503050406030204" pitchFamily="18" charset="0"/>
-                            <a:ea typeface="Cambria Math" panose="02040503050406030204" pitchFamily="18" charset="0"/>
-                          </a:rPr>
-                          <m:t>)⊢</m:t>
-                        </m:r>
-                        <m:d>
-                          <m:dPr>
-                            <m:begChr m:val="⟦"/>
-                            <m:endChr m:val="⟧"/>
-                            <m:ctrlPr>
-                              <a:rPr lang="en-US" sz="1400" i="1" dirty="0">
-                                <a:latin typeface="Cambria Math" panose="02040503050406030204" pitchFamily="18" charset="0"/>
-                                <a:ea typeface="Cambria Math" panose="02040503050406030204" pitchFamily="18" charset="0"/>
-                              </a:rPr>
-                            </m:ctrlPr>
-                          </m:dPr>
-                          <m:e>
-                            <m:r>
-                              <a:rPr lang="en-US" sz="1400" b="1" dirty="0">
-                                <a:latin typeface="Cambria Math" panose="02040503050406030204" pitchFamily="18" charset="0"/>
-                                <a:ea typeface="Cambria Math" panose="02040503050406030204" pitchFamily="18" charset="0"/>
-                              </a:rPr>
-                              <m:t>𝐂𝐞𝐫𝐭𝐢𝐊𝐎</m:t>
-                            </m:r>
-                            <m:sSub>
-                              <m:sSubPr>
-                                <m:ctrlPr>
-                                  <a:rPr lang="en-US" sz="1400" b="1" i="1" dirty="0">
-                                    <a:latin typeface="Cambria Math" panose="02040503050406030204" pitchFamily="18" charset="0"/>
-                                    <a:ea typeface="Cambria Math" panose="02040503050406030204" pitchFamily="18" charset="0"/>
-                                  </a:rPr>
-                                </m:ctrlPr>
-                              </m:sSubPr>
-                              <m:e>
-                                <m:r>
-                                  <a:rPr lang="en-US" sz="1400" b="1" dirty="0">
-                                    <a:latin typeface="Cambria Math" panose="02040503050406030204" pitchFamily="18" charset="0"/>
-                                    <a:ea typeface="Cambria Math" panose="02040503050406030204" pitchFamily="18" charset="0"/>
-                                  </a:rPr>
-                                  <m:t>𝐒</m:t>
-                                </m:r>
-                              </m:e>
-                              <m:sub>
-                                <m:r>
-                                  <a:rPr lang="en-US" sz="1400" b="1" dirty="0">
-                                    <a:latin typeface="Cambria Math" panose="02040503050406030204" pitchFamily="18" charset="0"/>
-                                    <a:ea typeface="Cambria Math" panose="02040503050406030204" pitchFamily="18" charset="0"/>
-                                  </a:rPr>
-                                  <m:t>𝐭𝐡𝐫𝐝</m:t>
-                                </m:r>
-                              </m:sub>
-                            </m:sSub>
-                            <m:r>
-                              <a:rPr lang="en-US" sz="1400" b="1" i="1" dirty="0">
-                                <a:latin typeface="Cambria Math" panose="02040503050406030204" pitchFamily="18" charset="0"/>
-                                <a:ea typeface="Cambria Math" panose="02040503050406030204" pitchFamily="18" charset="0"/>
-                              </a:rPr>
-                              <m:t>⊕</m:t>
-                            </m:r>
-                            <m:r>
-                              <a:rPr lang="en-US" sz="1400" b="1" dirty="0">
-                                <a:latin typeface="Cambria Math" panose="02040503050406030204" pitchFamily="18" charset="0"/>
-                                <a:ea typeface="Cambria Math" panose="02040503050406030204" pitchFamily="18" charset="0"/>
-                              </a:rPr>
-                              <m:t>𝐂𝐭𝐱𝐭</m:t>
-                            </m:r>
-                          </m:e>
-                        </m:d>
-                        <m:r>
-                          <a:rPr lang="en-US" sz="1400" i="1" dirty="0">
-                            <a:latin typeface="Cambria Math" panose="02040503050406030204" pitchFamily="18" charset="0"/>
-                            <a:ea typeface="Cambria Math" panose="02040503050406030204" pitchFamily="18" charset="0"/>
-                          </a:rPr>
-                          <m:t> </m:t>
-                        </m:r>
-                      </m:oMath>
-                    </m:oMathPara>
-                  </a14:m>
-                  <a:endParaRPr lang="en-US" sz="1400" baseline="30000" dirty="0">
-                    <a:latin typeface="Cambria Math" panose="02040503050406030204" pitchFamily="18" charset="0"/>
-                    <a:ea typeface="Cambria Math" panose="02040503050406030204" pitchFamily="18" charset="0"/>
-                  </a:endParaRPr>
-                </a:p>
-              </p:txBody>
-            </p:sp>
-          </mc:Choice>
-          <mc:Fallback xmlns="">
-            <p:sp>
-              <p:nvSpPr>
-                <p:cNvPr id="54" name="TextBox 53">
-                  <a:extLst>
-                    <a:ext uri="{FF2B5EF4-FFF2-40B4-BE49-F238E27FC236}">
-                      <a16:creationId xmlns:a16="http://schemas.microsoft.com/office/drawing/2014/main" id="{83AA2853-6A23-2B41-82F0-03E77DFFF0CB}"/>
-                    </a:ext>
-                  </a:extLst>
-                </p:cNvPr>
-                <p:cNvSpPr txBox="1">
-                  <a:spLocks noRot="1" noChangeAspect="1" noMove="1" noResize="1" noEditPoints="1" noAdjustHandles="1" noChangeArrowheads="1" noChangeShapeType="1" noTextEdit="1"/>
-                </p:cNvSpPr>
-                <p:nvPr/>
-              </p:nvSpPr>
-              <p:spPr>
-                <a:xfrm>
-                  <a:off x="4076510" y="3787571"/>
-                  <a:ext cx="5430461" cy="351763"/>
-                </a:xfrm>
-                <a:prstGeom prst="rect">
-                  <a:avLst/>
-                </a:prstGeom>
-                <a:blipFill>
-                  <a:blip r:embed="rId9"/>
-                  <a:stretch>
-                    <a:fillRect/>
-                  </a:stretch>
-                </a:blipFill>
-              </p:spPr>
-              <p:txBody>
-                <a:bodyPr/>
-                <a:lstStyle/>
-                <a:p>
-                  <a:r>
-                    <a:rPr lang="en-US">
-                      <a:noFill/>
-                    </a:rPr>
-                    <a:t> </a:t>
-                  </a:r>
-                </a:p>
-              </p:txBody>
-            </p:sp>
-          </mc:Fallback>
-        </mc:AlternateContent>
-        <mc:AlternateContent xmlns:mc="http://schemas.openxmlformats.org/markup-compatibility/2006" xmlns:a14="http://schemas.microsoft.com/office/drawing/2010/main">
-          <mc:Choice Requires="a14">
-            <p:sp>
-              <p:nvSpPr>
-                <p:cNvPr id="56" name="TextBox 55">
-                  <a:extLst>
-                    <a:ext uri="{FF2B5EF4-FFF2-40B4-BE49-F238E27FC236}">
-                      <a16:creationId xmlns:a16="http://schemas.microsoft.com/office/drawing/2014/main" id="{5AA5BA2F-A974-BE4B-AA80-F1688BA20308}"/>
-                    </a:ext>
-                  </a:extLst>
-                </p:cNvPr>
-                <p:cNvSpPr txBox="1"/>
-                <p:nvPr/>
-              </p:nvSpPr>
-              <p:spPr>
-                <a:xfrm>
-                  <a:off x="3901541" y="3280163"/>
-                  <a:ext cx="5726119" cy="371384"/>
-                </a:xfrm>
-                <a:prstGeom prst="rect">
-                  <a:avLst/>
-                </a:prstGeom>
-                <a:noFill/>
-              </p:spPr>
-              <p:txBody>
-                <a:bodyPr wrap="none" rtlCol="0">
-                  <a:spAutoFit/>
-                </a:bodyPr>
-                <a:lstStyle/>
-                <a:p>
-                  <a:pPr/>
-                  <a14:m>
-                    <m:oMathPara xmlns:m="http://schemas.openxmlformats.org/officeDocument/2006/math">
-                      <m:oMathParaPr>
-                        <m:jc m:val="centerGroup"/>
-                      </m:oMathParaPr>
-                      <m:oMath xmlns:m="http://schemas.openxmlformats.org/officeDocument/2006/math">
-                        <m:sSub>
-                          <m:sSubPr>
-                            <m:ctrlPr>
-                              <a:rPr lang="en-US" sz="1400" i="1" smtClean="0">
-                                <a:latin typeface="Cambria Math" panose="02040503050406030204" pitchFamily="18" charset="0"/>
-                                <a:ea typeface="Cambria Math" panose="02040503050406030204" pitchFamily="18" charset="0"/>
-                              </a:rPr>
-                            </m:ctrlPr>
-                          </m:sSubPr>
-                          <m:e>
-                            <m:r>
-                              <m:rPr>
-                                <m:sty m:val="p"/>
-                              </m:rPr>
-                              <a:rPr lang="en-US" sz="1400">
-                                <a:latin typeface="Cambria Math" panose="02040503050406030204" pitchFamily="18" charset="0"/>
-                                <a:ea typeface="Cambria Math" panose="02040503050406030204" pitchFamily="18" charset="0"/>
-                              </a:rPr>
-                              <m:t>Mach</m:t>
-                            </m:r>
-                          </m:e>
-                          <m:sub>
-                            <m:r>
-                              <m:rPr>
-                                <m:sty m:val="p"/>
-                              </m:rPr>
-                              <a:rPr lang="en-US" sz="1400" b="0" i="0" smtClean="0">
-                                <a:latin typeface="Cambria Math" panose="02040503050406030204" pitchFamily="18" charset="0"/>
-                                <a:ea typeface="Cambria Math" panose="02040503050406030204" pitchFamily="18" charset="0"/>
-                              </a:rPr>
-                              <m:t>IE</m:t>
-                            </m:r>
-                            <m:r>
-                              <m:rPr>
-                                <m:sty m:val="p"/>
-                              </m:rPr>
-                              <a:rPr lang="en-US" sz="1400">
-                                <a:latin typeface="Cambria Math" panose="02040503050406030204" pitchFamily="18" charset="0"/>
-                                <a:ea typeface="Cambria Math" panose="02040503050406030204" pitchFamily="18" charset="0"/>
-                              </a:rPr>
-                              <m:t>Asm</m:t>
-                            </m:r>
-                          </m:sub>
-                        </m:sSub>
-                        <m:r>
-                          <a:rPr lang="en-US" sz="1400">
-                            <a:latin typeface="Cambria Math" panose="02040503050406030204" pitchFamily="18" charset="0"/>
-                            <a:ea typeface="Cambria Math" panose="02040503050406030204" pitchFamily="18" charset="0"/>
-                          </a:rPr>
-                          <m:t>(</m:t>
-                        </m:r>
-                        <m:sSub>
-                          <m:sSubPr>
-                            <m:ctrlPr>
-                              <a:rPr lang="en-US" sz="1400" b="0" i="1" smtClean="0">
-                                <a:latin typeface="Cambria Math" panose="02040503050406030204" pitchFamily="18" charset="0"/>
-                                <a:ea typeface="Cambria Math" panose="02040503050406030204" pitchFamily="18" charset="0"/>
-                              </a:rPr>
-                            </m:ctrlPr>
-                          </m:sSubPr>
-                          <m:e>
-                            <m:r>
-                              <a:rPr lang="en-US" sz="1400" i="1">
-                                <a:latin typeface="Cambria Math" panose="02040503050406030204" pitchFamily="18" charset="0"/>
-                                <a:ea typeface="Cambria Math" panose="02040503050406030204" pitchFamily="18" charset="0"/>
-                              </a:rPr>
-                              <m:t>∥</m:t>
-                            </m:r>
-                          </m:e>
-                          <m:sub>
-                            <m:r>
-                              <a:rPr lang="en-US" sz="1400" i="1">
-                                <a:latin typeface="Cambria Math" panose="02040503050406030204" pitchFamily="18" charset="0"/>
-                                <a:ea typeface="Cambria Math" panose="02040503050406030204" pitchFamily="18" charset="0"/>
-                              </a:rPr>
-                              <m:t>𝑡𝑖𝑑</m:t>
-                            </m:r>
-                            <m:r>
-                              <a:rPr lang="en-US" sz="1400" i="1">
-                                <a:latin typeface="Cambria Math" panose="02040503050406030204" pitchFamily="18" charset="0"/>
-                                <a:ea typeface="Cambria Math" panose="02040503050406030204" pitchFamily="18" charset="0"/>
-                              </a:rPr>
-                              <m:t>∈</m:t>
-                            </m:r>
-                            <m:sSub>
-                              <m:sSubPr>
-                                <m:ctrlPr>
-                                  <a:rPr lang="en-US" sz="1400" i="1">
-                                    <a:latin typeface="Cambria Math" panose="02040503050406030204" pitchFamily="18" charset="0"/>
-                                    <a:ea typeface="Cambria Math" panose="02040503050406030204" pitchFamily="18" charset="0"/>
-                                  </a:rPr>
-                                </m:ctrlPr>
-                              </m:sSubPr>
-                              <m:e>
-                                <m:r>
-                                  <a:rPr lang="en-US" sz="1400" i="1">
-                                    <a:latin typeface="Cambria Math" panose="02040503050406030204" pitchFamily="18" charset="0"/>
-                                    <a:ea typeface="Cambria Math" panose="02040503050406030204" pitchFamily="18" charset="0"/>
-                                  </a:rPr>
-                                  <m:t>𝑇</m:t>
-                                </m:r>
-                              </m:e>
-                              <m:sub>
-                                <m:r>
-                                  <a:rPr lang="en-US" sz="1400" i="1">
-                                    <a:latin typeface="Cambria Math" panose="02040503050406030204" pitchFamily="18" charset="0"/>
-                                    <a:ea typeface="Cambria Math" panose="02040503050406030204" pitchFamily="18" charset="0"/>
-                                  </a:rPr>
-                                  <m:t>[</m:t>
-                                </m:r>
-                                <m:r>
-                                  <a:rPr lang="en-US" sz="1400" i="1">
-                                    <a:latin typeface="Cambria Math" panose="02040503050406030204" pitchFamily="18" charset="0"/>
-                                    <a:ea typeface="Cambria Math" panose="02040503050406030204" pitchFamily="18" charset="0"/>
-                                  </a:rPr>
-                                  <m:t>𝑐𝑖𝑑</m:t>
-                                </m:r>
-                                <m:r>
-                                  <a:rPr lang="en-US" sz="1400" i="1">
-                                    <a:latin typeface="Cambria Math" panose="02040503050406030204" pitchFamily="18" charset="0"/>
-                                    <a:ea typeface="Cambria Math" panose="02040503050406030204" pitchFamily="18" charset="0"/>
-                                  </a:rPr>
-                                  <m:t>]</m:t>
-                                </m:r>
-                              </m:sub>
-                            </m:sSub>
-                          </m:sub>
-                        </m:sSub>
-                        <m:r>
-                          <m:rPr>
-                            <m:sty m:val="p"/>
-                          </m:rPr>
-                          <a:rPr lang="en-US" sz="1400">
-                            <a:latin typeface="Cambria Math" panose="02040503050406030204" pitchFamily="18" charset="0"/>
-                            <a:ea typeface="Cambria Math" panose="02040503050406030204" pitchFamily="18" charset="0"/>
-                          </a:rPr>
-                          <m:t>PHBThrd</m:t>
-                        </m:r>
-                        <m:d>
-                          <m:dPr>
-                            <m:begChr m:val="["/>
-                            <m:endChr m:val="]"/>
-                            <m:ctrlPr>
-                              <a:rPr lang="en-US" sz="1400" i="1">
-                                <a:latin typeface="Cambria Math" panose="02040503050406030204" pitchFamily="18" charset="0"/>
-                                <a:ea typeface="Cambria Math" panose="02040503050406030204" pitchFamily="18" charset="0"/>
-                              </a:rPr>
-                            </m:ctrlPr>
-                          </m:dPr>
-                          <m:e>
-                            <m:r>
-                              <a:rPr lang="en-US" sz="1400" b="0" i="1" smtClean="0">
-                                <a:latin typeface="Cambria Math" panose="02040503050406030204" pitchFamily="18" charset="0"/>
-                                <a:ea typeface="Cambria Math" panose="02040503050406030204" pitchFamily="18" charset="0"/>
-                              </a:rPr>
-                              <m:t>𝑐𝑖𝑑</m:t>
-                            </m:r>
-                            <m:r>
-                              <a:rPr lang="en-US" sz="1400" b="0" i="1" smtClean="0">
-                                <a:latin typeface="Cambria Math" panose="02040503050406030204" pitchFamily="18" charset="0"/>
-                                <a:ea typeface="Cambria Math" panose="02040503050406030204" pitchFamily="18" charset="0"/>
-                              </a:rPr>
-                              <m:t>,</m:t>
-                            </m:r>
-                            <m:sSubSup>
-                              <m:sSubSupPr>
-                                <m:ctrlPr>
-                                  <a:rPr lang="en-US" sz="1400" i="1">
-                                    <a:latin typeface="Cambria Math" panose="02040503050406030204" pitchFamily="18" charset="0"/>
-                                    <a:ea typeface="Cambria Math" panose="02040503050406030204" pitchFamily="18" charset="0"/>
-                                  </a:rPr>
-                                </m:ctrlPr>
-                              </m:sSubSupPr>
-                              <m:e>
-                                <m:r>
-                                  <a:rPr lang="en-US" sz="1400" i="1">
-                                    <a:latin typeface="Cambria Math" panose="02040503050406030204" pitchFamily="18" charset="0"/>
-                                    <a:ea typeface="Cambria Math" panose="02040503050406030204" pitchFamily="18" charset="0"/>
-                                  </a:rPr>
-                                  <m:t>𝜀</m:t>
-                                </m:r>
-                              </m:e>
-                              <m:sub>
-                                <m:r>
-                                  <a:rPr lang="en-US" sz="1400" i="1">
-                                    <a:latin typeface="Cambria Math" panose="02040503050406030204" pitchFamily="18" charset="0"/>
-                                    <a:ea typeface="Cambria Math" panose="02040503050406030204" pitchFamily="18" charset="0"/>
-                                  </a:rPr>
-                                  <m:t>𝑡𝑖𝑑</m:t>
-                                </m:r>
-                              </m:sub>
-                              <m:sup>
-                                <m:r>
-                                  <a:rPr lang="en-US" sz="1400" i="1">
-                                    <a:latin typeface="Cambria Math" panose="02040503050406030204" pitchFamily="18" charset="0"/>
-                                    <a:ea typeface="Cambria Math" panose="02040503050406030204" pitchFamily="18" charset="0"/>
-                                  </a:rPr>
-                                  <m:t>𝑀𝑇𝐿𝑖𝑛𝑘</m:t>
-                                </m:r>
-                              </m:sup>
-                            </m:sSubSup>
-                          </m:e>
-                        </m:d>
-                        <m:r>
-                          <a:rPr lang="en-US" sz="1400" i="1">
-                            <a:latin typeface="Cambria Math" panose="02040503050406030204" pitchFamily="18" charset="0"/>
-                            <a:ea typeface="Cambria Math" panose="02040503050406030204" pitchFamily="18" charset="0"/>
-                          </a:rPr>
-                          <m:t>)⊢</m:t>
-                        </m:r>
-                        <m:d>
-                          <m:dPr>
-                            <m:begChr m:val="⟦"/>
-                            <m:endChr m:val="⟧"/>
-                            <m:ctrlPr>
-                              <a:rPr lang="en-US" sz="1400" i="1" dirty="0">
-                                <a:latin typeface="Cambria Math" panose="02040503050406030204" pitchFamily="18" charset="0"/>
-                                <a:ea typeface="Cambria Math" panose="02040503050406030204" pitchFamily="18" charset="0"/>
-                              </a:rPr>
-                            </m:ctrlPr>
-                          </m:dPr>
-                          <m:e>
-                            <m:r>
-                              <a:rPr lang="en-US" sz="1400" b="1" dirty="0">
-                                <a:latin typeface="Cambria Math" panose="02040503050406030204" pitchFamily="18" charset="0"/>
-                                <a:ea typeface="Cambria Math" panose="02040503050406030204" pitchFamily="18" charset="0"/>
-                              </a:rPr>
-                              <m:t>𝐂𝐞𝐫𝐭𝐢𝐊𝐎</m:t>
-                            </m:r>
-                            <m:sSub>
-                              <m:sSubPr>
-                                <m:ctrlPr>
-                                  <a:rPr lang="en-US" sz="1400" b="1" i="1" dirty="0">
-                                    <a:latin typeface="Cambria Math" panose="02040503050406030204" pitchFamily="18" charset="0"/>
-                                    <a:ea typeface="Cambria Math" panose="02040503050406030204" pitchFamily="18" charset="0"/>
-                                  </a:rPr>
-                                </m:ctrlPr>
-                              </m:sSubPr>
-                              <m:e>
-                                <m:r>
-                                  <a:rPr lang="en-US" sz="1400" b="1" dirty="0">
-                                    <a:latin typeface="Cambria Math" panose="02040503050406030204" pitchFamily="18" charset="0"/>
-                                    <a:ea typeface="Cambria Math" panose="02040503050406030204" pitchFamily="18" charset="0"/>
-                                  </a:rPr>
-                                  <m:t>𝐒</m:t>
-                                </m:r>
-                              </m:e>
-                              <m:sub>
-                                <m:r>
-                                  <a:rPr lang="en-US" sz="1400" b="1" dirty="0">
-                                    <a:latin typeface="Cambria Math" panose="02040503050406030204" pitchFamily="18" charset="0"/>
-                                    <a:ea typeface="Cambria Math" panose="02040503050406030204" pitchFamily="18" charset="0"/>
-                                  </a:rPr>
-                                  <m:t>𝐭𝐡𝐫𝐝</m:t>
-                                </m:r>
-                              </m:sub>
-                            </m:sSub>
-                            <m:r>
-                              <a:rPr lang="en-US" sz="1400" b="1" i="1" dirty="0">
-                                <a:latin typeface="Cambria Math" panose="02040503050406030204" pitchFamily="18" charset="0"/>
-                                <a:ea typeface="Cambria Math" panose="02040503050406030204" pitchFamily="18" charset="0"/>
-                              </a:rPr>
-                              <m:t>⊕</m:t>
-                            </m:r>
-                            <m:r>
-                              <a:rPr lang="en-US" sz="1400" b="1" dirty="0">
-                                <a:latin typeface="Cambria Math" panose="02040503050406030204" pitchFamily="18" charset="0"/>
-                                <a:ea typeface="Cambria Math" panose="02040503050406030204" pitchFamily="18" charset="0"/>
-                              </a:rPr>
-                              <m:t>𝐂𝐭𝐱𝐭</m:t>
-                            </m:r>
-                          </m:e>
-                        </m:d>
-                        <m:r>
-                          <a:rPr lang="en-US" sz="1400" i="1" dirty="0">
-                            <a:latin typeface="Cambria Math" panose="02040503050406030204" pitchFamily="18" charset="0"/>
-                            <a:ea typeface="Cambria Math" panose="02040503050406030204" pitchFamily="18" charset="0"/>
-                          </a:rPr>
-                          <m:t> </m:t>
-                        </m:r>
-                      </m:oMath>
-                    </m:oMathPara>
-                  </a14:m>
-                  <a:endParaRPr lang="en-US" sz="1400" baseline="30000" dirty="0">
-                    <a:latin typeface="Cambria Math" panose="02040503050406030204" pitchFamily="18" charset="0"/>
-                    <a:ea typeface="Cambria Math" panose="02040503050406030204" pitchFamily="18" charset="0"/>
-                  </a:endParaRPr>
-                </a:p>
-              </p:txBody>
-            </p:sp>
-          </mc:Choice>
-          <mc:Fallback xmlns="">
-            <p:sp>
-              <p:nvSpPr>
-                <p:cNvPr id="56" name="TextBox 55">
-                  <a:extLst>
-                    <a:ext uri="{FF2B5EF4-FFF2-40B4-BE49-F238E27FC236}">
-                      <a16:creationId xmlns:a16="http://schemas.microsoft.com/office/drawing/2014/main" id="{5AA5BA2F-A974-BE4B-AA80-F1688BA20308}"/>
-                    </a:ext>
-                  </a:extLst>
-                </p:cNvPr>
-                <p:cNvSpPr txBox="1">
-                  <a:spLocks noRot="1" noChangeAspect="1" noMove="1" noResize="1" noEditPoints="1" noAdjustHandles="1" noChangeArrowheads="1" noChangeShapeType="1" noTextEdit="1"/>
-                </p:cNvSpPr>
-                <p:nvPr/>
-              </p:nvSpPr>
-              <p:spPr>
-                <a:xfrm>
-                  <a:off x="3901541" y="3280163"/>
-                  <a:ext cx="5726119" cy="371384"/>
-                </a:xfrm>
-                <a:prstGeom prst="rect">
-                  <a:avLst/>
-                </a:prstGeom>
-                <a:blipFill>
-                  <a:blip r:embed="rId10"/>
-                  <a:stretch>
-                    <a:fillRect/>
-                  </a:stretch>
-                </a:blipFill>
-              </p:spPr>
-              <p:txBody>
-                <a:bodyPr/>
-                <a:lstStyle/>
-                <a:p>
-                  <a:r>
-                    <a:rPr lang="en-US">
-                      <a:noFill/>
-                    </a:rPr>
-                    <a:t> </a:t>
-                  </a:r>
-                </a:p>
-              </p:txBody>
-            </p:sp>
-          </mc:Fallback>
-        </mc:AlternateContent>
-        <mc:AlternateContent xmlns:mc="http://schemas.openxmlformats.org/markup-compatibility/2006" xmlns:a14="http://schemas.microsoft.com/office/drawing/2010/main">
-          <mc:Choice Requires="a14">
-            <p:sp>
-              <p:nvSpPr>
-                <p:cNvPr id="57" name="TextBox 56">
-                  <a:extLst>
-                    <a:ext uri="{FF2B5EF4-FFF2-40B4-BE49-F238E27FC236}">
-                      <a16:creationId xmlns:a16="http://schemas.microsoft.com/office/drawing/2014/main" id="{AAF83BE7-164A-0840-B467-EDBE615BE96D}"/>
-                    </a:ext>
-                  </a:extLst>
-                </p:cNvPr>
-                <p:cNvSpPr txBox="1"/>
-                <p:nvPr/>
-              </p:nvSpPr>
-              <p:spPr>
-                <a:xfrm rot="16200000">
-                  <a:off x="6504599" y="2994863"/>
-                  <a:ext cx="552669" cy="346249"/>
-                </a:xfrm>
-                <a:prstGeom prst="rect">
-                  <a:avLst/>
-                </a:prstGeom>
-                <a:noFill/>
-              </p:spPr>
-              <p:txBody>
-                <a:bodyPr wrap="square" lIns="0" tIns="0" rIns="0" bIns="0" rtlCol="0">
-                  <a:spAutoFit/>
-                </a:bodyPr>
-                <a:lstStyle/>
-                <a:p>
-                  <a:pPr/>
-                  <a14:m>
-                    <m:oMathPara xmlns:m="http://schemas.openxmlformats.org/officeDocument/2006/math">
-                      <m:oMathParaPr>
-                        <m:jc m:val="centerGroup"/>
-                      </m:oMathParaPr>
-                      <m:oMath xmlns:m="http://schemas.openxmlformats.org/officeDocument/2006/math">
-                        <m:r>
-                          <a:rPr lang="en-US" sz="2250" b="1" i="1">
-                            <a:latin typeface="Cambria Math" panose="02040503050406030204" pitchFamily="18" charset="0"/>
-                            <a:ea typeface="Cambria Math" panose="02040503050406030204" pitchFamily="18" charset="0"/>
-                            <a:cs typeface="Cambria Math" charset="0"/>
-                          </a:rPr>
-                          <m:t>⊑</m:t>
-                        </m:r>
-                      </m:oMath>
-                    </m:oMathPara>
-                  </a14:m>
-                  <a:endParaRPr lang="en-US" sz="2250" b="1" dirty="0">
-                    <a:latin typeface="Cambria Math" panose="02040503050406030204" pitchFamily="18" charset="0"/>
-                    <a:ea typeface="Cambria Math" panose="02040503050406030204" pitchFamily="18" charset="0"/>
-                  </a:endParaRPr>
-                </a:p>
-              </p:txBody>
-            </p:sp>
-          </mc:Choice>
-          <mc:Fallback xmlns="">
-            <p:sp>
-              <p:nvSpPr>
-                <p:cNvPr id="57" name="TextBox 56">
-                  <a:extLst>
-                    <a:ext uri="{FF2B5EF4-FFF2-40B4-BE49-F238E27FC236}">
-                      <a16:creationId xmlns:a16="http://schemas.microsoft.com/office/drawing/2014/main" id="{AAF83BE7-164A-0840-B467-EDBE615BE96D}"/>
-                    </a:ext>
-                  </a:extLst>
-                </p:cNvPr>
-                <p:cNvSpPr txBox="1">
-                  <a:spLocks noRot="1" noChangeAspect="1" noMove="1" noResize="1" noEditPoints="1" noAdjustHandles="1" noChangeArrowheads="1" noChangeShapeType="1" noTextEdit="1"/>
-                </p:cNvSpPr>
-                <p:nvPr/>
-              </p:nvSpPr>
-              <p:spPr>
-                <a:xfrm rot="16200000">
-                  <a:off x="6504599" y="2994863"/>
-                  <a:ext cx="552669" cy="346249"/>
-                </a:xfrm>
-                <a:prstGeom prst="rect">
-                  <a:avLst/>
-                </a:prstGeom>
-                <a:blipFill>
-                  <a:blip r:embed="rId11"/>
-                  <a:stretch>
-                    <a:fillRect r="-3571"/>
-                  </a:stretch>
-                </a:blipFill>
-              </p:spPr>
-              <p:txBody>
-                <a:bodyPr/>
-                <a:lstStyle/>
-                <a:p>
-                  <a:r>
-                    <a:rPr lang="en-US">
-                      <a:noFill/>
-                    </a:rPr>
-                    <a:t> </a:t>
-                  </a:r>
-                </a:p>
-              </p:txBody>
-            </p:sp>
-          </mc:Fallback>
-        </mc:AlternateContent>
-        <mc:AlternateContent xmlns:mc="http://schemas.openxmlformats.org/markup-compatibility/2006" xmlns:a14="http://schemas.microsoft.com/office/drawing/2010/main">
-          <mc:Choice Requires="a14">
-            <p:sp>
-              <p:nvSpPr>
-                <p:cNvPr id="58" name="TextBox 57">
-                  <a:extLst>
-                    <a:ext uri="{FF2B5EF4-FFF2-40B4-BE49-F238E27FC236}">
-                      <a16:creationId xmlns:a16="http://schemas.microsoft.com/office/drawing/2014/main" id="{CDB6750F-B87F-A348-9880-D146DDB4917F}"/>
-                    </a:ext>
-                  </a:extLst>
-                </p:cNvPr>
-                <p:cNvSpPr txBox="1"/>
-                <p:nvPr/>
-              </p:nvSpPr>
-              <p:spPr>
-                <a:xfrm>
-                  <a:off x="4281261" y="2723184"/>
-                  <a:ext cx="4966681" cy="339708"/>
-                </a:xfrm>
-                <a:prstGeom prst="rect">
-                  <a:avLst/>
-                </a:prstGeom>
-                <a:noFill/>
-              </p:spPr>
-              <p:txBody>
-                <a:bodyPr wrap="none" rtlCol="0">
-                  <a:spAutoFit/>
-                </a:bodyPr>
-                <a:lstStyle/>
-                <a:p>
-                  <a:pPr/>
-                  <a14:m>
-                    <m:oMathPara xmlns:m="http://schemas.openxmlformats.org/officeDocument/2006/math">
-                      <m:oMathParaPr>
-                        <m:jc m:val="centerGroup"/>
-                      </m:oMathParaPr>
-                      <m:oMath xmlns:m="http://schemas.openxmlformats.org/officeDocument/2006/math">
-                        <m:sSub>
-                          <m:sSubPr>
-                            <m:ctrlPr>
-                              <a:rPr lang="en-US" sz="1400" i="1" smtClean="0">
-                                <a:latin typeface="Cambria Math" panose="02040503050406030204" pitchFamily="18" charset="0"/>
-                                <a:ea typeface="Cambria Math" panose="02040503050406030204" pitchFamily="18" charset="0"/>
-                              </a:rPr>
-                            </m:ctrlPr>
-                          </m:sSubPr>
-                          <m:e>
-                            <m:r>
-                              <m:rPr>
-                                <m:sty m:val="p"/>
-                              </m:rPr>
-                              <a:rPr lang="en-US" sz="1400">
-                                <a:latin typeface="Cambria Math" panose="02040503050406030204" pitchFamily="18" charset="0"/>
-                                <a:ea typeface="Cambria Math" panose="02040503050406030204" pitchFamily="18" charset="0"/>
-                              </a:rPr>
-                              <m:t>Mach</m:t>
-                            </m:r>
-                          </m:e>
-                          <m:sub>
-                            <m:r>
-                              <m:rPr>
-                                <m:sty m:val="p"/>
-                              </m:rPr>
-                              <a:rPr lang="en-US" sz="1400" b="0" i="0" smtClean="0">
-                                <a:latin typeface="Cambria Math" panose="02040503050406030204" pitchFamily="18" charset="0"/>
-                                <a:ea typeface="Cambria Math" panose="02040503050406030204" pitchFamily="18" charset="0"/>
-                              </a:rPr>
-                              <m:t>IEAsm</m:t>
-                            </m:r>
-                          </m:sub>
-                        </m:sSub>
-                        <m:r>
-                          <a:rPr lang="en-US" sz="1400">
-                            <a:latin typeface="Cambria Math" panose="02040503050406030204" pitchFamily="18" charset="0"/>
-                            <a:ea typeface="Cambria Math" panose="02040503050406030204" pitchFamily="18" charset="0"/>
-                          </a:rPr>
-                          <m:t>(</m:t>
-                        </m:r>
-                        <m:r>
-                          <m:rPr>
-                            <m:sty m:val="p"/>
-                          </m:rPr>
-                          <a:rPr lang="en-US" sz="1400">
-                            <a:latin typeface="Cambria Math" panose="02040503050406030204" pitchFamily="18" charset="0"/>
-                            <a:ea typeface="Cambria Math" panose="02040503050406030204" pitchFamily="18" charset="0"/>
-                          </a:rPr>
-                          <m:t>PHBThrd</m:t>
-                        </m:r>
-                        <m:d>
-                          <m:dPr>
-                            <m:begChr m:val="["/>
-                            <m:endChr m:val="]"/>
-                            <m:ctrlPr>
-                              <a:rPr lang="en-US" sz="1400" i="1">
-                                <a:latin typeface="Cambria Math" panose="02040503050406030204" pitchFamily="18" charset="0"/>
-                                <a:ea typeface="Cambria Math" panose="02040503050406030204" pitchFamily="18" charset="0"/>
-                              </a:rPr>
-                            </m:ctrlPr>
-                          </m:dPr>
-                          <m:e>
-                            <m:r>
-                              <a:rPr lang="en-US" sz="1400" b="0" i="1" smtClean="0">
-                                <a:latin typeface="Cambria Math" panose="02040503050406030204" pitchFamily="18" charset="0"/>
-                                <a:ea typeface="Cambria Math" panose="02040503050406030204" pitchFamily="18" charset="0"/>
-                              </a:rPr>
-                              <m:t>𝑡𝑖𝑑</m:t>
-                            </m:r>
-                            <m:r>
-                              <a:rPr lang="en-US" sz="1400" b="0" i="1" smtClean="0">
-                                <a:latin typeface="Cambria Math" panose="02040503050406030204" pitchFamily="18" charset="0"/>
-                                <a:ea typeface="Cambria Math" panose="02040503050406030204" pitchFamily="18" charset="0"/>
-                              </a:rPr>
-                              <m:t>,</m:t>
-                            </m:r>
-                            <m:sSubSup>
-                              <m:sSubSupPr>
-                                <m:ctrlPr>
-                                  <a:rPr lang="en-US" sz="1400" i="1">
-                                    <a:latin typeface="Cambria Math" panose="02040503050406030204" pitchFamily="18" charset="0"/>
-                                    <a:ea typeface="Cambria Math" panose="02040503050406030204" pitchFamily="18" charset="0"/>
-                                  </a:rPr>
-                                </m:ctrlPr>
-                              </m:sSubSupPr>
-                              <m:e>
-                                <m:r>
-                                  <a:rPr lang="en-US" sz="1400" i="1">
-                                    <a:latin typeface="Cambria Math" panose="02040503050406030204" pitchFamily="18" charset="0"/>
-                                    <a:ea typeface="Cambria Math" panose="02040503050406030204" pitchFamily="18" charset="0"/>
-                                  </a:rPr>
-                                  <m:t>𝜀</m:t>
-                                </m:r>
-                              </m:e>
-                              <m:sub>
-                                <m:r>
-                                  <a:rPr lang="en-US" sz="1400" i="1">
-                                    <a:latin typeface="Cambria Math" panose="02040503050406030204" pitchFamily="18" charset="0"/>
-                                    <a:ea typeface="Cambria Math" panose="02040503050406030204" pitchFamily="18" charset="0"/>
-                                  </a:rPr>
-                                  <m:t>𝑡𝑖𝑑</m:t>
-                                </m:r>
-                              </m:sub>
-                              <m:sup>
-                                <m:r>
-                                  <a:rPr lang="en-US" sz="1400" i="1">
-                                    <a:latin typeface="Cambria Math" panose="02040503050406030204" pitchFamily="18" charset="0"/>
-                                    <a:ea typeface="Cambria Math" panose="02040503050406030204" pitchFamily="18" charset="0"/>
-                                  </a:rPr>
-                                  <m:t>𝑀𝑇𝐿𝑖𝑛𝑘</m:t>
-                                </m:r>
-                              </m:sup>
-                            </m:sSubSup>
-                          </m:e>
-                        </m:d>
-                        <m:r>
-                          <a:rPr lang="en-US" sz="1400" i="1">
-                            <a:latin typeface="Cambria Math" panose="02040503050406030204" pitchFamily="18" charset="0"/>
-                            <a:ea typeface="Cambria Math" panose="02040503050406030204" pitchFamily="18" charset="0"/>
-                          </a:rPr>
-                          <m:t>)⊢</m:t>
-                        </m:r>
-                        <m:d>
-                          <m:dPr>
-                            <m:begChr m:val="⟦"/>
-                            <m:endChr m:val="⟧"/>
-                            <m:ctrlPr>
-                              <a:rPr lang="en-US" sz="1400" i="1" dirty="0">
-                                <a:latin typeface="Cambria Math" panose="02040503050406030204" pitchFamily="18" charset="0"/>
-                                <a:ea typeface="Cambria Math" panose="02040503050406030204" pitchFamily="18" charset="0"/>
-                              </a:rPr>
-                            </m:ctrlPr>
-                          </m:dPr>
-                          <m:e>
-                            <m:r>
-                              <a:rPr lang="en-US" sz="1400" b="1" dirty="0">
-                                <a:latin typeface="Cambria Math" panose="02040503050406030204" pitchFamily="18" charset="0"/>
-                                <a:ea typeface="Cambria Math" panose="02040503050406030204" pitchFamily="18" charset="0"/>
-                              </a:rPr>
-                              <m:t>𝐂𝐞𝐫𝐭𝐢𝐊𝐎</m:t>
-                            </m:r>
-                            <m:sSub>
-                              <m:sSubPr>
-                                <m:ctrlPr>
-                                  <a:rPr lang="en-US" sz="1400" b="1" i="1" dirty="0">
-                                    <a:latin typeface="Cambria Math" panose="02040503050406030204" pitchFamily="18" charset="0"/>
-                                    <a:ea typeface="Cambria Math" panose="02040503050406030204" pitchFamily="18" charset="0"/>
-                                  </a:rPr>
-                                </m:ctrlPr>
-                              </m:sSubPr>
-                              <m:e>
-                                <m:r>
-                                  <a:rPr lang="en-US" sz="1400" b="1" dirty="0">
-                                    <a:latin typeface="Cambria Math" panose="02040503050406030204" pitchFamily="18" charset="0"/>
-                                    <a:ea typeface="Cambria Math" panose="02040503050406030204" pitchFamily="18" charset="0"/>
-                                  </a:rPr>
-                                  <m:t>𝐒</m:t>
-                                </m:r>
-                              </m:e>
-                              <m:sub>
-                                <m:r>
-                                  <a:rPr lang="en-US" sz="1400" b="1" dirty="0">
-                                    <a:latin typeface="Cambria Math" panose="02040503050406030204" pitchFamily="18" charset="0"/>
-                                    <a:ea typeface="Cambria Math" panose="02040503050406030204" pitchFamily="18" charset="0"/>
-                                  </a:rPr>
-                                  <m:t>𝐭𝐡𝐫𝐝</m:t>
-                                </m:r>
-                              </m:sub>
-                            </m:sSub>
-                            <m:r>
-                              <a:rPr lang="en-US" sz="1400" b="1" i="1" dirty="0">
-                                <a:latin typeface="Cambria Math" panose="02040503050406030204" pitchFamily="18" charset="0"/>
-                                <a:ea typeface="Cambria Math" panose="02040503050406030204" pitchFamily="18" charset="0"/>
-                              </a:rPr>
-                              <m:t>⊕</m:t>
-                            </m:r>
-                            <m:r>
-                              <a:rPr lang="en-US" sz="1400" b="1" dirty="0">
-                                <a:latin typeface="Cambria Math" panose="02040503050406030204" pitchFamily="18" charset="0"/>
-                                <a:ea typeface="Cambria Math" panose="02040503050406030204" pitchFamily="18" charset="0"/>
-                              </a:rPr>
-                              <m:t>𝐂𝐭𝐱𝐭</m:t>
-                            </m:r>
-                          </m:e>
-                        </m:d>
-                        <m:r>
-                          <a:rPr lang="en-US" sz="1400" i="1" dirty="0">
-                            <a:latin typeface="Cambria Math" panose="02040503050406030204" pitchFamily="18" charset="0"/>
-                            <a:ea typeface="Cambria Math" panose="02040503050406030204" pitchFamily="18" charset="0"/>
-                          </a:rPr>
-                          <m:t> </m:t>
-                        </m:r>
-                      </m:oMath>
-                    </m:oMathPara>
-                  </a14:m>
-                  <a:endParaRPr lang="en-US" sz="1400" baseline="30000" dirty="0">
-                    <a:latin typeface="Cambria Math" panose="02040503050406030204" pitchFamily="18" charset="0"/>
-                    <a:ea typeface="Cambria Math" panose="02040503050406030204" pitchFamily="18" charset="0"/>
-                  </a:endParaRPr>
-                </a:p>
-              </p:txBody>
-            </p:sp>
-          </mc:Choice>
-          <mc:Fallback xmlns="">
-            <p:sp>
-              <p:nvSpPr>
-                <p:cNvPr id="58" name="TextBox 57">
-                  <a:extLst>
-                    <a:ext uri="{FF2B5EF4-FFF2-40B4-BE49-F238E27FC236}">
-                      <a16:creationId xmlns:a16="http://schemas.microsoft.com/office/drawing/2014/main" id="{CDB6750F-B87F-A348-9880-D146DDB4917F}"/>
-                    </a:ext>
-                  </a:extLst>
-                </p:cNvPr>
-                <p:cNvSpPr txBox="1">
-                  <a:spLocks noRot="1" noChangeAspect="1" noMove="1" noResize="1" noEditPoints="1" noAdjustHandles="1" noChangeArrowheads="1" noChangeShapeType="1" noTextEdit="1"/>
-                </p:cNvSpPr>
-                <p:nvPr/>
-              </p:nvSpPr>
-              <p:spPr>
-                <a:xfrm>
-                  <a:off x="4281261" y="2723184"/>
-                  <a:ext cx="4966681" cy="339708"/>
-                </a:xfrm>
-                <a:prstGeom prst="rect">
-                  <a:avLst/>
-                </a:prstGeom>
-                <a:blipFill>
-                  <a:blip r:embed="rId12"/>
-                  <a:stretch>
-                    <a:fillRect b="-3571"/>
-                  </a:stretch>
-                </a:blipFill>
-              </p:spPr>
-              <p:txBody>
-                <a:bodyPr/>
-                <a:lstStyle/>
-                <a:p>
-                  <a:r>
-                    <a:rPr lang="en-US">
-                      <a:noFill/>
-                    </a:rPr>
-                    <a:t> </a:t>
-                  </a:r>
-                </a:p>
-              </p:txBody>
-            </p:sp>
-          </mc:Fallback>
-        </mc:AlternateContent>
-        <mc:AlternateContent xmlns:mc="http://schemas.openxmlformats.org/markup-compatibility/2006" xmlns:a14="http://schemas.microsoft.com/office/drawing/2010/main">
-          <mc:Choice Requires="a14">
-            <p:sp>
-              <p:nvSpPr>
-                <p:cNvPr id="59" name="TextBox 58">
-                  <a:extLst>
-                    <a:ext uri="{FF2B5EF4-FFF2-40B4-BE49-F238E27FC236}">
-                      <a16:creationId xmlns:a16="http://schemas.microsoft.com/office/drawing/2014/main" id="{7194CE62-850A-EB42-BCD6-38B28CA7FAA7}"/>
-                    </a:ext>
-                  </a:extLst>
-                </p:cNvPr>
-                <p:cNvSpPr txBox="1"/>
-                <p:nvPr/>
-              </p:nvSpPr>
-              <p:spPr>
-                <a:xfrm>
-                  <a:off x="4313674" y="2099196"/>
-                  <a:ext cx="4920193" cy="339708"/>
-                </a:xfrm>
-                <a:prstGeom prst="rect">
-                  <a:avLst/>
-                </a:prstGeom>
-                <a:noFill/>
-              </p:spPr>
-              <p:txBody>
-                <a:bodyPr wrap="none" rtlCol="0">
-                  <a:spAutoFit/>
-                </a:bodyPr>
-                <a:lstStyle/>
-                <a:p>
-                  <a:pPr/>
-                  <a14:m>
-                    <m:oMathPara xmlns:m="http://schemas.openxmlformats.org/officeDocument/2006/math">
-                      <m:oMathParaPr>
-                        <m:jc m:val="centerGroup"/>
-                      </m:oMathParaPr>
-                      <m:oMath xmlns:m="http://schemas.openxmlformats.org/officeDocument/2006/math">
-                        <m:sSub>
-                          <m:sSubPr>
-                            <m:ctrlPr>
-                              <a:rPr lang="en-US" sz="1400" i="1" smtClean="0">
-                                <a:latin typeface="Cambria Math" panose="02040503050406030204" pitchFamily="18" charset="0"/>
-                                <a:ea typeface="Cambria Math" panose="02040503050406030204" pitchFamily="18" charset="0"/>
-                              </a:rPr>
-                            </m:ctrlPr>
-                          </m:sSubPr>
-                          <m:e>
-                            <m:r>
-                              <m:rPr>
-                                <m:sty m:val="p"/>
-                              </m:rPr>
-                              <a:rPr lang="en-US" sz="1400">
-                                <a:latin typeface="Cambria Math" panose="02040503050406030204" pitchFamily="18" charset="0"/>
-                                <a:ea typeface="Cambria Math" panose="02040503050406030204" pitchFamily="18" charset="0"/>
-                              </a:rPr>
-                              <m:t>Mach</m:t>
-                            </m:r>
-                          </m:e>
-                          <m:sub>
-                            <m:r>
-                              <m:rPr>
-                                <m:sty m:val="p"/>
-                              </m:rPr>
-                              <a:rPr lang="en-US" sz="1400" b="0" i="0" smtClean="0">
-                                <a:latin typeface="Cambria Math" panose="02040503050406030204" pitchFamily="18" charset="0"/>
-                                <a:ea typeface="Cambria Math" panose="02040503050406030204" pitchFamily="18" charset="0"/>
-                              </a:rPr>
-                              <m:t>TAsm</m:t>
-                            </m:r>
-                          </m:sub>
-                        </m:sSub>
-                        <m:r>
-                          <a:rPr lang="en-US" sz="1400">
-                            <a:latin typeface="Cambria Math" panose="02040503050406030204" pitchFamily="18" charset="0"/>
-                            <a:ea typeface="Cambria Math" panose="02040503050406030204" pitchFamily="18" charset="0"/>
-                          </a:rPr>
-                          <m:t>(</m:t>
-                        </m:r>
-                        <m:r>
-                          <m:rPr>
-                            <m:sty m:val="p"/>
-                          </m:rPr>
-                          <a:rPr lang="en-US" sz="1400">
-                            <a:latin typeface="Cambria Math" panose="02040503050406030204" pitchFamily="18" charset="0"/>
-                            <a:ea typeface="Cambria Math" panose="02040503050406030204" pitchFamily="18" charset="0"/>
-                          </a:rPr>
-                          <m:t>PHBThrd</m:t>
-                        </m:r>
-                        <m:d>
-                          <m:dPr>
-                            <m:begChr m:val="["/>
-                            <m:endChr m:val="]"/>
-                            <m:ctrlPr>
-                              <a:rPr lang="en-US" sz="1400" i="1">
-                                <a:latin typeface="Cambria Math" panose="02040503050406030204" pitchFamily="18" charset="0"/>
-                                <a:ea typeface="Cambria Math" panose="02040503050406030204" pitchFamily="18" charset="0"/>
-                              </a:rPr>
-                            </m:ctrlPr>
-                          </m:dPr>
-                          <m:e>
-                            <m:r>
-                              <a:rPr lang="en-US" sz="1400" b="0" i="1" smtClean="0">
-                                <a:latin typeface="Cambria Math" panose="02040503050406030204" pitchFamily="18" charset="0"/>
-                                <a:ea typeface="Cambria Math" panose="02040503050406030204" pitchFamily="18" charset="0"/>
-                              </a:rPr>
-                              <m:t>𝑡𝑖𝑑</m:t>
-                            </m:r>
-                            <m:r>
-                              <a:rPr lang="en-US" sz="1400" b="0" i="1" smtClean="0">
-                                <a:latin typeface="Cambria Math" panose="02040503050406030204" pitchFamily="18" charset="0"/>
-                                <a:ea typeface="Cambria Math" panose="02040503050406030204" pitchFamily="18" charset="0"/>
-                              </a:rPr>
-                              <m:t>,</m:t>
-                            </m:r>
-                            <m:sSubSup>
-                              <m:sSubSupPr>
-                                <m:ctrlPr>
-                                  <a:rPr lang="en-US" sz="1400" i="1">
-                                    <a:latin typeface="Cambria Math" panose="02040503050406030204" pitchFamily="18" charset="0"/>
-                                    <a:ea typeface="Cambria Math" panose="02040503050406030204" pitchFamily="18" charset="0"/>
-                                  </a:rPr>
-                                </m:ctrlPr>
-                              </m:sSubSupPr>
-                              <m:e>
-                                <m:r>
-                                  <a:rPr lang="en-US" sz="1400" i="1">
-                                    <a:latin typeface="Cambria Math" panose="02040503050406030204" pitchFamily="18" charset="0"/>
-                                    <a:ea typeface="Cambria Math" panose="02040503050406030204" pitchFamily="18" charset="0"/>
-                                  </a:rPr>
-                                  <m:t>𝜀</m:t>
-                                </m:r>
-                              </m:e>
-                              <m:sub>
-                                <m:r>
-                                  <a:rPr lang="en-US" sz="1400" i="1">
-                                    <a:latin typeface="Cambria Math" panose="02040503050406030204" pitchFamily="18" charset="0"/>
-                                    <a:ea typeface="Cambria Math" panose="02040503050406030204" pitchFamily="18" charset="0"/>
-                                  </a:rPr>
-                                  <m:t>𝑡𝑖𝑑</m:t>
-                                </m:r>
-                              </m:sub>
-                              <m:sup>
-                                <m:r>
-                                  <a:rPr lang="en-US" sz="1400" i="1">
-                                    <a:latin typeface="Cambria Math" panose="02040503050406030204" pitchFamily="18" charset="0"/>
-                                    <a:ea typeface="Cambria Math" panose="02040503050406030204" pitchFamily="18" charset="0"/>
-                                  </a:rPr>
-                                  <m:t>𝑀𝑇𝐿𝑖𝑛𝑘</m:t>
-                                </m:r>
-                              </m:sup>
-                            </m:sSubSup>
-                          </m:e>
-                        </m:d>
-                        <m:r>
-                          <a:rPr lang="en-US" sz="1400" i="1">
-                            <a:latin typeface="Cambria Math" panose="02040503050406030204" pitchFamily="18" charset="0"/>
-                            <a:ea typeface="Cambria Math" panose="02040503050406030204" pitchFamily="18" charset="0"/>
-                          </a:rPr>
-                          <m:t>)⊢</m:t>
-                        </m:r>
-                        <m:d>
-                          <m:dPr>
-                            <m:begChr m:val="⟦"/>
-                            <m:endChr m:val="⟧"/>
-                            <m:ctrlPr>
-                              <a:rPr lang="en-US" sz="1400" i="1" dirty="0">
-                                <a:latin typeface="Cambria Math" panose="02040503050406030204" pitchFamily="18" charset="0"/>
-                                <a:ea typeface="Cambria Math" panose="02040503050406030204" pitchFamily="18" charset="0"/>
-                              </a:rPr>
-                            </m:ctrlPr>
-                          </m:dPr>
-                          <m:e>
-                            <m:r>
-                              <a:rPr lang="en-US" sz="1400" b="1" dirty="0">
-                                <a:latin typeface="Cambria Math" panose="02040503050406030204" pitchFamily="18" charset="0"/>
-                                <a:ea typeface="Cambria Math" panose="02040503050406030204" pitchFamily="18" charset="0"/>
-                              </a:rPr>
-                              <m:t>𝐂𝐞𝐫𝐭𝐢𝐊𝐎</m:t>
-                            </m:r>
-                            <m:sSub>
-                              <m:sSubPr>
-                                <m:ctrlPr>
-                                  <a:rPr lang="en-US" sz="1400" b="1" i="1" dirty="0">
-                                    <a:latin typeface="Cambria Math" panose="02040503050406030204" pitchFamily="18" charset="0"/>
-                                    <a:ea typeface="Cambria Math" panose="02040503050406030204" pitchFamily="18" charset="0"/>
-                                  </a:rPr>
-                                </m:ctrlPr>
-                              </m:sSubPr>
-                              <m:e>
-                                <m:r>
-                                  <a:rPr lang="en-US" sz="1400" b="1" dirty="0">
-                                    <a:latin typeface="Cambria Math" panose="02040503050406030204" pitchFamily="18" charset="0"/>
-                                    <a:ea typeface="Cambria Math" panose="02040503050406030204" pitchFamily="18" charset="0"/>
-                                  </a:rPr>
-                                  <m:t>𝐒</m:t>
-                                </m:r>
-                              </m:e>
-                              <m:sub>
-                                <m:r>
-                                  <a:rPr lang="en-US" sz="1400" b="1" dirty="0">
-                                    <a:latin typeface="Cambria Math" panose="02040503050406030204" pitchFamily="18" charset="0"/>
-                                    <a:ea typeface="Cambria Math" panose="02040503050406030204" pitchFamily="18" charset="0"/>
-                                  </a:rPr>
-                                  <m:t>𝐭𝐡𝐫𝐝</m:t>
-                                </m:r>
-                              </m:sub>
-                            </m:sSub>
-                            <m:r>
-                              <a:rPr lang="en-US" sz="1400" b="1" i="1" dirty="0">
-                                <a:latin typeface="Cambria Math" panose="02040503050406030204" pitchFamily="18" charset="0"/>
-                                <a:ea typeface="Cambria Math" panose="02040503050406030204" pitchFamily="18" charset="0"/>
-                              </a:rPr>
-                              <m:t>⊕</m:t>
-                            </m:r>
-                            <m:r>
-                              <a:rPr lang="en-US" sz="1400" b="1" dirty="0">
-                                <a:latin typeface="Cambria Math" panose="02040503050406030204" pitchFamily="18" charset="0"/>
-                                <a:ea typeface="Cambria Math" panose="02040503050406030204" pitchFamily="18" charset="0"/>
-                              </a:rPr>
-                              <m:t>𝐂𝐭𝐱𝐭</m:t>
-                            </m:r>
-                          </m:e>
-                        </m:d>
-                        <m:r>
-                          <a:rPr lang="en-US" sz="1400" i="1" dirty="0">
-                            <a:latin typeface="Cambria Math" panose="02040503050406030204" pitchFamily="18" charset="0"/>
-                            <a:ea typeface="Cambria Math" panose="02040503050406030204" pitchFamily="18" charset="0"/>
-                          </a:rPr>
-                          <m:t> </m:t>
-                        </m:r>
-                      </m:oMath>
-                    </m:oMathPara>
-                  </a14:m>
-                  <a:endParaRPr lang="en-US" sz="1400" baseline="30000" dirty="0">
-                    <a:latin typeface="Cambria Math" panose="02040503050406030204" pitchFamily="18" charset="0"/>
-                    <a:ea typeface="Cambria Math" panose="02040503050406030204" pitchFamily="18" charset="0"/>
-                  </a:endParaRPr>
-                </a:p>
-              </p:txBody>
-            </p:sp>
-          </mc:Choice>
-          <mc:Fallback xmlns="">
-            <p:sp>
-              <p:nvSpPr>
-                <p:cNvPr id="59" name="TextBox 58">
-                  <a:extLst>
-                    <a:ext uri="{FF2B5EF4-FFF2-40B4-BE49-F238E27FC236}">
-                      <a16:creationId xmlns:a16="http://schemas.microsoft.com/office/drawing/2014/main" id="{7194CE62-850A-EB42-BCD6-38B28CA7FAA7}"/>
-                    </a:ext>
-                  </a:extLst>
-                </p:cNvPr>
-                <p:cNvSpPr txBox="1">
-                  <a:spLocks noRot="1" noChangeAspect="1" noMove="1" noResize="1" noEditPoints="1" noAdjustHandles="1" noChangeArrowheads="1" noChangeShapeType="1" noTextEdit="1"/>
-                </p:cNvSpPr>
-                <p:nvPr/>
-              </p:nvSpPr>
-              <p:spPr>
-                <a:xfrm>
-                  <a:off x="4313674" y="2099196"/>
-                  <a:ext cx="4920193" cy="339708"/>
-                </a:xfrm>
-                <a:prstGeom prst="rect">
-                  <a:avLst/>
-                </a:prstGeom>
-                <a:blipFill>
-                  <a:blip r:embed="rId13"/>
-                  <a:stretch>
-                    <a:fillRect b="-7407"/>
-                  </a:stretch>
-                </a:blipFill>
-              </p:spPr>
-              <p:txBody>
-                <a:bodyPr/>
-                <a:lstStyle/>
-                <a:p>
-                  <a:r>
-                    <a:rPr lang="en-US">
-                      <a:noFill/>
-                    </a:rPr>
-                    <a:t> </a:t>
-                  </a:r>
-                </a:p>
-              </p:txBody>
-            </p:sp>
-          </mc:Fallback>
-        </mc:AlternateContent>
-      </p:grpSp>
+      <mc:AlternateContent xmlns:mc="http://schemas.openxmlformats.org/markup-compatibility/2006" xmlns:a14="http://schemas.microsoft.com/office/drawing/2010/main">
+        <mc:Choice Requires="a14">
+          <p:sp>
+            <p:nvSpPr>
+              <p:cNvPr id="50" name="TextBox 49">
+                <a:extLst>
+                  <a:ext uri="{FF2B5EF4-FFF2-40B4-BE49-F238E27FC236}">
+                    <a16:creationId xmlns:a16="http://schemas.microsoft.com/office/drawing/2014/main" id="{5E562659-E130-0F4B-9614-545D7C02C94D}"/>
+                  </a:ext>
+                </a:extLst>
+              </p:cNvPr>
+              <p:cNvSpPr txBox="1"/>
+              <p:nvPr/>
+            </p:nvSpPr>
+            <p:spPr>
+              <a:xfrm rot="16200000">
+                <a:off x="5786814" y="3042620"/>
+                <a:ext cx="552669" cy="346249"/>
+              </a:xfrm>
+              <a:prstGeom prst="rect">
+                <a:avLst/>
+              </a:prstGeom>
+              <a:noFill/>
+            </p:spPr>
+            <p:txBody>
+              <a:bodyPr wrap="square" lIns="0" tIns="0" rIns="0" bIns="0" rtlCol="0">
+                <a:spAutoFit/>
+              </a:bodyPr>
+              <a:lstStyle/>
+              <a:p>
+                <a:pPr/>
+                <a14:m>
+                  <m:oMathPara xmlns:m="http://schemas.openxmlformats.org/officeDocument/2006/math">
+                    <m:oMathParaPr>
+                      <m:jc m:val="centerGroup"/>
+                    </m:oMathParaPr>
+                    <m:oMath xmlns:m="http://schemas.openxmlformats.org/officeDocument/2006/math">
+                      <m:r>
+                        <a:rPr lang="en-US" sz="2250" b="1" i="1">
+                          <a:latin typeface="Cambria Math" panose="02040503050406030204" pitchFamily="18" charset="0"/>
+                          <a:ea typeface="Cambria Math" panose="02040503050406030204" pitchFamily="18" charset="0"/>
+                          <a:cs typeface="Cambria Math" charset="0"/>
+                        </a:rPr>
+                        <m:t>⊑</m:t>
+                      </m:r>
+                    </m:oMath>
+                  </m:oMathPara>
+                </a14:m>
+                <a:endParaRPr lang="en-US" sz="2250" b="1" dirty="0">
+                  <a:latin typeface="Cambria Math" panose="02040503050406030204" pitchFamily="18" charset="0"/>
+                  <a:ea typeface="Cambria Math" panose="02040503050406030204" pitchFamily="18" charset="0"/>
+                </a:endParaRPr>
+              </a:p>
+            </p:txBody>
+          </p:sp>
+        </mc:Choice>
+        <mc:Fallback xmlns="">
+          <p:sp>
+            <p:nvSpPr>
+              <p:cNvPr id="50" name="TextBox 49">
+                <a:extLst>
+                  <a:ext uri="{FF2B5EF4-FFF2-40B4-BE49-F238E27FC236}">
+                    <a16:creationId xmlns:a16="http://schemas.microsoft.com/office/drawing/2014/main" id="{5E562659-E130-0F4B-9614-545D7C02C94D}"/>
+                  </a:ext>
+                </a:extLst>
+              </p:cNvPr>
+              <p:cNvSpPr txBox="1">
+                <a:spLocks noRot="1" noChangeAspect="1" noMove="1" noResize="1" noEditPoints="1" noAdjustHandles="1" noChangeArrowheads="1" noChangeShapeType="1" noTextEdit="1"/>
+              </p:cNvSpPr>
+              <p:nvPr/>
+            </p:nvSpPr>
+            <p:spPr>
+              <a:xfrm rot="16200000">
+                <a:off x="5786814" y="3042620"/>
+                <a:ext cx="552669" cy="346249"/>
+              </a:xfrm>
+              <a:prstGeom prst="rect">
+                <a:avLst/>
+              </a:prstGeom>
+              <a:blipFill>
+                <a:blip r:embed="rId5"/>
+                <a:stretch>
+                  <a:fillRect/>
+                </a:stretch>
+              </a:blipFill>
+            </p:spPr>
+            <p:txBody>
+              <a:bodyPr/>
+              <a:lstStyle/>
+              <a:p>
+                <a:r>
+                  <a:rPr lang="en-US">
+                    <a:noFill/>
+                  </a:rPr>
+                  <a:t> </a:t>
+                </a:r>
+              </a:p>
+            </p:txBody>
+          </p:sp>
+        </mc:Fallback>
+      </mc:AlternateContent>
+      <mc:AlternateContent xmlns:mc="http://schemas.openxmlformats.org/markup-compatibility/2006" xmlns:a14="http://schemas.microsoft.com/office/drawing/2010/main">
+        <mc:Choice Requires="a14">
+          <p:sp>
+            <p:nvSpPr>
+              <p:cNvPr id="51" name="TextBox 50">
+                <a:extLst>
+                  <a:ext uri="{FF2B5EF4-FFF2-40B4-BE49-F238E27FC236}">
+                    <a16:creationId xmlns:a16="http://schemas.microsoft.com/office/drawing/2014/main" id="{AA83BD1F-A2EC-E14E-AD06-CD4F0DAF8410}"/>
+                  </a:ext>
+                </a:extLst>
+              </p:cNvPr>
+              <p:cNvSpPr txBox="1"/>
+              <p:nvPr/>
+            </p:nvSpPr>
+            <p:spPr>
+              <a:xfrm rot="16200000">
+                <a:off x="5793416" y="2554459"/>
+                <a:ext cx="552669" cy="346249"/>
+              </a:xfrm>
+              <a:prstGeom prst="rect">
+                <a:avLst/>
+              </a:prstGeom>
+              <a:noFill/>
+            </p:spPr>
+            <p:txBody>
+              <a:bodyPr wrap="square" lIns="0" tIns="0" rIns="0" bIns="0" rtlCol="0">
+                <a:spAutoFit/>
+              </a:bodyPr>
+              <a:lstStyle/>
+              <a:p>
+                <a:pPr/>
+                <a14:m>
+                  <m:oMathPara xmlns:m="http://schemas.openxmlformats.org/officeDocument/2006/math">
+                    <m:oMathParaPr>
+                      <m:jc m:val="centerGroup"/>
+                    </m:oMathParaPr>
+                    <m:oMath xmlns:m="http://schemas.openxmlformats.org/officeDocument/2006/math">
+                      <m:r>
+                        <a:rPr lang="en-US" sz="2250" b="1" i="1">
+                          <a:latin typeface="Cambria Math" panose="02040503050406030204" pitchFamily="18" charset="0"/>
+                          <a:ea typeface="Cambria Math" panose="02040503050406030204" pitchFamily="18" charset="0"/>
+                          <a:cs typeface="Cambria Math" charset="0"/>
+                        </a:rPr>
+                        <m:t>⊑</m:t>
+                      </m:r>
+                    </m:oMath>
+                  </m:oMathPara>
+                </a14:m>
+                <a:endParaRPr lang="en-US" sz="2250" b="1" dirty="0">
+                  <a:latin typeface="Cambria Math" panose="02040503050406030204" pitchFamily="18" charset="0"/>
+                  <a:ea typeface="Cambria Math" panose="02040503050406030204" pitchFamily="18" charset="0"/>
+                </a:endParaRPr>
+              </a:p>
+            </p:txBody>
+          </p:sp>
+        </mc:Choice>
+        <mc:Fallback xmlns="">
+          <p:sp>
+            <p:nvSpPr>
+              <p:cNvPr id="51" name="TextBox 50">
+                <a:extLst>
+                  <a:ext uri="{FF2B5EF4-FFF2-40B4-BE49-F238E27FC236}">
+                    <a16:creationId xmlns:a16="http://schemas.microsoft.com/office/drawing/2014/main" id="{AA83BD1F-A2EC-E14E-AD06-CD4F0DAF8410}"/>
+                  </a:ext>
+                </a:extLst>
+              </p:cNvPr>
+              <p:cNvSpPr txBox="1">
+                <a:spLocks noRot="1" noChangeAspect="1" noMove="1" noResize="1" noEditPoints="1" noAdjustHandles="1" noChangeArrowheads="1" noChangeShapeType="1" noTextEdit="1"/>
+              </p:cNvSpPr>
+              <p:nvPr/>
+            </p:nvSpPr>
+            <p:spPr>
+              <a:xfrm rot="16200000">
+                <a:off x="5793416" y="2554459"/>
+                <a:ext cx="552669" cy="346249"/>
+              </a:xfrm>
+              <a:prstGeom prst="rect">
+                <a:avLst/>
+              </a:prstGeom>
+              <a:blipFill>
+                <a:blip r:embed="rId6"/>
+                <a:stretch>
+                  <a:fillRect/>
+                </a:stretch>
+              </a:blipFill>
+            </p:spPr>
+            <p:txBody>
+              <a:bodyPr/>
+              <a:lstStyle/>
+              <a:p>
+                <a:r>
+                  <a:rPr lang="en-US">
+                    <a:noFill/>
+                  </a:rPr>
+                  <a:t> </a:t>
+                </a:r>
+              </a:p>
+            </p:txBody>
+          </p:sp>
+        </mc:Fallback>
+      </mc:AlternateContent>
+      <mc:AlternateContent xmlns:mc="http://schemas.openxmlformats.org/markup-compatibility/2006" xmlns:a14="http://schemas.microsoft.com/office/drawing/2010/main">
+        <mc:Choice Requires="a14">
+          <p:sp>
+            <p:nvSpPr>
+              <p:cNvPr id="52" name="TextBox 51">
+                <a:extLst>
+                  <a:ext uri="{FF2B5EF4-FFF2-40B4-BE49-F238E27FC236}">
+                    <a16:creationId xmlns:a16="http://schemas.microsoft.com/office/drawing/2014/main" id="{25109834-2B25-184D-AAAA-907697571C73}"/>
+                  </a:ext>
+                </a:extLst>
+              </p:cNvPr>
+              <p:cNvSpPr txBox="1"/>
+              <p:nvPr/>
+            </p:nvSpPr>
+            <p:spPr>
+              <a:xfrm rot="16200000">
+                <a:off x="5784250" y="1476421"/>
+                <a:ext cx="552669" cy="346249"/>
+              </a:xfrm>
+              <a:prstGeom prst="rect">
+                <a:avLst/>
+              </a:prstGeom>
+              <a:noFill/>
+            </p:spPr>
+            <p:txBody>
+              <a:bodyPr wrap="square" lIns="0" tIns="0" rIns="0" bIns="0" rtlCol="0">
+                <a:spAutoFit/>
+              </a:bodyPr>
+              <a:lstStyle/>
+              <a:p>
+                <a:pPr/>
+                <a14:m>
+                  <m:oMathPara xmlns:m="http://schemas.openxmlformats.org/officeDocument/2006/math">
+                    <m:oMathParaPr>
+                      <m:jc m:val="centerGroup"/>
+                    </m:oMathParaPr>
+                    <m:oMath xmlns:m="http://schemas.openxmlformats.org/officeDocument/2006/math">
+                      <m:r>
+                        <a:rPr lang="en-US" sz="2250" b="1" i="1">
+                          <a:latin typeface="Cambria Math" panose="02040503050406030204" pitchFamily="18" charset="0"/>
+                          <a:ea typeface="Cambria Math" panose="02040503050406030204" pitchFamily="18" charset="0"/>
+                          <a:cs typeface="Cambria Math" charset="0"/>
+                        </a:rPr>
+                        <m:t>⊑</m:t>
+                      </m:r>
+                    </m:oMath>
+                  </m:oMathPara>
+                </a14:m>
+                <a:endParaRPr lang="en-US" sz="2250" b="1" dirty="0">
+                  <a:latin typeface="Cambria Math" panose="02040503050406030204" pitchFamily="18" charset="0"/>
+                  <a:ea typeface="Cambria Math" panose="02040503050406030204" pitchFamily="18" charset="0"/>
+                </a:endParaRPr>
+              </a:p>
+            </p:txBody>
+          </p:sp>
+        </mc:Choice>
+        <mc:Fallback xmlns="">
+          <p:sp>
+            <p:nvSpPr>
+              <p:cNvPr id="52" name="TextBox 51">
+                <a:extLst>
+                  <a:ext uri="{FF2B5EF4-FFF2-40B4-BE49-F238E27FC236}">
+                    <a16:creationId xmlns:a16="http://schemas.microsoft.com/office/drawing/2014/main" id="{25109834-2B25-184D-AAAA-907697571C73}"/>
+                  </a:ext>
+                </a:extLst>
+              </p:cNvPr>
+              <p:cNvSpPr txBox="1">
+                <a:spLocks noRot="1" noChangeAspect="1" noMove="1" noResize="1" noEditPoints="1" noAdjustHandles="1" noChangeArrowheads="1" noChangeShapeType="1" noTextEdit="1"/>
+              </p:cNvSpPr>
+              <p:nvPr/>
+            </p:nvSpPr>
+            <p:spPr>
+              <a:xfrm rot="16200000">
+                <a:off x="5784250" y="1476421"/>
+                <a:ext cx="552669" cy="346249"/>
+              </a:xfrm>
+              <a:prstGeom prst="rect">
+                <a:avLst/>
+              </a:prstGeom>
+              <a:blipFill>
+                <a:blip r:embed="rId7"/>
+                <a:stretch>
+                  <a:fillRect/>
+                </a:stretch>
+              </a:blipFill>
+            </p:spPr>
+            <p:txBody>
+              <a:bodyPr/>
+              <a:lstStyle/>
+              <a:p>
+                <a:r>
+                  <a:rPr lang="en-US">
+                    <a:noFill/>
+                  </a:rPr>
+                  <a:t> </a:t>
+                </a:r>
+              </a:p>
+            </p:txBody>
+          </p:sp>
+        </mc:Fallback>
+      </mc:AlternateContent>
+      <mc:AlternateContent xmlns:mc="http://schemas.openxmlformats.org/markup-compatibility/2006" xmlns:a14="http://schemas.microsoft.com/office/drawing/2010/main">
+        <mc:Choice Requires="a14">
+          <p:sp>
+            <p:nvSpPr>
+              <p:cNvPr id="53" name="TextBox 52">
+                <a:extLst>
+                  <a:ext uri="{FF2B5EF4-FFF2-40B4-BE49-F238E27FC236}">
+                    <a16:creationId xmlns:a16="http://schemas.microsoft.com/office/drawing/2014/main" id="{F2E580FB-B760-7C4A-92CB-D12D033767A2}"/>
+                  </a:ext>
+                </a:extLst>
+              </p:cNvPr>
+              <p:cNvSpPr txBox="1"/>
+              <p:nvPr/>
+            </p:nvSpPr>
+            <p:spPr>
+              <a:xfrm rot="16200000">
+                <a:off x="5784248" y="852874"/>
+                <a:ext cx="552669" cy="346249"/>
+              </a:xfrm>
+              <a:prstGeom prst="rect">
+                <a:avLst/>
+              </a:prstGeom>
+              <a:noFill/>
+            </p:spPr>
+            <p:txBody>
+              <a:bodyPr wrap="square" lIns="0" tIns="0" rIns="0" bIns="0" rtlCol="0">
+                <a:spAutoFit/>
+              </a:bodyPr>
+              <a:lstStyle/>
+              <a:p>
+                <a:pPr/>
+                <a14:m>
+                  <m:oMathPara xmlns:m="http://schemas.openxmlformats.org/officeDocument/2006/math">
+                    <m:oMathParaPr>
+                      <m:jc m:val="centerGroup"/>
+                    </m:oMathParaPr>
+                    <m:oMath xmlns:m="http://schemas.openxmlformats.org/officeDocument/2006/math">
+                      <m:r>
+                        <a:rPr lang="en-US" sz="2250" b="1" i="1">
+                          <a:latin typeface="Cambria Math" panose="02040503050406030204" pitchFamily="18" charset="0"/>
+                          <a:ea typeface="Cambria Math" panose="02040503050406030204" pitchFamily="18" charset="0"/>
+                          <a:cs typeface="Cambria Math" charset="0"/>
+                        </a:rPr>
+                        <m:t>⊑</m:t>
+                      </m:r>
+                    </m:oMath>
+                  </m:oMathPara>
+                </a14:m>
+                <a:endParaRPr lang="en-US" sz="2250" b="1" dirty="0">
+                  <a:latin typeface="Cambria Math" panose="02040503050406030204" pitchFamily="18" charset="0"/>
+                  <a:ea typeface="Cambria Math" panose="02040503050406030204" pitchFamily="18" charset="0"/>
+                </a:endParaRPr>
+              </a:p>
+            </p:txBody>
+          </p:sp>
+        </mc:Choice>
+        <mc:Fallback xmlns="">
+          <p:sp>
+            <p:nvSpPr>
+              <p:cNvPr id="53" name="TextBox 52">
+                <a:extLst>
+                  <a:ext uri="{FF2B5EF4-FFF2-40B4-BE49-F238E27FC236}">
+                    <a16:creationId xmlns:a16="http://schemas.microsoft.com/office/drawing/2014/main" id="{F2E580FB-B760-7C4A-92CB-D12D033767A2}"/>
+                  </a:ext>
+                </a:extLst>
+              </p:cNvPr>
+              <p:cNvSpPr txBox="1">
+                <a:spLocks noRot="1" noChangeAspect="1" noMove="1" noResize="1" noEditPoints="1" noAdjustHandles="1" noChangeArrowheads="1" noChangeShapeType="1" noTextEdit="1"/>
+              </p:cNvSpPr>
+              <p:nvPr/>
+            </p:nvSpPr>
+            <p:spPr>
+              <a:xfrm rot="16200000">
+                <a:off x="5784248" y="852874"/>
+                <a:ext cx="552669" cy="346249"/>
+              </a:xfrm>
+              <a:prstGeom prst="rect">
+                <a:avLst/>
+              </a:prstGeom>
+              <a:blipFill>
+                <a:blip r:embed="rId8"/>
+                <a:stretch>
+                  <a:fillRect/>
+                </a:stretch>
+              </a:blipFill>
+            </p:spPr>
+            <p:txBody>
+              <a:bodyPr/>
+              <a:lstStyle/>
+              <a:p>
+                <a:r>
+                  <a:rPr lang="en-US">
+                    <a:noFill/>
+                  </a:rPr>
+                  <a:t> </a:t>
+                </a:r>
+              </a:p>
+            </p:txBody>
+          </p:sp>
+        </mc:Fallback>
+      </mc:AlternateContent>
+      <mc:AlternateContent xmlns:mc="http://schemas.openxmlformats.org/markup-compatibility/2006" xmlns:a14="http://schemas.microsoft.com/office/drawing/2010/main">
+        <mc:Choice Requires="a14">
+          <p:sp>
+            <p:nvSpPr>
+              <p:cNvPr id="54" name="TextBox 53">
+                <a:extLst>
+                  <a:ext uri="{FF2B5EF4-FFF2-40B4-BE49-F238E27FC236}">
+                    <a16:creationId xmlns:a16="http://schemas.microsoft.com/office/drawing/2014/main" id="{83AA2853-6A23-2B41-82F0-03E77DFFF0CB}"/>
+                  </a:ext>
+                </a:extLst>
+              </p:cNvPr>
+              <p:cNvSpPr txBox="1"/>
+              <p:nvPr/>
+            </p:nvSpPr>
+            <p:spPr>
+              <a:xfrm>
+                <a:off x="3173103" y="2803672"/>
+                <a:ext cx="5788636" cy="351763"/>
+              </a:xfrm>
+              <a:prstGeom prst="rect">
+                <a:avLst/>
+              </a:prstGeom>
+              <a:noFill/>
+            </p:spPr>
+            <p:txBody>
+              <a:bodyPr wrap="none" rtlCol="0">
+                <a:spAutoFit/>
+              </a:bodyPr>
+              <a:lstStyle/>
+              <a:p>
+                <a:pPr/>
+                <a14:m>
+                  <m:oMathPara xmlns:m="http://schemas.openxmlformats.org/officeDocument/2006/math">
+                    <m:oMathParaPr>
+                      <m:jc m:val="centerGroup"/>
+                    </m:oMathParaPr>
+                    <m:oMath xmlns:m="http://schemas.openxmlformats.org/officeDocument/2006/math">
+                      <m:sSub>
+                        <m:sSubPr>
+                          <m:ctrlPr>
+                            <a:rPr lang="en-US" sz="1400" i="1">
+                              <a:latin typeface="Cambria Math" panose="02040503050406030204" pitchFamily="18" charset="0"/>
+                              <a:ea typeface="Cambria Math" panose="02040503050406030204" pitchFamily="18" charset="0"/>
+                            </a:rPr>
+                          </m:ctrlPr>
+                        </m:sSubPr>
+                        <m:e>
+                          <m:r>
+                            <m:rPr>
+                              <m:sty m:val="p"/>
+                            </m:rPr>
+                            <a:rPr lang="en-US" sz="1400">
+                              <a:latin typeface="Cambria Math" panose="02040503050406030204" pitchFamily="18" charset="0"/>
+                              <a:ea typeface="Cambria Math" panose="02040503050406030204" pitchFamily="18" charset="0"/>
+                            </a:rPr>
+                            <m:t>Mach</m:t>
+                          </m:r>
+                        </m:e>
+                        <m:sub>
+                          <m:r>
+                            <m:rPr>
+                              <m:sty m:val="p"/>
+                            </m:rPr>
+                            <a:rPr lang="en-US" sz="1400">
+                              <a:latin typeface="Cambria Math" panose="02040503050406030204" pitchFamily="18" charset="0"/>
+                              <a:ea typeface="Cambria Math" panose="02040503050406030204" pitchFamily="18" charset="0"/>
+                            </a:rPr>
+                            <m:t>E</m:t>
+                          </m:r>
+                          <m:r>
+                            <m:rPr>
+                              <m:sty m:val="p"/>
+                            </m:rPr>
+                            <a:rPr lang="en-US" sz="1400" i="1">
+                              <a:latin typeface="Cambria Math" panose="02040503050406030204" pitchFamily="18" charset="0"/>
+                              <a:ea typeface="Cambria Math" panose="02040503050406030204" pitchFamily="18" charset="0"/>
+                            </a:rPr>
+                            <m:t>a</m:t>
+                          </m:r>
+                          <m:r>
+                            <m:rPr>
+                              <m:sty m:val="p"/>
+                            </m:rPr>
+                            <a:rPr lang="en-US" sz="1400">
+                              <a:latin typeface="Cambria Math" panose="02040503050406030204" pitchFamily="18" charset="0"/>
+                              <a:ea typeface="Cambria Math" panose="02040503050406030204" pitchFamily="18" charset="0"/>
+                            </a:rPr>
+                            <m:t>sm</m:t>
+                          </m:r>
+                          <m:r>
+                            <a:rPr lang="en-US" sz="1400" i="1">
+                              <a:latin typeface="Cambria Math" panose="02040503050406030204" pitchFamily="18" charset="0"/>
+                              <a:ea typeface="Cambria Math" panose="02040503050406030204" pitchFamily="18" charset="0"/>
+                            </a:rPr>
+                            <m:t>[</m:t>
+                          </m:r>
+                          <m:sSub>
+                            <m:sSubPr>
+                              <m:ctrlPr>
+                                <a:rPr lang="en-US" sz="1400" i="1">
+                                  <a:latin typeface="Cambria Math" panose="02040503050406030204" pitchFamily="18" charset="0"/>
+                                  <a:ea typeface="Cambria Math" panose="02040503050406030204" pitchFamily="18" charset="0"/>
+                                </a:rPr>
+                              </m:ctrlPr>
+                            </m:sSubPr>
+                            <m:e>
+                              <m:r>
+                                <a:rPr lang="en-US" sz="1400" i="1">
+                                  <a:latin typeface="Cambria Math" panose="02040503050406030204" pitchFamily="18" charset="0"/>
+                                  <a:ea typeface="Cambria Math" panose="02040503050406030204" pitchFamily="18" charset="0"/>
+                                </a:rPr>
+                                <m:t>𝑇</m:t>
+                              </m:r>
+                            </m:e>
+                            <m:sub>
+                              <m:r>
+                                <a:rPr lang="en-US" sz="1400" i="1">
+                                  <a:latin typeface="Cambria Math" panose="02040503050406030204" pitchFamily="18" charset="0"/>
+                                  <a:ea typeface="Cambria Math" panose="02040503050406030204" pitchFamily="18" charset="0"/>
+                                </a:rPr>
+                                <m:t>[</m:t>
+                              </m:r>
+                              <m:r>
+                                <a:rPr lang="en-US" sz="1400" i="1">
+                                  <a:latin typeface="Cambria Math" panose="02040503050406030204" pitchFamily="18" charset="0"/>
+                                  <a:ea typeface="Cambria Math" panose="02040503050406030204" pitchFamily="18" charset="0"/>
+                                </a:rPr>
+                                <m:t>𝑐𝑖𝑑</m:t>
+                              </m:r>
+                              <m:r>
+                                <a:rPr lang="en-US" sz="1400" i="1">
+                                  <a:latin typeface="Cambria Math" panose="02040503050406030204" pitchFamily="18" charset="0"/>
+                                  <a:ea typeface="Cambria Math" panose="02040503050406030204" pitchFamily="18" charset="0"/>
+                                </a:rPr>
+                                <m:t>]</m:t>
+                              </m:r>
+                            </m:sub>
+                          </m:sSub>
+                          <m:r>
+                            <a:rPr lang="en-US" sz="1400" i="1">
+                              <a:latin typeface="Cambria Math" panose="02040503050406030204" pitchFamily="18" charset="0"/>
+                              <a:ea typeface="Cambria Math" panose="02040503050406030204" pitchFamily="18" charset="0"/>
+                            </a:rPr>
+                            <m:t>]</m:t>
+                          </m:r>
+                        </m:sub>
+                      </m:sSub>
+                      <m:r>
+                        <a:rPr lang="en-US" sz="1400">
+                          <a:latin typeface="Cambria Math" panose="02040503050406030204" pitchFamily="18" charset="0"/>
+                          <a:ea typeface="Cambria Math" panose="02040503050406030204" pitchFamily="18" charset="0"/>
+                        </a:rPr>
+                        <m:t>(</m:t>
+                      </m:r>
+                      <m:sSub>
+                        <m:sSubPr>
+                          <m:ctrlPr>
+                            <a:rPr lang="en-US" sz="1400" b="0" i="1" smtClean="0">
+                              <a:latin typeface="Cambria Math" panose="02040503050406030204" pitchFamily="18" charset="0"/>
+                              <a:ea typeface="Cambria Math" panose="02040503050406030204" pitchFamily="18" charset="0"/>
+                            </a:rPr>
+                          </m:ctrlPr>
+                        </m:sSubPr>
+                        <m:e>
+                          <m:r>
+                            <a:rPr lang="en-US" sz="1400" i="1">
+                              <a:latin typeface="Cambria Math" panose="02040503050406030204" pitchFamily="18" charset="0"/>
+                              <a:ea typeface="Cambria Math" panose="02040503050406030204" pitchFamily="18" charset="0"/>
+                            </a:rPr>
+                            <m:t>∥</m:t>
+                          </m:r>
+                        </m:e>
+                        <m:sub>
+                          <m:r>
+                            <a:rPr lang="en-US" sz="1400" b="0" i="1" smtClean="0">
+                              <a:latin typeface="Cambria Math" panose="02040503050406030204" pitchFamily="18" charset="0"/>
+                              <a:ea typeface="Cambria Math" panose="02040503050406030204" pitchFamily="18" charset="0"/>
+                            </a:rPr>
+                            <m:t>𝑡𝑖𝑑</m:t>
+                          </m:r>
+                          <m:r>
+                            <a:rPr lang="en-US" sz="1400" b="0" i="1" smtClean="0">
+                              <a:latin typeface="Cambria Math" panose="02040503050406030204" pitchFamily="18" charset="0"/>
+                              <a:ea typeface="Cambria Math" panose="02040503050406030204" pitchFamily="18" charset="0"/>
+                            </a:rPr>
+                            <m:t>∈</m:t>
+                          </m:r>
+                          <m:sSub>
+                            <m:sSubPr>
+                              <m:ctrlPr>
+                                <a:rPr lang="en-US" sz="1400" b="0" i="1" smtClean="0">
+                                  <a:latin typeface="Cambria Math" panose="02040503050406030204" pitchFamily="18" charset="0"/>
+                                  <a:ea typeface="Cambria Math" panose="02040503050406030204" pitchFamily="18" charset="0"/>
+                                </a:rPr>
+                              </m:ctrlPr>
+                            </m:sSubPr>
+                            <m:e>
+                              <m:r>
+                                <a:rPr lang="en-US" sz="1400" b="0" i="1" smtClean="0">
+                                  <a:latin typeface="Cambria Math" panose="02040503050406030204" pitchFamily="18" charset="0"/>
+                                  <a:ea typeface="Cambria Math" panose="02040503050406030204" pitchFamily="18" charset="0"/>
+                                </a:rPr>
+                                <m:t>𝑇</m:t>
+                              </m:r>
+                            </m:e>
+                            <m:sub>
+                              <m:r>
+                                <a:rPr lang="en-US" sz="1400" b="0" i="1" smtClean="0">
+                                  <a:latin typeface="Cambria Math" panose="02040503050406030204" pitchFamily="18" charset="0"/>
+                                  <a:ea typeface="Cambria Math" panose="02040503050406030204" pitchFamily="18" charset="0"/>
+                                </a:rPr>
+                                <m:t>[</m:t>
+                              </m:r>
+                              <m:r>
+                                <a:rPr lang="en-US" sz="1400" b="0" i="1" smtClean="0">
+                                  <a:latin typeface="Cambria Math" panose="02040503050406030204" pitchFamily="18" charset="0"/>
+                                  <a:ea typeface="Cambria Math" panose="02040503050406030204" pitchFamily="18" charset="0"/>
+                                </a:rPr>
+                                <m:t>𝑐𝑖𝑑</m:t>
+                              </m:r>
+                              <m:r>
+                                <a:rPr lang="en-US" sz="1400" b="0" i="1" smtClean="0">
+                                  <a:latin typeface="Cambria Math" panose="02040503050406030204" pitchFamily="18" charset="0"/>
+                                  <a:ea typeface="Cambria Math" panose="02040503050406030204" pitchFamily="18" charset="0"/>
+                                </a:rPr>
+                                <m:t>]</m:t>
+                              </m:r>
+                            </m:sub>
+                          </m:sSub>
+                        </m:sub>
+                      </m:sSub>
+                      <m:r>
+                        <m:rPr>
+                          <m:sty m:val="p"/>
+                        </m:rPr>
+                        <a:rPr lang="en-US" sz="1400">
+                          <a:latin typeface="Cambria Math" panose="02040503050406030204" pitchFamily="18" charset="0"/>
+                          <a:ea typeface="Cambria Math" panose="02040503050406030204" pitchFamily="18" charset="0"/>
+                        </a:rPr>
+                        <m:t>PHBThrd</m:t>
+                      </m:r>
+                      <m:d>
+                        <m:dPr>
+                          <m:begChr m:val="["/>
+                          <m:endChr m:val="]"/>
+                          <m:ctrlPr>
+                            <a:rPr lang="en-US" sz="1400" i="1">
+                              <a:latin typeface="Cambria Math" panose="02040503050406030204" pitchFamily="18" charset="0"/>
+                              <a:ea typeface="Cambria Math" panose="02040503050406030204" pitchFamily="18" charset="0"/>
+                            </a:rPr>
+                          </m:ctrlPr>
+                        </m:dPr>
+                        <m:e>
+                          <m:r>
+                            <a:rPr lang="en-US" sz="1400" b="0" i="1" smtClean="0">
+                              <a:latin typeface="Cambria Math" panose="02040503050406030204" pitchFamily="18" charset="0"/>
+                              <a:ea typeface="Cambria Math" panose="02040503050406030204" pitchFamily="18" charset="0"/>
+                            </a:rPr>
+                            <m:t>𝑐𝑖𝑑</m:t>
+                          </m:r>
+                          <m:r>
+                            <a:rPr lang="en-US" sz="1400" b="0" i="1" smtClean="0">
+                              <a:latin typeface="Cambria Math" panose="02040503050406030204" pitchFamily="18" charset="0"/>
+                              <a:ea typeface="Cambria Math" panose="02040503050406030204" pitchFamily="18" charset="0"/>
+                            </a:rPr>
+                            <m:t>,</m:t>
+                          </m:r>
+                          <m:sSubSup>
+                            <m:sSubSupPr>
+                              <m:ctrlPr>
+                                <a:rPr lang="en-US" sz="1400" b="0" i="1" smtClean="0">
+                                  <a:latin typeface="Cambria Math" panose="02040503050406030204" pitchFamily="18" charset="0"/>
+                                  <a:ea typeface="Cambria Math" panose="02040503050406030204" pitchFamily="18" charset="0"/>
+                                </a:rPr>
+                              </m:ctrlPr>
+                            </m:sSubSupPr>
+                            <m:e>
+                              <m:r>
+                                <a:rPr lang="en-US" sz="1400" i="1">
+                                  <a:latin typeface="Cambria Math" panose="02040503050406030204" pitchFamily="18" charset="0"/>
+                                  <a:ea typeface="Cambria Math" panose="02040503050406030204" pitchFamily="18" charset="0"/>
+                                </a:rPr>
+                                <m:t>𝜀</m:t>
+                              </m:r>
+                            </m:e>
+                            <m:sub>
+                              <m:r>
+                                <a:rPr lang="en-US" sz="1400" i="1">
+                                  <a:latin typeface="Cambria Math" panose="02040503050406030204" pitchFamily="18" charset="0"/>
+                                  <a:ea typeface="Cambria Math" panose="02040503050406030204" pitchFamily="18" charset="0"/>
+                                </a:rPr>
+                                <m:t>𝑐𝑖𝑑</m:t>
+                              </m:r>
+                            </m:sub>
+                            <m:sup>
+                              <m:r>
+                                <a:rPr lang="en-US" sz="1400" b="0" i="1" smtClean="0">
+                                  <a:latin typeface="Cambria Math" panose="02040503050406030204" pitchFamily="18" charset="0"/>
+                                  <a:ea typeface="Cambria Math" panose="02040503050406030204" pitchFamily="18" charset="0"/>
+                                </a:rPr>
+                                <m:t>′</m:t>
+                              </m:r>
+                            </m:sup>
+                          </m:sSubSup>
+                        </m:e>
+                      </m:d>
+                      <m:r>
+                        <a:rPr lang="en-US" sz="1400" i="1">
+                          <a:latin typeface="Cambria Math" panose="02040503050406030204" pitchFamily="18" charset="0"/>
+                          <a:ea typeface="Cambria Math" panose="02040503050406030204" pitchFamily="18" charset="0"/>
+                        </a:rPr>
+                        <m:t>)⊢</m:t>
+                      </m:r>
+                      <m:d>
+                        <m:dPr>
+                          <m:begChr m:val="⟦"/>
+                          <m:endChr m:val="⟧"/>
+                          <m:ctrlPr>
+                            <a:rPr lang="en-US" sz="1400" i="1" dirty="0">
+                              <a:latin typeface="Cambria Math" panose="02040503050406030204" pitchFamily="18" charset="0"/>
+                              <a:ea typeface="Cambria Math" panose="02040503050406030204" pitchFamily="18" charset="0"/>
+                            </a:rPr>
+                          </m:ctrlPr>
+                        </m:dPr>
+                        <m:e>
+                          <m:r>
+                            <a:rPr lang="en-US" sz="1400" b="1" dirty="0">
+                              <a:latin typeface="Cambria Math" panose="02040503050406030204" pitchFamily="18" charset="0"/>
+                              <a:ea typeface="Cambria Math" panose="02040503050406030204" pitchFamily="18" charset="0"/>
+                            </a:rPr>
+                            <m:t>𝐂𝐞𝐫𝐭𝐢𝐊𝐎</m:t>
+                          </m:r>
+                          <m:sSub>
+                            <m:sSubPr>
+                              <m:ctrlPr>
+                                <a:rPr lang="en-US" sz="1400" b="1" i="1" dirty="0">
+                                  <a:latin typeface="Cambria Math" panose="02040503050406030204" pitchFamily="18" charset="0"/>
+                                  <a:ea typeface="Cambria Math" panose="02040503050406030204" pitchFamily="18" charset="0"/>
+                                </a:rPr>
+                              </m:ctrlPr>
+                            </m:sSubPr>
+                            <m:e>
+                              <m:r>
+                                <a:rPr lang="en-US" sz="1400" b="1" dirty="0">
+                                  <a:latin typeface="Cambria Math" panose="02040503050406030204" pitchFamily="18" charset="0"/>
+                                  <a:ea typeface="Cambria Math" panose="02040503050406030204" pitchFamily="18" charset="0"/>
+                                </a:rPr>
+                                <m:t>𝐒</m:t>
+                              </m:r>
+                            </m:e>
+                            <m:sub>
+                              <m:r>
+                                <a:rPr lang="en-US" sz="1400" b="1" dirty="0">
+                                  <a:latin typeface="Cambria Math" panose="02040503050406030204" pitchFamily="18" charset="0"/>
+                                  <a:ea typeface="Cambria Math" panose="02040503050406030204" pitchFamily="18" charset="0"/>
+                                </a:rPr>
+                                <m:t>𝐭𝐡𝐫𝐝</m:t>
+                              </m:r>
+                            </m:sub>
+                          </m:sSub>
+                          <m:r>
+                            <a:rPr lang="en-US" sz="1400" b="1" i="1" dirty="0">
+                              <a:latin typeface="Cambria Math" panose="02040503050406030204" pitchFamily="18" charset="0"/>
+                              <a:ea typeface="Cambria Math" panose="02040503050406030204" pitchFamily="18" charset="0"/>
+                            </a:rPr>
+                            <m:t>⊕</m:t>
+                          </m:r>
+                          <m:r>
+                            <a:rPr lang="en-US" sz="1400" b="1" dirty="0">
+                              <a:latin typeface="Cambria Math" panose="02040503050406030204" pitchFamily="18" charset="0"/>
+                              <a:ea typeface="Cambria Math" panose="02040503050406030204" pitchFamily="18" charset="0"/>
+                            </a:rPr>
+                            <m:t>𝐂𝐭𝐱𝐭</m:t>
+                          </m:r>
+                        </m:e>
+                      </m:d>
+                      <m:r>
+                        <a:rPr lang="en-US" sz="1400" i="1" dirty="0">
+                          <a:latin typeface="Cambria Math" panose="02040503050406030204" pitchFamily="18" charset="0"/>
+                          <a:ea typeface="Cambria Math" panose="02040503050406030204" pitchFamily="18" charset="0"/>
+                        </a:rPr>
+                        <m:t> </m:t>
+                      </m:r>
+                    </m:oMath>
+                  </m:oMathPara>
+                </a14:m>
+                <a:endParaRPr lang="en-US" sz="1400" baseline="30000" dirty="0">
+                  <a:latin typeface="Cambria Math" panose="02040503050406030204" pitchFamily="18" charset="0"/>
+                  <a:ea typeface="Cambria Math" panose="02040503050406030204" pitchFamily="18" charset="0"/>
+                </a:endParaRPr>
+              </a:p>
+            </p:txBody>
+          </p:sp>
+        </mc:Choice>
+        <mc:Fallback xmlns="">
+          <p:sp>
+            <p:nvSpPr>
+              <p:cNvPr id="54" name="TextBox 53">
+                <a:extLst>
+                  <a:ext uri="{FF2B5EF4-FFF2-40B4-BE49-F238E27FC236}">
+                    <a16:creationId xmlns:a16="http://schemas.microsoft.com/office/drawing/2014/main" id="{83AA2853-6A23-2B41-82F0-03E77DFFF0CB}"/>
+                  </a:ext>
+                </a:extLst>
+              </p:cNvPr>
+              <p:cNvSpPr txBox="1">
+                <a:spLocks noRot="1" noChangeAspect="1" noMove="1" noResize="1" noEditPoints="1" noAdjustHandles="1" noChangeArrowheads="1" noChangeShapeType="1" noTextEdit="1"/>
+              </p:cNvSpPr>
+              <p:nvPr/>
+            </p:nvSpPr>
+            <p:spPr>
+              <a:xfrm>
+                <a:off x="3173103" y="2803672"/>
+                <a:ext cx="5788636" cy="351763"/>
+              </a:xfrm>
+              <a:prstGeom prst="rect">
+                <a:avLst/>
+              </a:prstGeom>
+              <a:blipFill>
+                <a:blip r:embed="rId9"/>
+                <a:stretch>
+                  <a:fillRect/>
+                </a:stretch>
+              </a:blipFill>
+            </p:spPr>
+            <p:txBody>
+              <a:bodyPr/>
+              <a:lstStyle/>
+              <a:p>
+                <a:r>
+                  <a:rPr lang="en-US">
+                    <a:noFill/>
+                  </a:rPr>
+                  <a:t> </a:t>
+                </a:r>
+              </a:p>
+            </p:txBody>
+          </p:sp>
+        </mc:Fallback>
+      </mc:AlternateContent>
+      <mc:AlternateContent xmlns:mc="http://schemas.openxmlformats.org/markup-compatibility/2006" xmlns:a14="http://schemas.microsoft.com/office/drawing/2010/main">
+        <mc:Choice Requires="a14">
+          <p:sp>
+            <p:nvSpPr>
+              <p:cNvPr id="56" name="TextBox 55">
+                <a:extLst>
+                  <a:ext uri="{FF2B5EF4-FFF2-40B4-BE49-F238E27FC236}">
+                    <a16:creationId xmlns:a16="http://schemas.microsoft.com/office/drawing/2014/main" id="{5AA5BA2F-A974-BE4B-AA80-F1688BA20308}"/>
+                  </a:ext>
+                </a:extLst>
+              </p:cNvPr>
+              <p:cNvSpPr txBox="1"/>
+              <p:nvPr/>
+            </p:nvSpPr>
+            <p:spPr>
+              <a:xfrm>
+                <a:off x="2990841" y="2233729"/>
+                <a:ext cx="6153159" cy="371384"/>
+              </a:xfrm>
+              <a:prstGeom prst="rect">
+                <a:avLst/>
+              </a:prstGeom>
+              <a:noFill/>
+            </p:spPr>
+            <p:txBody>
+              <a:bodyPr wrap="none" rtlCol="0">
+                <a:spAutoFit/>
+              </a:bodyPr>
+              <a:lstStyle/>
+              <a:p>
+                <a:pPr/>
+                <a14:m>
+                  <m:oMathPara xmlns:m="http://schemas.openxmlformats.org/officeDocument/2006/math">
+                    <m:oMathParaPr>
+                      <m:jc m:val="centerGroup"/>
+                    </m:oMathParaPr>
+                    <m:oMath xmlns:m="http://schemas.openxmlformats.org/officeDocument/2006/math">
+                      <m:sSub>
+                        <m:sSubPr>
+                          <m:ctrlPr>
+                            <a:rPr lang="en-US" sz="1400" i="1">
+                              <a:latin typeface="Cambria Math" panose="02040503050406030204" pitchFamily="18" charset="0"/>
+                              <a:ea typeface="Cambria Math" panose="02040503050406030204" pitchFamily="18" charset="0"/>
+                            </a:rPr>
+                          </m:ctrlPr>
+                        </m:sSubPr>
+                        <m:e>
+                          <m:r>
+                            <m:rPr>
+                              <m:sty m:val="p"/>
+                            </m:rPr>
+                            <a:rPr lang="en-US" sz="1400">
+                              <a:latin typeface="Cambria Math" panose="02040503050406030204" pitchFamily="18" charset="0"/>
+                              <a:ea typeface="Cambria Math" panose="02040503050406030204" pitchFamily="18" charset="0"/>
+                            </a:rPr>
+                            <m:t>Mach</m:t>
+                          </m:r>
+                        </m:e>
+                        <m:sub>
+                          <m:r>
+                            <m:rPr>
+                              <m:sty m:val="p"/>
+                            </m:rPr>
+                            <a:rPr lang="en-US" sz="1400">
+                              <a:latin typeface="Cambria Math" panose="02040503050406030204" pitchFamily="18" charset="0"/>
+                              <a:ea typeface="Cambria Math" panose="02040503050406030204" pitchFamily="18" charset="0"/>
+                            </a:rPr>
+                            <m:t>IEAsm</m:t>
+                          </m:r>
+                          <m:sSub>
+                            <m:sSubPr>
+                              <m:ctrlPr>
+                                <a:rPr lang="en-US" sz="1400" i="1">
+                                  <a:latin typeface="Cambria Math" panose="02040503050406030204" pitchFamily="18" charset="0"/>
+                                  <a:ea typeface="Cambria Math" panose="02040503050406030204" pitchFamily="18" charset="0"/>
+                                </a:rPr>
+                              </m:ctrlPr>
+                            </m:sSubPr>
+                            <m:e>
+                              <m:r>
+                                <a:rPr lang="en-US" sz="1400" i="1">
+                                  <a:latin typeface="Cambria Math" panose="02040503050406030204" pitchFamily="18" charset="0"/>
+                                  <a:ea typeface="Cambria Math" panose="02040503050406030204" pitchFamily="18" charset="0"/>
+                                </a:rPr>
+                                <m:t>[</m:t>
+                              </m:r>
+                              <m:r>
+                                <a:rPr lang="en-US" sz="1400" i="1">
+                                  <a:latin typeface="Cambria Math" panose="02040503050406030204" pitchFamily="18" charset="0"/>
+                                  <a:ea typeface="Cambria Math" panose="02040503050406030204" pitchFamily="18" charset="0"/>
+                                </a:rPr>
+                                <m:t>𝑇</m:t>
+                              </m:r>
+                            </m:e>
+                            <m:sub>
+                              <m:r>
+                                <a:rPr lang="en-US" sz="1400" i="1">
+                                  <a:latin typeface="Cambria Math" panose="02040503050406030204" pitchFamily="18" charset="0"/>
+                                  <a:ea typeface="Cambria Math" panose="02040503050406030204" pitchFamily="18" charset="0"/>
+                                </a:rPr>
+                                <m:t>[</m:t>
+                              </m:r>
+                              <m:r>
+                                <a:rPr lang="en-US" sz="1400" i="1">
+                                  <a:latin typeface="Cambria Math" panose="02040503050406030204" pitchFamily="18" charset="0"/>
+                                  <a:ea typeface="Cambria Math" panose="02040503050406030204" pitchFamily="18" charset="0"/>
+                                </a:rPr>
+                                <m:t>𝑐𝑖𝑑</m:t>
+                              </m:r>
+                              <m:r>
+                                <a:rPr lang="en-US" sz="1400" i="1">
+                                  <a:latin typeface="Cambria Math" panose="02040503050406030204" pitchFamily="18" charset="0"/>
+                                  <a:ea typeface="Cambria Math" panose="02040503050406030204" pitchFamily="18" charset="0"/>
+                                </a:rPr>
+                                <m:t>]</m:t>
+                              </m:r>
+                            </m:sub>
+                          </m:sSub>
+                          <m:r>
+                            <a:rPr lang="en-US" sz="1400" i="1">
+                              <a:latin typeface="Cambria Math" panose="02040503050406030204" pitchFamily="18" charset="0"/>
+                              <a:ea typeface="Cambria Math" panose="02040503050406030204" pitchFamily="18" charset="0"/>
+                            </a:rPr>
+                            <m:t>]</m:t>
+                          </m:r>
+                        </m:sub>
+                      </m:sSub>
+                      <m:r>
+                        <a:rPr lang="en-US" sz="1400">
+                          <a:latin typeface="Cambria Math" panose="02040503050406030204" pitchFamily="18" charset="0"/>
+                          <a:ea typeface="Cambria Math" panose="02040503050406030204" pitchFamily="18" charset="0"/>
+                        </a:rPr>
+                        <m:t>(</m:t>
+                      </m:r>
+                      <m:sSub>
+                        <m:sSubPr>
+                          <m:ctrlPr>
+                            <a:rPr lang="en-US" sz="1400" b="0" i="1" smtClean="0">
+                              <a:latin typeface="Cambria Math" panose="02040503050406030204" pitchFamily="18" charset="0"/>
+                              <a:ea typeface="Cambria Math" panose="02040503050406030204" pitchFamily="18" charset="0"/>
+                            </a:rPr>
+                          </m:ctrlPr>
+                        </m:sSubPr>
+                        <m:e>
+                          <m:r>
+                            <a:rPr lang="en-US" sz="1400" i="1">
+                              <a:latin typeface="Cambria Math" panose="02040503050406030204" pitchFamily="18" charset="0"/>
+                              <a:ea typeface="Cambria Math" panose="02040503050406030204" pitchFamily="18" charset="0"/>
+                            </a:rPr>
+                            <m:t>∥</m:t>
+                          </m:r>
+                        </m:e>
+                        <m:sub>
+                          <m:r>
+                            <a:rPr lang="en-US" sz="1400" i="1">
+                              <a:latin typeface="Cambria Math" panose="02040503050406030204" pitchFamily="18" charset="0"/>
+                              <a:ea typeface="Cambria Math" panose="02040503050406030204" pitchFamily="18" charset="0"/>
+                            </a:rPr>
+                            <m:t>𝑡𝑖𝑑</m:t>
+                          </m:r>
+                          <m:r>
+                            <a:rPr lang="en-US" sz="1400" i="1">
+                              <a:latin typeface="Cambria Math" panose="02040503050406030204" pitchFamily="18" charset="0"/>
+                              <a:ea typeface="Cambria Math" panose="02040503050406030204" pitchFamily="18" charset="0"/>
+                            </a:rPr>
+                            <m:t>∈</m:t>
+                          </m:r>
+                          <m:sSub>
+                            <m:sSubPr>
+                              <m:ctrlPr>
+                                <a:rPr lang="en-US" sz="1400" i="1">
+                                  <a:latin typeface="Cambria Math" panose="02040503050406030204" pitchFamily="18" charset="0"/>
+                                  <a:ea typeface="Cambria Math" panose="02040503050406030204" pitchFamily="18" charset="0"/>
+                                </a:rPr>
+                              </m:ctrlPr>
+                            </m:sSubPr>
+                            <m:e>
+                              <m:r>
+                                <a:rPr lang="en-US" sz="1400" i="1">
+                                  <a:latin typeface="Cambria Math" panose="02040503050406030204" pitchFamily="18" charset="0"/>
+                                  <a:ea typeface="Cambria Math" panose="02040503050406030204" pitchFamily="18" charset="0"/>
+                                </a:rPr>
+                                <m:t>𝑇</m:t>
+                              </m:r>
+                            </m:e>
+                            <m:sub>
+                              <m:r>
+                                <a:rPr lang="en-US" sz="1400" i="1">
+                                  <a:latin typeface="Cambria Math" panose="02040503050406030204" pitchFamily="18" charset="0"/>
+                                  <a:ea typeface="Cambria Math" panose="02040503050406030204" pitchFamily="18" charset="0"/>
+                                </a:rPr>
+                                <m:t>[</m:t>
+                              </m:r>
+                              <m:r>
+                                <a:rPr lang="en-US" sz="1400" i="1">
+                                  <a:latin typeface="Cambria Math" panose="02040503050406030204" pitchFamily="18" charset="0"/>
+                                  <a:ea typeface="Cambria Math" panose="02040503050406030204" pitchFamily="18" charset="0"/>
+                                </a:rPr>
+                                <m:t>𝑐𝑖𝑑</m:t>
+                              </m:r>
+                              <m:r>
+                                <a:rPr lang="en-US" sz="1400" i="1">
+                                  <a:latin typeface="Cambria Math" panose="02040503050406030204" pitchFamily="18" charset="0"/>
+                                  <a:ea typeface="Cambria Math" panose="02040503050406030204" pitchFamily="18" charset="0"/>
+                                </a:rPr>
+                                <m:t>]</m:t>
+                              </m:r>
+                            </m:sub>
+                          </m:sSub>
+                        </m:sub>
+                      </m:sSub>
+                      <m:r>
+                        <m:rPr>
+                          <m:sty m:val="p"/>
+                        </m:rPr>
+                        <a:rPr lang="en-US" sz="1400">
+                          <a:latin typeface="Cambria Math" panose="02040503050406030204" pitchFamily="18" charset="0"/>
+                          <a:ea typeface="Cambria Math" panose="02040503050406030204" pitchFamily="18" charset="0"/>
+                        </a:rPr>
+                        <m:t>PHBThrd</m:t>
+                      </m:r>
+                      <m:d>
+                        <m:dPr>
+                          <m:begChr m:val="["/>
+                          <m:endChr m:val="]"/>
+                          <m:ctrlPr>
+                            <a:rPr lang="en-US" sz="1400" i="1">
+                              <a:latin typeface="Cambria Math" panose="02040503050406030204" pitchFamily="18" charset="0"/>
+                              <a:ea typeface="Cambria Math" panose="02040503050406030204" pitchFamily="18" charset="0"/>
+                            </a:rPr>
+                          </m:ctrlPr>
+                        </m:dPr>
+                        <m:e>
+                          <m:r>
+                            <a:rPr lang="en-US" sz="1400" b="0" i="1" smtClean="0">
+                              <a:latin typeface="Cambria Math" panose="02040503050406030204" pitchFamily="18" charset="0"/>
+                              <a:ea typeface="Cambria Math" panose="02040503050406030204" pitchFamily="18" charset="0"/>
+                            </a:rPr>
+                            <m:t>𝑐𝑖𝑑</m:t>
+                          </m:r>
+                          <m:r>
+                            <a:rPr lang="en-US" sz="1400" b="0" i="1" smtClean="0">
+                              <a:latin typeface="Cambria Math" panose="02040503050406030204" pitchFamily="18" charset="0"/>
+                              <a:ea typeface="Cambria Math" panose="02040503050406030204" pitchFamily="18" charset="0"/>
+                            </a:rPr>
+                            <m:t>,</m:t>
+                          </m:r>
+                          <m:sSubSup>
+                            <m:sSubSupPr>
+                              <m:ctrlPr>
+                                <a:rPr lang="en-US" sz="1400" i="1">
+                                  <a:latin typeface="Cambria Math" panose="02040503050406030204" pitchFamily="18" charset="0"/>
+                                  <a:ea typeface="Cambria Math" panose="02040503050406030204" pitchFamily="18" charset="0"/>
+                                </a:rPr>
+                              </m:ctrlPr>
+                            </m:sSubSupPr>
+                            <m:e>
+                              <m:r>
+                                <a:rPr lang="en-US" sz="1400" i="1">
+                                  <a:latin typeface="Cambria Math" panose="02040503050406030204" pitchFamily="18" charset="0"/>
+                                  <a:ea typeface="Cambria Math" panose="02040503050406030204" pitchFamily="18" charset="0"/>
+                                </a:rPr>
+                                <m:t>𝜀</m:t>
+                              </m:r>
+                            </m:e>
+                            <m:sub>
+                              <m:r>
+                                <a:rPr lang="en-US" sz="1400" i="1">
+                                  <a:latin typeface="Cambria Math" panose="02040503050406030204" pitchFamily="18" charset="0"/>
+                                  <a:ea typeface="Cambria Math" panose="02040503050406030204" pitchFamily="18" charset="0"/>
+                                </a:rPr>
+                                <m:t>𝑡𝑖𝑑</m:t>
+                              </m:r>
+                            </m:sub>
+                            <m:sup>
+                              <m:r>
+                                <a:rPr lang="en-US" sz="1400" i="1">
+                                  <a:latin typeface="Cambria Math" panose="02040503050406030204" pitchFamily="18" charset="0"/>
+                                  <a:ea typeface="Cambria Math" panose="02040503050406030204" pitchFamily="18" charset="0"/>
+                                </a:rPr>
+                                <m:t>𝑀𝑇𝐿𝑖𝑛𝑘</m:t>
+                              </m:r>
+                            </m:sup>
+                          </m:sSubSup>
+                        </m:e>
+                      </m:d>
+                      <m:r>
+                        <a:rPr lang="en-US" sz="1400" i="1">
+                          <a:latin typeface="Cambria Math" panose="02040503050406030204" pitchFamily="18" charset="0"/>
+                          <a:ea typeface="Cambria Math" panose="02040503050406030204" pitchFamily="18" charset="0"/>
+                        </a:rPr>
+                        <m:t>)⊢</m:t>
+                      </m:r>
+                      <m:d>
+                        <m:dPr>
+                          <m:begChr m:val="⟦"/>
+                          <m:endChr m:val="⟧"/>
+                          <m:ctrlPr>
+                            <a:rPr lang="en-US" sz="1400" i="1" dirty="0">
+                              <a:latin typeface="Cambria Math" panose="02040503050406030204" pitchFamily="18" charset="0"/>
+                              <a:ea typeface="Cambria Math" panose="02040503050406030204" pitchFamily="18" charset="0"/>
+                            </a:rPr>
+                          </m:ctrlPr>
+                        </m:dPr>
+                        <m:e>
+                          <m:r>
+                            <a:rPr lang="en-US" sz="1400" b="1" dirty="0">
+                              <a:latin typeface="Cambria Math" panose="02040503050406030204" pitchFamily="18" charset="0"/>
+                              <a:ea typeface="Cambria Math" panose="02040503050406030204" pitchFamily="18" charset="0"/>
+                            </a:rPr>
+                            <m:t>𝐂𝐞𝐫𝐭𝐢𝐊𝐎</m:t>
+                          </m:r>
+                          <m:sSub>
+                            <m:sSubPr>
+                              <m:ctrlPr>
+                                <a:rPr lang="en-US" sz="1400" b="1" i="1" dirty="0">
+                                  <a:latin typeface="Cambria Math" panose="02040503050406030204" pitchFamily="18" charset="0"/>
+                                  <a:ea typeface="Cambria Math" panose="02040503050406030204" pitchFamily="18" charset="0"/>
+                                </a:rPr>
+                              </m:ctrlPr>
+                            </m:sSubPr>
+                            <m:e>
+                              <m:r>
+                                <a:rPr lang="en-US" sz="1400" b="1" dirty="0">
+                                  <a:latin typeface="Cambria Math" panose="02040503050406030204" pitchFamily="18" charset="0"/>
+                                  <a:ea typeface="Cambria Math" panose="02040503050406030204" pitchFamily="18" charset="0"/>
+                                </a:rPr>
+                                <m:t>𝐒</m:t>
+                              </m:r>
+                            </m:e>
+                            <m:sub>
+                              <m:r>
+                                <a:rPr lang="en-US" sz="1400" b="1" dirty="0">
+                                  <a:latin typeface="Cambria Math" panose="02040503050406030204" pitchFamily="18" charset="0"/>
+                                  <a:ea typeface="Cambria Math" panose="02040503050406030204" pitchFamily="18" charset="0"/>
+                                </a:rPr>
+                                <m:t>𝐭𝐡𝐫𝐝</m:t>
+                              </m:r>
+                            </m:sub>
+                          </m:sSub>
+                          <m:r>
+                            <a:rPr lang="en-US" sz="1400" b="1" i="1" dirty="0">
+                              <a:latin typeface="Cambria Math" panose="02040503050406030204" pitchFamily="18" charset="0"/>
+                              <a:ea typeface="Cambria Math" panose="02040503050406030204" pitchFamily="18" charset="0"/>
+                            </a:rPr>
+                            <m:t>⊕</m:t>
+                          </m:r>
+                          <m:r>
+                            <a:rPr lang="en-US" sz="1400" b="1" dirty="0">
+                              <a:latin typeface="Cambria Math" panose="02040503050406030204" pitchFamily="18" charset="0"/>
+                              <a:ea typeface="Cambria Math" panose="02040503050406030204" pitchFamily="18" charset="0"/>
+                            </a:rPr>
+                            <m:t>𝐂𝐭𝐱𝐭</m:t>
+                          </m:r>
+                        </m:e>
+                      </m:d>
+                      <m:r>
+                        <a:rPr lang="en-US" sz="1400" i="1" dirty="0">
+                          <a:latin typeface="Cambria Math" panose="02040503050406030204" pitchFamily="18" charset="0"/>
+                          <a:ea typeface="Cambria Math" panose="02040503050406030204" pitchFamily="18" charset="0"/>
+                        </a:rPr>
+                        <m:t> </m:t>
+                      </m:r>
+                    </m:oMath>
+                  </m:oMathPara>
+                </a14:m>
+                <a:endParaRPr lang="en-US" sz="1400" baseline="30000" dirty="0">
+                  <a:latin typeface="Cambria Math" panose="02040503050406030204" pitchFamily="18" charset="0"/>
+                  <a:ea typeface="Cambria Math" panose="02040503050406030204" pitchFamily="18" charset="0"/>
+                </a:endParaRPr>
+              </a:p>
+            </p:txBody>
+          </p:sp>
+        </mc:Choice>
+        <mc:Fallback xmlns="">
+          <p:sp>
+            <p:nvSpPr>
+              <p:cNvPr id="56" name="TextBox 55">
+                <a:extLst>
+                  <a:ext uri="{FF2B5EF4-FFF2-40B4-BE49-F238E27FC236}">
+                    <a16:creationId xmlns:a16="http://schemas.microsoft.com/office/drawing/2014/main" id="{5AA5BA2F-A974-BE4B-AA80-F1688BA20308}"/>
+                  </a:ext>
+                </a:extLst>
+              </p:cNvPr>
+              <p:cNvSpPr txBox="1">
+                <a:spLocks noRot="1" noChangeAspect="1" noMove="1" noResize="1" noEditPoints="1" noAdjustHandles="1" noChangeArrowheads="1" noChangeShapeType="1" noTextEdit="1"/>
+              </p:cNvSpPr>
+              <p:nvPr/>
+            </p:nvSpPr>
+            <p:spPr>
+              <a:xfrm>
+                <a:off x="2990841" y="2233729"/>
+                <a:ext cx="6153159" cy="371384"/>
+              </a:xfrm>
+              <a:prstGeom prst="rect">
+                <a:avLst/>
+              </a:prstGeom>
+              <a:blipFill>
+                <a:blip r:embed="rId10"/>
+                <a:stretch>
+                  <a:fillRect/>
+                </a:stretch>
+              </a:blipFill>
+            </p:spPr>
+            <p:txBody>
+              <a:bodyPr/>
+              <a:lstStyle/>
+              <a:p>
+                <a:r>
+                  <a:rPr lang="en-US">
+                    <a:noFill/>
+                  </a:rPr>
+                  <a:t> </a:t>
+                </a:r>
+              </a:p>
+            </p:txBody>
+          </p:sp>
+        </mc:Fallback>
+      </mc:AlternateContent>
+      <mc:AlternateContent xmlns:mc="http://schemas.openxmlformats.org/markup-compatibility/2006" xmlns:a14="http://schemas.microsoft.com/office/drawing/2010/main">
+        <mc:Choice Requires="a14">
+          <p:sp>
+            <p:nvSpPr>
+              <p:cNvPr id="57" name="TextBox 56">
+                <a:extLst>
+                  <a:ext uri="{FF2B5EF4-FFF2-40B4-BE49-F238E27FC236}">
+                    <a16:creationId xmlns:a16="http://schemas.microsoft.com/office/drawing/2014/main" id="{AAF83BE7-164A-0840-B467-EDBE615BE96D}"/>
+                  </a:ext>
+                </a:extLst>
+              </p:cNvPr>
+              <p:cNvSpPr txBox="1"/>
+              <p:nvPr/>
+            </p:nvSpPr>
+            <p:spPr>
+              <a:xfrm rot="16200000">
+                <a:off x="5800578" y="2021301"/>
+                <a:ext cx="552669" cy="346249"/>
+              </a:xfrm>
+              <a:prstGeom prst="rect">
+                <a:avLst/>
+              </a:prstGeom>
+              <a:noFill/>
+            </p:spPr>
+            <p:txBody>
+              <a:bodyPr wrap="square" lIns="0" tIns="0" rIns="0" bIns="0" rtlCol="0">
+                <a:spAutoFit/>
+              </a:bodyPr>
+              <a:lstStyle/>
+              <a:p>
+                <a:pPr/>
+                <a14:m>
+                  <m:oMathPara xmlns:m="http://schemas.openxmlformats.org/officeDocument/2006/math">
+                    <m:oMathParaPr>
+                      <m:jc m:val="centerGroup"/>
+                    </m:oMathParaPr>
+                    <m:oMath xmlns:m="http://schemas.openxmlformats.org/officeDocument/2006/math">
+                      <m:r>
+                        <a:rPr lang="en-US" sz="2250" b="1" i="1">
+                          <a:latin typeface="Cambria Math" panose="02040503050406030204" pitchFamily="18" charset="0"/>
+                          <a:ea typeface="Cambria Math" panose="02040503050406030204" pitchFamily="18" charset="0"/>
+                          <a:cs typeface="Cambria Math" charset="0"/>
+                        </a:rPr>
+                        <m:t>⊑</m:t>
+                      </m:r>
+                    </m:oMath>
+                  </m:oMathPara>
+                </a14:m>
+                <a:endParaRPr lang="en-US" sz="2250" b="1" dirty="0">
+                  <a:latin typeface="Cambria Math" panose="02040503050406030204" pitchFamily="18" charset="0"/>
+                  <a:ea typeface="Cambria Math" panose="02040503050406030204" pitchFamily="18" charset="0"/>
+                </a:endParaRPr>
+              </a:p>
+            </p:txBody>
+          </p:sp>
+        </mc:Choice>
+        <mc:Fallback xmlns="">
+          <p:sp>
+            <p:nvSpPr>
+              <p:cNvPr id="57" name="TextBox 56">
+                <a:extLst>
+                  <a:ext uri="{FF2B5EF4-FFF2-40B4-BE49-F238E27FC236}">
+                    <a16:creationId xmlns:a16="http://schemas.microsoft.com/office/drawing/2014/main" id="{AAF83BE7-164A-0840-B467-EDBE615BE96D}"/>
+                  </a:ext>
+                </a:extLst>
+              </p:cNvPr>
+              <p:cNvSpPr txBox="1">
+                <a:spLocks noRot="1" noChangeAspect="1" noMove="1" noResize="1" noEditPoints="1" noAdjustHandles="1" noChangeArrowheads="1" noChangeShapeType="1" noTextEdit="1"/>
+              </p:cNvSpPr>
+              <p:nvPr/>
+            </p:nvSpPr>
+            <p:spPr>
+              <a:xfrm rot="16200000">
+                <a:off x="5800578" y="2021301"/>
+                <a:ext cx="552669" cy="346249"/>
+              </a:xfrm>
+              <a:prstGeom prst="rect">
+                <a:avLst/>
+              </a:prstGeom>
+              <a:blipFill>
+                <a:blip r:embed="rId11"/>
+                <a:stretch>
+                  <a:fillRect/>
+                </a:stretch>
+              </a:blipFill>
+            </p:spPr>
+            <p:txBody>
+              <a:bodyPr/>
+              <a:lstStyle/>
+              <a:p>
+                <a:r>
+                  <a:rPr lang="en-US">
+                    <a:noFill/>
+                  </a:rPr>
+                  <a:t> </a:t>
+                </a:r>
+              </a:p>
+            </p:txBody>
+          </p:sp>
+        </mc:Fallback>
+      </mc:AlternateContent>
+      <mc:AlternateContent xmlns:mc="http://schemas.openxmlformats.org/markup-compatibility/2006" xmlns:a14="http://schemas.microsoft.com/office/drawing/2010/main">
+        <mc:Choice Requires="a14">
+          <p:sp>
+            <p:nvSpPr>
+              <p:cNvPr id="58" name="TextBox 57">
+                <a:extLst>
+                  <a:ext uri="{FF2B5EF4-FFF2-40B4-BE49-F238E27FC236}">
+                    <a16:creationId xmlns:a16="http://schemas.microsoft.com/office/drawing/2014/main" id="{CDB6750F-B87F-A348-9880-D146DDB4917F}"/>
+                  </a:ext>
+                </a:extLst>
+              </p:cNvPr>
+              <p:cNvSpPr txBox="1"/>
+              <p:nvPr/>
+            </p:nvSpPr>
+            <p:spPr>
+              <a:xfrm>
+                <a:off x="3421165" y="1755082"/>
+                <a:ext cx="5251374" cy="348493"/>
+              </a:xfrm>
+              <a:prstGeom prst="rect">
+                <a:avLst/>
+              </a:prstGeom>
+              <a:noFill/>
+            </p:spPr>
+            <p:txBody>
+              <a:bodyPr wrap="none" rtlCol="0">
+                <a:spAutoFit/>
+              </a:bodyPr>
+              <a:lstStyle/>
+              <a:p>
+                <a:pPr/>
+                <a14:m>
+                  <m:oMathPara xmlns:m="http://schemas.openxmlformats.org/officeDocument/2006/math">
+                    <m:oMathParaPr>
+                      <m:jc m:val="centerGroup"/>
+                    </m:oMathParaPr>
+                    <m:oMath xmlns:m="http://schemas.openxmlformats.org/officeDocument/2006/math">
+                      <m:sSub>
+                        <m:sSubPr>
+                          <m:ctrlPr>
+                            <a:rPr lang="en-US" sz="1400" i="1">
+                              <a:latin typeface="Cambria Math" panose="02040503050406030204" pitchFamily="18" charset="0"/>
+                              <a:ea typeface="Cambria Math" panose="02040503050406030204" pitchFamily="18" charset="0"/>
+                            </a:rPr>
+                          </m:ctrlPr>
+                        </m:sSubPr>
+                        <m:e>
+                          <m:r>
+                            <m:rPr>
+                              <m:sty m:val="p"/>
+                            </m:rPr>
+                            <a:rPr lang="en-US" sz="1400">
+                              <a:latin typeface="Cambria Math" panose="02040503050406030204" pitchFamily="18" charset="0"/>
+                              <a:ea typeface="Cambria Math" panose="02040503050406030204" pitchFamily="18" charset="0"/>
+                            </a:rPr>
+                            <m:t>Mach</m:t>
+                          </m:r>
+                        </m:e>
+                        <m:sub>
+                          <m:r>
+                            <m:rPr>
+                              <m:sty m:val="p"/>
+                            </m:rPr>
+                            <a:rPr lang="en-US" sz="1400">
+                              <a:latin typeface="Cambria Math" panose="02040503050406030204" pitchFamily="18" charset="0"/>
+                              <a:ea typeface="Cambria Math" panose="02040503050406030204" pitchFamily="18" charset="0"/>
+                            </a:rPr>
+                            <m:t>IEAsm</m:t>
+                          </m:r>
+                          <m:r>
+                            <a:rPr lang="en-US" sz="1400">
+                              <a:latin typeface="Cambria Math" panose="02040503050406030204" pitchFamily="18" charset="0"/>
+                              <a:ea typeface="Cambria Math" panose="02040503050406030204" pitchFamily="18" charset="0"/>
+                            </a:rPr>
+                            <m:t>[</m:t>
+                          </m:r>
+                          <m:r>
+                            <a:rPr lang="en-US" sz="1400" i="1">
+                              <a:latin typeface="Cambria Math" panose="02040503050406030204" pitchFamily="18" charset="0"/>
+                              <a:ea typeface="Cambria Math" panose="02040503050406030204" pitchFamily="18" charset="0"/>
+                            </a:rPr>
+                            <m:t>𝑡𝑖𝑑</m:t>
+                          </m:r>
+                          <m:r>
+                            <a:rPr lang="en-US" sz="1400">
+                              <a:latin typeface="Cambria Math" panose="02040503050406030204" pitchFamily="18" charset="0"/>
+                              <a:ea typeface="Cambria Math" panose="02040503050406030204" pitchFamily="18" charset="0"/>
+                            </a:rPr>
+                            <m:t>]</m:t>
+                          </m:r>
+                        </m:sub>
+                      </m:sSub>
+                      <m:r>
+                        <a:rPr lang="en-US" sz="1400">
+                          <a:latin typeface="Cambria Math" panose="02040503050406030204" pitchFamily="18" charset="0"/>
+                          <a:ea typeface="Cambria Math" panose="02040503050406030204" pitchFamily="18" charset="0"/>
+                        </a:rPr>
+                        <m:t>(</m:t>
+                      </m:r>
+                      <m:r>
+                        <m:rPr>
+                          <m:sty m:val="p"/>
+                        </m:rPr>
+                        <a:rPr lang="en-US" sz="1400">
+                          <a:latin typeface="Cambria Math" panose="02040503050406030204" pitchFamily="18" charset="0"/>
+                          <a:ea typeface="Cambria Math" panose="02040503050406030204" pitchFamily="18" charset="0"/>
+                        </a:rPr>
+                        <m:t>PHBThrd</m:t>
+                      </m:r>
+                      <m:d>
+                        <m:dPr>
+                          <m:begChr m:val="["/>
+                          <m:endChr m:val="]"/>
+                          <m:ctrlPr>
+                            <a:rPr lang="en-US" sz="1400" i="1">
+                              <a:latin typeface="Cambria Math" panose="02040503050406030204" pitchFamily="18" charset="0"/>
+                              <a:ea typeface="Cambria Math" panose="02040503050406030204" pitchFamily="18" charset="0"/>
+                            </a:rPr>
+                          </m:ctrlPr>
+                        </m:dPr>
+                        <m:e>
+                          <m:r>
+                            <a:rPr lang="en-US" sz="1400" b="0" i="1" smtClean="0">
+                              <a:latin typeface="Cambria Math" panose="02040503050406030204" pitchFamily="18" charset="0"/>
+                              <a:ea typeface="Cambria Math" panose="02040503050406030204" pitchFamily="18" charset="0"/>
+                            </a:rPr>
+                            <m:t>𝑡𝑖𝑑</m:t>
+                          </m:r>
+                          <m:r>
+                            <a:rPr lang="en-US" sz="1400" b="0" i="1" smtClean="0">
+                              <a:latin typeface="Cambria Math" panose="02040503050406030204" pitchFamily="18" charset="0"/>
+                              <a:ea typeface="Cambria Math" panose="02040503050406030204" pitchFamily="18" charset="0"/>
+                            </a:rPr>
+                            <m:t>,</m:t>
+                          </m:r>
+                          <m:sSubSup>
+                            <m:sSubSupPr>
+                              <m:ctrlPr>
+                                <a:rPr lang="en-US" sz="1400" i="1">
+                                  <a:latin typeface="Cambria Math" panose="02040503050406030204" pitchFamily="18" charset="0"/>
+                                  <a:ea typeface="Cambria Math" panose="02040503050406030204" pitchFamily="18" charset="0"/>
+                                </a:rPr>
+                              </m:ctrlPr>
+                            </m:sSubSupPr>
+                            <m:e>
+                              <m:r>
+                                <a:rPr lang="en-US" sz="1400" i="1">
+                                  <a:latin typeface="Cambria Math" panose="02040503050406030204" pitchFamily="18" charset="0"/>
+                                  <a:ea typeface="Cambria Math" panose="02040503050406030204" pitchFamily="18" charset="0"/>
+                                </a:rPr>
+                                <m:t>𝜀</m:t>
+                              </m:r>
+                            </m:e>
+                            <m:sub>
+                              <m:r>
+                                <a:rPr lang="en-US" sz="1400" i="1">
+                                  <a:latin typeface="Cambria Math" panose="02040503050406030204" pitchFamily="18" charset="0"/>
+                                  <a:ea typeface="Cambria Math" panose="02040503050406030204" pitchFamily="18" charset="0"/>
+                                </a:rPr>
+                                <m:t>𝑡𝑖𝑑</m:t>
+                              </m:r>
+                            </m:sub>
+                            <m:sup>
+                              <m:r>
+                                <a:rPr lang="en-US" sz="1400" i="1">
+                                  <a:latin typeface="Cambria Math" panose="02040503050406030204" pitchFamily="18" charset="0"/>
+                                  <a:ea typeface="Cambria Math" panose="02040503050406030204" pitchFamily="18" charset="0"/>
+                                </a:rPr>
+                                <m:t>𝑀𝑇𝐿𝑖𝑛𝑘</m:t>
+                              </m:r>
+                            </m:sup>
+                          </m:sSubSup>
+                        </m:e>
+                      </m:d>
+                      <m:r>
+                        <a:rPr lang="en-US" sz="1400" i="1">
+                          <a:latin typeface="Cambria Math" panose="02040503050406030204" pitchFamily="18" charset="0"/>
+                          <a:ea typeface="Cambria Math" panose="02040503050406030204" pitchFamily="18" charset="0"/>
+                        </a:rPr>
+                        <m:t>)⊢</m:t>
+                      </m:r>
+                      <m:d>
+                        <m:dPr>
+                          <m:begChr m:val="⟦"/>
+                          <m:endChr m:val="⟧"/>
+                          <m:ctrlPr>
+                            <a:rPr lang="en-US" sz="1400" i="1" dirty="0">
+                              <a:latin typeface="Cambria Math" panose="02040503050406030204" pitchFamily="18" charset="0"/>
+                              <a:ea typeface="Cambria Math" panose="02040503050406030204" pitchFamily="18" charset="0"/>
+                            </a:rPr>
+                          </m:ctrlPr>
+                        </m:dPr>
+                        <m:e>
+                          <m:r>
+                            <a:rPr lang="en-US" sz="1400" b="1" dirty="0">
+                              <a:latin typeface="Cambria Math" panose="02040503050406030204" pitchFamily="18" charset="0"/>
+                              <a:ea typeface="Cambria Math" panose="02040503050406030204" pitchFamily="18" charset="0"/>
+                            </a:rPr>
+                            <m:t>𝐂𝐞𝐫𝐭𝐢𝐊𝐎</m:t>
+                          </m:r>
+                          <m:sSub>
+                            <m:sSubPr>
+                              <m:ctrlPr>
+                                <a:rPr lang="en-US" sz="1400" b="1" i="1" dirty="0">
+                                  <a:latin typeface="Cambria Math" panose="02040503050406030204" pitchFamily="18" charset="0"/>
+                                  <a:ea typeface="Cambria Math" panose="02040503050406030204" pitchFamily="18" charset="0"/>
+                                </a:rPr>
+                              </m:ctrlPr>
+                            </m:sSubPr>
+                            <m:e>
+                              <m:r>
+                                <a:rPr lang="en-US" sz="1400" b="1" dirty="0">
+                                  <a:latin typeface="Cambria Math" panose="02040503050406030204" pitchFamily="18" charset="0"/>
+                                  <a:ea typeface="Cambria Math" panose="02040503050406030204" pitchFamily="18" charset="0"/>
+                                </a:rPr>
+                                <m:t>𝐒</m:t>
+                              </m:r>
+                            </m:e>
+                            <m:sub>
+                              <m:r>
+                                <a:rPr lang="en-US" sz="1400" b="1" dirty="0">
+                                  <a:latin typeface="Cambria Math" panose="02040503050406030204" pitchFamily="18" charset="0"/>
+                                  <a:ea typeface="Cambria Math" panose="02040503050406030204" pitchFamily="18" charset="0"/>
+                                </a:rPr>
+                                <m:t>𝐭𝐡𝐫𝐝</m:t>
+                              </m:r>
+                            </m:sub>
+                          </m:sSub>
+                          <m:r>
+                            <a:rPr lang="en-US" sz="1400" b="1" i="1" dirty="0">
+                              <a:latin typeface="Cambria Math" panose="02040503050406030204" pitchFamily="18" charset="0"/>
+                              <a:ea typeface="Cambria Math" panose="02040503050406030204" pitchFamily="18" charset="0"/>
+                            </a:rPr>
+                            <m:t>⊕</m:t>
+                          </m:r>
+                          <m:r>
+                            <a:rPr lang="en-US" sz="1400" b="1" dirty="0">
+                              <a:latin typeface="Cambria Math" panose="02040503050406030204" pitchFamily="18" charset="0"/>
+                              <a:ea typeface="Cambria Math" panose="02040503050406030204" pitchFamily="18" charset="0"/>
+                            </a:rPr>
+                            <m:t>𝐂𝐭𝐱𝐭</m:t>
+                          </m:r>
+                        </m:e>
+                      </m:d>
+                      <m:r>
+                        <a:rPr lang="en-US" sz="1400" i="1" dirty="0">
+                          <a:latin typeface="Cambria Math" panose="02040503050406030204" pitchFamily="18" charset="0"/>
+                          <a:ea typeface="Cambria Math" panose="02040503050406030204" pitchFamily="18" charset="0"/>
+                        </a:rPr>
+                        <m:t> </m:t>
+                      </m:r>
+                    </m:oMath>
+                  </m:oMathPara>
+                </a14:m>
+                <a:endParaRPr lang="en-US" sz="1400" baseline="30000" dirty="0">
+                  <a:latin typeface="Cambria Math" panose="02040503050406030204" pitchFamily="18" charset="0"/>
+                  <a:ea typeface="Cambria Math" panose="02040503050406030204" pitchFamily="18" charset="0"/>
+                </a:endParaRPr>
+              </a:p>
+            </p:txBody>
+          </p:sp>
+        </mc:Choice>
+        <mc:Fallback xmlns="">
+          <p:sp>
+            <p:nvSpPr>
+              <p:cNvPr id="58" name="TextBox 57">
+                <a:extLst>
+                  <a:ext uri="{FF2B5EF4-FFF2-40B4-BE49-F238E27FC236}">
+                    <a16:creationId xmlns:a16="http://schemas.microsoft.com/office/drawing/2014/main" id="{CDB6750F-B87F-A348-9880-D146DDB4917F}"/>
+                  </a:ext>
+                </a:extLst>
+              </p:cNvPr>
+              <p:cNvSpPr txBox="1">
+                <a:spLocks noRot="1" noChangeAspect="1" noMove="1" noResize="1" noEditPoints="1" noAdjustHandles="1" noChangeArrowheads="1" noChangeShapeType="1" noTextEdit="1"/>
+              </p:cNvSpPr>
+              <p:nvPr/>
+            </p:nvSpPr>
+            <p:spPr>
+              <a:xfrm>
+                <a:off x="3421165" y="1755082"/>
+                <a:ext cx="5251374" cy="348493"/>
+              </a:xfrm>
+              <a:prstGeom prst="rect">
+                <a:avLst/>
+              </a:prstGeom>
+              <a:blipFill>
+                <a:blip r:embed="rId12"/>
+                <a:stretch>
+                  <a:fillRect b="-3448"/>
+                </a:stretch>
+              </a:blipFill>
+            </p:spPr>
+            <p:txBody>
+              <a:bodyPr/>
+              <a:lstStyle/>
+              <a:p>
+                <a:r>
+                  <a:rPr lang="en-US">
+                    <a:noFill/>
+                  </a:rPr>
+                  <a:t> </a:t>
+                </a:r>
+              </a:p>
+            </p:txBody>
+          </p:sp>
+        </mc:Fallback>
+      </mc:AlternateContent>
+      <mc:AlternateContent xmlns:mc="http://schemas.openxmlformats.org/markup-compatibility/2006" xmlns:a14="http://schemas.microsoft.com/office/drawing/2010/main">
+        <mc:Choice Requires="a14">
+          <p:sp>
+            <p:nvSpPr>
+              <p:cNvPr id="59" name="TextBox 58">
+                <a:extLst>
+                  <a:ext uri="{FF2B5EF4-FFF2-40B4-BE49-F238E27FC236}">
+                    <a16:creationId xmlns:a16="http://schemas.microsoft.com/office/drawing/2014/main" id="{7194CE62-850A-EB42-BCD6-38B28CA7FAA7}"/>
+                  </a:ext>
+                </a:extLst>
+              </p:cNvPr>
+              <p:cNvSpPr txBox="1"/>
+              <p:nvPr/>
+            </p:nvSpPr>
+            <p:spPr>
+              <a:xfrm>
+                <a:off x="3607323" y="1156836"/>
+                <a:ext cx="4920193" cy="339708"/>
+              </a:xfrm>
+              <a:prstGeom prst="rect">
+                <a:avLst/>
+              </a:prstGeom>
+              <a:noFill/>
+            </p:spPr>
+            <p:txBody>
+              <a:bodyPr wrap="none" rtlCol="0">
+                <a:spAutoFit/>
+              </a:bodyPr>
+              <a:lstStyle/>
+              <a:p>
+                <a:pPr/>
+                <a14:m>
+                  <m:oMathPara xmlns:m="http://schemas.openxmlformats.org/officeDocument/2006/math">
+                    <m:oMathParaPr>
+                      <m:jc m:val="centerGroup"/>
+                    </m:oMathParaPr>
+                    <m:oMath xmlns:m="http://schemas.openxmlformats.org/officeDocument/2006/math">
+                      <m:sSub>
+                        <m:sSubPr>
+                          <m:ctrlPr>
+                            <a:rPr lang="en-US" sz="1400" i="1" smtClean="0">
+                              <a:latin typeface="Cambria Math" panose="02040503050406030204" pitchFamily="18" charset="0"/>
+                              <a:ea typeface="Cambria Math" panose="02040503050406030204" pitchFamily="18" charset="0"/>
+                            </a:rPr>
+                          </m:ctrlPr>
+                        </m:sSubPr>
+                        <m:e>
+                          <m:r>
+                            <m:rPr>
+                              <m:sty m:val="p"/>
+                            </m:rPr>
+                            <a:rPr lang="en-US" sz="1400">
+                              <a:latin typeface="Cambria Math" panose="02040503050406030204" pitchFamily="18" charset="0"/>
+                              <a:ea typeface="Cambria Math" panose="02040503050406030204" pitchFamily="18" charset="0"/>
+                            </a:rPr>
+                            <m:t>Mach</m:t>
+                          </m:r>
+                        </m:e>
+                        <m:sub>
+                          <m:r>
+                            <m:rPr>
+                              <m:sty m:val="p"/>
+                            </m:rPr>
+                            <a:rPr lang="en-US" sz="1400" b="0" i="0" smtClean="0">
+                              <a:latin typeface="Cambria Math" panose="02040503050406030204" pitchFamily="18" charset="0"/>
+                              <a:ea typeface="Cambria Math" panose="02040503050406030204" pitchFamily="18" charset="0"/>
+                            </a:rPr>
+                            <m:t>TAsm</m:t>
+                          </m:r>
+                        </m:sub>
+                      </m:sSub>
+                      <m:r>
+                        <a:rPr lang="en-US" sz="1400">
+                          <a:latin typeface="Cambria Math" panose="02040503050406030204" pitchFamily="18" charset="0"/>
+                          <a:ea typeface="Cambria Math" panose="02040503050406030204" pitchFamily="18" charset="0"/>
+                        </a:rPr>
+                        <m:t>(</m:t>
+                      </m:r>
+                      <m:r>
+                        <m:rPr>
+                          <m:sty m:val="p"/>
+                        </m:rPr>
+                        <a:rPr lang="en-US" sz="1400">
+                          <a:latin typeface="Cambria Math" panose="02040503050406030204" pitchFamily="18" charset="0"/>
+                          <a:ea typeface="Cambria Math" panose="02040503050406030204" pitchFamily="18" charset="0"/>
+                        </a:rPr>
+                        <m:t>PHBThrd</m:t>
+                      </m:r>
+                      <m:d>
+                        <m:dPr>
+                          <m:begChr m:val="["/>
+                          <m:endChr m:val="]"/>
+                          <m:ctrlPr>
+                            <a:rPr lang="en-US" sz="1400" i="1">
+                              <a:latin typeface="Cambria Math" panose="02040503050406030204" pitchFamily="18" charset="0"/>
+                              <a:ea typeface="Cambria Math" panose="02040503050406030204" pitchFamily="18" charset="0"/>
+                            </a:rPr>
+                          </m:ctrlPr>
+                        </m:dPr>
+                        <m:e>
+                          <m:r>
+                            <a:rPr lang="en-US" sz="1400" b="0" i="1" smtClean="0">
+                              <a:latin typeface="Cambria Math" panose="02040503050406030204" pitchFamily="18" charset="0"/>
+                              <a:ea typeface="Cambria Math" panose="02040503050406030204" pitchFamily="18" charset="0"/>
+                            </a:rPr>
+                            <m:t>𝑡𝑖𝑑</m:t>
+                          </m:r>
+                          <m:r>
+                            <a:rPr lang="en-US" sz="1400" b="0" i="1" smtClean="0">
+                              <a:latin typeface="Cambria Math" panose="02040503050406030204" pitchFamily="18" charset="0"/>
+                              <a:ea typeface="Cambria Math" panose="02040503050406030204" pitchFamily="18" charset="0"/>
+                            </a:rPr>
+                            <m:t>,</m:t>
+                          </m:r>
+                          <m:sSubSup>
+                            <m:sSubSupPr>
+                              <m:ctrlPr>
+                                <a:rPr lang="en-US" sz="1400" i="1">
+                                  <a:latin typeface="Cambria Math" panose="02040503050406030204" pitchFamily="18" charset="0"/>
+                                  <a:ea typeface="Cambria Math" panose="02040503050406030204" pitchFamily="18" charset="0"/>
+                                </a:rPr>
+                              </m:ctrlPr>
+                            </m:sSubSupPr>
+                            <m:e>
+                              <m:r>
+                                <a:rPr lang="en-US" sz="1400" i="1">
+                                  <a:latin typeface="Cambria Math" panose="02040503050406030204" pitchFamily="18" charset="0"/>
+                                  <a:ea typeface="Cambria Math" panose="02040503050406030204" pitchFamily="18" charset="0"/>
+                                </a:rPr>
+                                <m:t>𝜀</m:t>
+                              </m:r>
+                            </m:e>
+                            <m:sub>
+                              <m:r>
+                                <a:rPr lang="en-US" sz="1400" i="1">
+                                  <a:latin typeface="Cambria Math" panose="02040503050406030204" pitchFamily="18" charset="0"/>
+                                  <a:ea typeface="Cambria Math" panose="02040503050406030204" pitchFamily="18" charset="0"/>
+                                </a:rPr>
+                                <m:t>𝑡𝑖𝑑</m:t>
+                              </m:r>
+                            </m:sub>
+                            <m:sup>
+                              <m:r>
+                                <a:rPr lang="en-US" sz="1400" i="1">
+                                  <a:latin typeface="Cambria Math" panose="02040503050406030204" pitchFamily="18" charset="0"/>
+                                  <a:ea typeface="Cambria Math" panose="02040503050406030204" pitchFamily="18" charset="0"/>
+                                </a:rPr>
+                                <m:t>𝑀𝑇𝐿𝑖𝑛𝑘</m:t>
+                              </m:r>
+                            </m:sup>
+                          </m:sSubSup>
+                        </m:e>
+                      </m:d>
+                      <m:r>
+                        <a:rPr lang="en-US" sz="1400" i="1">
+                          <a:latin typeface="Cambria Math" panose="02040503050406030204" pitchFamily="18" charset="0"/>
+                          <a:ea typeface="Cambria Math" panose="02040503050406030204" pitchFamily="18" charset="0"/>
+                        </a:rPr>
+                        <m:t>)⊢</m:t>
+                      </m:r>
+                      <m:d>
+                        <m:dPr>
+                          <m:begChr m:val="⟦"/>
+                          <m:endChr m:val="⟧"/>
+                          <m:ctrlPr>
+                            <a:rPr lang="en-US" sz="1400" i="1" dirty="0">
+                              <a:latin typeface="Cambria Math" panose="02040503050406030204" pitchFamily="18" charset="0"/>
+                              <a:ea typeface="Cambria Math" panose="02040503050406030204" pitchFamily="18" charset="0"/>
+                            </a:rPr>
+                          </m:ctrlPr>
+                        </m:dPr>
+                        <m:e>
+                          <m:r>
+                            <a:rPr lang="en-US" sz="1400" b="1" dirty="0">
+                              <a:latin typeface="Cambria Math" panose="02040503050406030204" pitchFamily="18" charset="0"/>
+                              <a:ea typeface="Cambria Math" panose="02040503050406030204" pitchFamily="18" charset="0"/>
+                            </a:rPr>
+                            <m:t>𝐂𝐞𝐫𝐭𝐢𝐊𝐎</m:t>
+                          </m:r>
+                          <m:sSub>
+                            <m:sSubPr>
+                              <m:ctrlPr>
+                                <a:rPr lang="en-US" sz="1400" b="1" i="1" dirty="0">
+                                  <a:latin typeface="Cambria Math" panose="02040503050406030204" pitchFamily="18" charset="0"/>
+                                  <a:ea typeface="Cambria Math" panose="02040503050406030204" pitchFamily="18" charset="0"/>
+                                </a:rPr>
+                              </m:ctrlPr>
+                            </m:sSubPr>
+                            <m:e>
+                              <m:r>
+                                <a:rPr lang="en-US" sz="1400" b="1" dirty="0">
+                                  <a:latin typeface="Cambria Math" panose="02040503050406030204" pitchFamily="18" charset="0"/>
+                                  <a:ea typeface="Cambria Math" panose="02040503050406030204" pitchFamily="18" charset="0"/>
+                                </a:rPr>
+                                <m:t>𝐒</m:t>
+                              </m:r>
+                            </m:e>
+                            <m:sub>
+                              <m:r>
+                                <a:rPr lang="en-US" sz="1400" b="1" dirty="0">
+                                  <a:latin typeface="Cambria Math" panose="02040503050406030204" pitchFamily="18" charset="0"/>
+                                  <a:ea typeface="Cambria Math" panose="02040503050406030204" pitchFamily="18" charset="0"/>
+                                </a:rPr>
+                                <m:t>𝐭𝐡𝐫𝐝</m:t>
+                              </m:r>
+                            </m:sub>
+                          </m:sSub>
+                          <m:r>
+                            <a:rPr lang="en-US" sz="1400" b="1" i="1" dirty="0">
+                              <a:latin typeface="Cambria Math" panose="02040503050406030204" pitchFamily="18" charset="0"/>
+                              <a:ea typeface="Cambria Math" panose="02040503050406030204" pitchFamily="18" charset="0"/>
+                            </a:rPr>
+                            <m:t>⊕</m:t>
+                          </m:r>
+                          <m:r>
+                            <a:rPr lang="en-US" sz="1400" b="1" dirty="0">
+                              <a:latin typeface="Cambria Math" panose="02040503050406030204" pitchFamily="18" charset="0"/>
+                              <a:ea typeface="Cambria Math" panose="02040503050406030204" pitchFamily="18" charset="0"/>
+                            </a:rPr>
+                            <m:t>𝐂𝐭𝐱𝐭</m:t>
+                          </m:r>
+                        </m:e>
+                      </m:d>
+                      <m:r>
+                        <a:rPr lang="en-US" sz="1400" i="1" dirty="0">
+                          <a:latin typeface="Cambria Math" panose="02040503050406030204" pitchFamily="18" charset="0"/>
+                          <a:ea typeface="Cambria Math" panose="02040503050406030204" pitchFamily="18" charset="0"/>
+                        </a:rPr>
+                        <m:t> </m:t>
+                      </m:r>
+                    </m:oMath>
+                  </m:oMathPara>
+                </a14:m>
+                <a:endParaRPr lang="en-US" sz="1400" baseline="30000" dirty="0">
+                  <a:latin typeface="Cambria Math" panose="02040503050406030204" pitchFamily="18" charset="0"/>
+                  <a:ea typeface="Cambria Math" panose="02040503050406030204" pitchFamily="18" charset="0"/>
+                </a:endParaRPr>
+              </a:p>
+            </p:txBody>
+          </p:sp>
+        </mc:Choice>
+        <mc:Fallback xmlns="">
+          <p:sp>
+            <p:nvSpPr>
+              <p:cNvPr id="59" name="TextBox 58">
+                <a:extLst>
+                  <a:ext uri="{FF2B5EF4-FFF2-40B4-BE49-F238E27FC236}">
+                    <a16:creationId xmlns:a16="http://schemas.microsoft.com/office/drawing/2014/main" id="{7194CE62-850A-EB42-BCD6-38B28CA7FAA7}"/>
+                  </a:ext>
+                </a:extLst>
+              </p:cNvPr>
+              <p:cNvSpPr txBox="1">
+                <a:spLocks noRot="1" noChangeAspect="1" noMove="1" noResize="1" noEditPoints="1" noAdjustHandles="1" noChangeArrowheads="1" noChangeShapeType="1" noTextEdit="1"/>
+              </p:cNvSpPr>
+              <p:nvPr/>
+            </p:nvSpPr>
+            <p:spPr>
+              <a:xfrm>
+                <a:off x="3607323" y="1156836"/>
+                <a:ext cx="4920193" cy="339708"/>
+              </a:xfrm>
+              <a:prstGeom prst="rect">
+                <a:avLst/>
+              </a:prstGeom>
+              <a:blipFill>
+                <a:blip r:embed="rId13"/>
+                <a:stretch>
+                  <a:fillRect b="-7143"/>
+                </a:stretch>
+              </a:blipFill>
+            </p:spPr>
+            <p:txBody>
+              <a:bodyPr/>
+              <a:lstStyle/>
+              <a:p>
+                <a:r>
+                  <a:rPr lang="en-US">
+                    <a:noFill/>
+                  </a:rPr>
+                  <a:t> </a:t>
+                </a:r>
+              </a:p>
+            </p:txBody>
+          </p:sp>
+        </mc:Fallback>
+      </mc:AlternateContent>
       <p:grpSp>
         <p:nvGrpSpPr>
           <p:cNvPr id="29" name="Group 28">

</xml_diff>

<commit_message>
finish draft for certikos multicore linking - almost done for the initial draft except multithreaded linking
</commit_message>
<xml_diff>
--- a/figs/certikos/concurrent_linking.pptx
+++ b/figs/certikos/concurrent_linking.pptx
@@ -717,7 +717,7 @@
         <p:spPr/>
         <p:txBody>
           <a:bodyPr>
-            <a:normAutofit fontScale="85000" lnSpcReduction="10000"/>
+            <a:normAutofit/>
           </a:bodyPr>
           <a:lstStyle/>
           <a:p>
@@ -5404,267 +5404,6 @@
       </p:grpSpPr>
       <p:sp>
         <p:nvSpPr>
-          <p:cNvPr id="69" name="Rectangle 68">
-            <a:extLst>
-              <a:ext uri="{FF2B5EF4-FFF2-40B4-BE49-F238E27FC236}">
-                <a16:creationId xmlns:a16="http://schemas.microsoft.com/office/drawing/2014/main" id="{DC8A0B07-494D-9F44-969E-26556242E355}"/>
-              </a:ext>
-            </a:extLst>
-          </p:cNvPr>
-          <p:cNvSpPr/>
-          <p:nvPr/>
-        </p:nvSpPr>
-        <p:spPr bwMode="auto">
-          <a:xfrm rot="16200000" flipH="1">
-            <a:off x="4526397" y="-1871173"/>
-            <a:ext cx="51566" cy="9003237"/>
-          </a:xfrm>
-          <a:prstGeom prst="rect">
-            <a:avLst/>
-          </a:prstGeom>
-          <a:solidFill>
-            <a:schemeClr val="accent6">
-              <a:lumMod val="20000"/>
-              <a:lumOff val="80000"/>
-            </a:schemeClr>
-          </a:solidFill>
-          <a:ln w="9525" cap="flat" cmpd="sng" algn="ctr">
-            <a:noFill/>
-            <a:prstDash val="solid"/>
-            <a:round/>
-            <a:headEnd type="none" w="med" len="med"/>
-            <a:tailEnd type="none" w="med" len="med"/>
-          </a:ln>
-          <a:effectLst/>
-          <a:extLst>
-            <a:ext uri="{AF507438-7753-43e0-B8FC-AC1667EBCBE1}">
-              <a14:hiddenEffects xmlns="" xmlns:a14="http://schemas.microsoft.com/office/drawing/2010/main">
-                <a:effectLst>
-                  <a:outerShdw blurRad="63500" dist="38099" dir="2700000" algn="ctr" rotWithShape="0">
-                    <a:schemeClr val="bg2">
-                      <a:alpha val="74998"/>
-                    </a:schemeClr>
-                  </a:outerShdw>
-                </a:effectLst>
-              </a14:hiddenEffects>
-            </a:ext>
-          </a:extLst>
-        </p:spPr>
-        <p:txBody>
-          <a:bodyPr vert="horz" wrap="square" lIns="91440" tIns="45720" rIns="91440" bIns="45720" numCol="1" rtlCol="0" anchor="t" anchorCtr="0" compatLnSpc="1">
-            <a:prstTxWarp prst="textNoShape">
-              <a:avLst/>
-            </a:prstTxWarp>
-          </a:bodyPr>
-          <a:lstStyle/>
-          <a:p>
-            <a:pPr marL="0" marR="0" indent="0" algn="l" defTabSz="914400" rtl="0" eaLnBrk="1" fontAlgn="base" latinLnBrk="0" hangingPunct="1">
-              <a:lnSpc>
-                <a:spcPct val="100000"/>
-              </a:lnSpc>
-              <a:spcBef>
-                <a:spcPct val="0"/>
-              </a:spcBef>
-              <a:spcAft>
-                <a:spcPct val="0"/>
-              </a:spcAft>
-              <a:buClrTx/>
-              <a:buSzTx/>
-              <a:buFontTx/>
-              <a:buNone/>
-              <a:tabLst/>
-            </a:pPr>
-            <a:endParaRPr kumimoji="0" lang="en-US" sz="1600" b="0" i="0" u="none" strike="noStrike" cap="none" normalizeH="0" baseline="0" dirty="0">
-              <a:ln>
-                <a:noFill/>
-              </a:ln>
-              <a:solidFill>
-                <a:schemeClr val="tx1"/>
-              </a:solidFill>
-              <a:effectLst/>
-              <a:latin typeface="Helvetica" pitchFamily="2" charset="0"/>
-              <a:ea typeface="ＭＳ Ｐゴシック" charset="0"/>
-              <a:cs typeface="Arial" charset="0"/>
-            </a:endParaRPr>
-          </a:p>
-        </p:txBody>
-      </p:sp>
-      <p:sp>
-        <p:nvSpPr>
-          <p:cNvPr id="71" name="Rectangle 70">
-            <a:extLst>
-              <a:ext uri="{FF2B5EF4-FFF2-40B4-BE49-F238E27FC236}">
-                <a16:creationId xmlns:a16="http://schemas.microsoft.com/office/drawing/2014/main" id="{D8503B4D-50CA-2D4D-90ED-F8AF5B99C0DE}"/>
-              </a:ext>
-            </a:extLst>
-          </p:cNvPr>
-          <p:cNvSpPr/>
-          <p:nvPr/>
-        </p:nvSpPr>
-        <p:spPr bwMode="auto">
-          <a:xfrm rot="16200000" flipH="1">
-            <a:off x="4517851" y="-1051219"/>
-            <a:ext cx="51566" cy="9003237"/>
-          </a:xfrm>
-          <a:prstGeom prst="rect">
-            <a:avLst/>
-          </a:prstGeom>
-          <a:solidFill>
-            <a:schemeClr val="accent6">
-              <a:lumMod val="20000"/>
-              <a:lumOff val="80000"/>
-            </a:schemeClr>
-          </a:solidFill>
-          <a:ln w="9525" cap="flat" cmpd="sng" algn="ctr">
-            <a:noFill/>
-            <a:prstDash val="solid"/>
-            <a:round/>
-            <a:headEnd type="none" w="med" len="med"/>
-            <a:tailEnd type="none" w="med" len="med"/>
-          </a:ln>
-          <a:effectLst/>
-          <a:extLst>
-            <a:ext uri="{AF507438-7753-43e0-B8FC-AC1667EBCBE1}">
-              <a14:hiddenEffects xmlns="" xmlns:a14="http://schemas.microsoft.com/office/drawing/2010/main">
-                <a:effectLst>
-                  <a:outerShdw blurRad="63500" dist="38099" dir="2700000" algn="ctr" rotWithShape="0">
-                    <a:schemeClr val="bg2">
-                      <a:alpha val="74998"/>
-                    </a:schemeClr>
-                  </a:outerShdw>
-                </a:effectLst>
-              </a14:hiddenEffects>
-            </a:ext>
-          </a:extLst>
-        </p:spPr>
-        <p:txBody>
-          <a:bodyPr vert="horz" wrap="square" lIns="91440" tIns="45720" rIns="91440" bIns="45720" numCol="1" rtlCol="0" anchor="t" anchorCtr="0" compatLnSpc="1">
-            <a:prstTxWarp prst="textNoShape">
-              <a:avLst/>
-            </a:prstTxWarp>
-          </a:bodyPr>
-          <a:lstStyle/>
-          <a:p>
-            <a:pPr marL="0" marR="0" indent="0" algn="l" defTabSz="914400" rtl="0" eaLnBrk="1" fontAlgn="base" latinLnBrk="0" hangingPunct="1">
-              <a:lnSpc>
-                <a:spcPct val="100000"/>
-              </a:lnSpc>
-              <a:spcBef>
-                <a:spcPct val="0"/>
-              </a:spcBef>
-              <a:spcAft>
-                <a:spcPct val="0"/>
-              </a:spcAft>
-              <a:buClrTx/>
-              <a:buSzTx/>
-              <a:buFontTx/>
-              <a:buNone/>
-              <a:tabLst/>
-            </a:pPr>
-            <a:endParaRPr kumimoji="0" lang="en-US" sz="1600" b="0" i="0" u="none" strike="noStrike" cap="none" normalizeH="0" baseline="0" dirty="0">
-              <a:ln>
-                <a:noFill/>
-              </a:ln>
-              <a:solidFill>
-                <a:schemeClr val="tx1"/>
-              </a:solidFill>
-              <a:effectLst/>
-              <a:latin typeface="Helvetica" pitchFamily="2" charset="0"/>
-              <a:ea typeface="ＭＳ Ｐゴシック" charset="0"/>
-              <a:cs typeface="Arial" charset="0"/>
-            </a:endParaRPr>
-          </a:p>
-        </p:txBody>
-      </p:sp>
-      <p:sp>
-        <p:nvSpPr>
-          <p:cNvPr id="68" name="Rectangle 67">
-            <a:extLst>
-              <a:ext uri="{FF2B5EF4-FFF2-40B4-BE49-F238E27FC236}">
-                <a16:creationId xmlns:a16="http://schemas.microsoft.com/office/drawing/2014/main" id="{9959C422-173D-FE4F-B4A1-4F63052290EB}"/>
-              </a:ext>
-            </a:extLst>
-          </p:cNvPr>
-          <p:cNvSpPr/>
-          <p:nvPr/>
-        </p:nvSpPr>
-        <p:spPr bwMode="auto">
-          <a:xfrm rot="16200000" flipH="1">
-            <a:off x="4513578" y="-2792676"/>
-            <a:ext cx="51566" cy="9003237"/>
-          </a:xfrm>
-          <a:prstGeom prst="rect">
-            <a:avLst/>
-          </a:prstGeom>
-          <a:solidFill>
-            <a:schemeClr val="accent6">
-              <a:lumMod val="20000"/>
-              <a:lumOff val="80000"/>
-            </a:schemeClr>
-          </a:solidFill>
-          <a:ln w="9525" cap="flat" cmpd="sng" algn="ctr">
-            <a:noFill/>
-            <a:prstDash val="solid"/>
-            <a:round/>
-            <a:headEnd type="none" w="med" len="med"/>
-            <a:tailEnd type="none" w="med" len="med"/>
-          </a:ln>
-          <a:effectLst/>
-          <a:extLst>
-            <a:ext uri="{AF507438-7753-43e0-B8FC-AC1667EBCBE1}">
-              <a14:hiddenEffects xmlns="" xmlns:a14="http://schemas.microsoft.com/office/drawing/2010/main">
-                <a:effectLst>
-                  <a:outerShdw blurRad="63500" dist="38099" dir="2700000" algn="ctr" rotWithShape="0">
-                    <a:schemeClr val="bg2">
-                      <a:alpha val="74998"/>
-                    </a:schemeClr>
-                  </a:outerShdw>
-                </a:effectLst>
-              </a14:hiddenEffects>
-            </a:ext>
-          </a:extLst>
-        </p:spPr>
-        <p:txBody>
-          <a:bodyPr vert="horz" wrap="square" lIns="91440" tIns="45720" rIns="91440" bIns="45720" numCol="1" rtlCol="0" anchor="t" anchorCtr="0" compatLnSpc="1">
-            <a:prstTxWarp prst="textNoShape">
-              <a:avLst/>
-            </a:prstTxWarp>
-          </a:bodyPr>
-          <a:lstStyle/>
-          <a:p>
-            <a:pPr marL="0" marR="0" indent="0" algn="l" defTabSz="914400" rtl="0" eaLnBrk="1" fontAlgn="base" latinLnBrk="0" hangingPunct="1">
-              <a:lnSpc>
-                <a:spcPct val="100000"/>
-              </a:lnSpc>
-              <a:spcBef>
-                <a:spcPct val="0"/>
-              </a:spcBef>
-              <a:spcAft>
-                <a:spcPct val="0"/>
-              </a:spcAft>
-              <a:buClrTx/>
-              <a:buSzTx/>
-              <a:buFontTx/>
-              <a:buNone/>
-              <a:tabLst/>
-            </a:pPr>
-            <a:endParaRPr kumimoji="0" lang="en-US" sz="1600" b="0" i="0" u="none" strike="noStrike" cap="none" normalizeH="0" baseline="0" dirty="0">
-              <a:ln>
-                <a:noFill/>
-              </a:ln>
-              <a:solidFill>
-                <a:schemeClr val="tx1"/>
-              </a:solidFill>
-              <a:effectLst/>
-              <a:latin typeface="Helvetica" pitchFamily="2" charset="0"/>
-              <a:ea typeface="ＭＳ Ｐゴシック" charset="0"/>
-              <a:cs typeface="Arial" charset="0"/>
-            </a:endParaRPr>
-          </a:p>
-        </p:txBody>
-      </p:sp>
-      <p:sp>
-        <p:nvSpPr>
           <p:cNvPr id="65" name="Rectangle 64">
             <a:extLst>
               <a:ext uri="{FF2B5EF4-FFF2-40B4-BE49-F238E27FC236}">
@@ -5847,7 +5586,7 @@
             </p:nvSpPr>
             <p:spPr>
               <a:xfrm>
-                <a:off x="4770341" y="1545540"/>
+                <a:off x="4776253" y="1509044"/>
                 <a:ext cx="4220771" cy="327334"/>
               </a:xfrm>
               <a:prstGeom prst="rect">
@@ -6101,7 +5840,7 @@
             </p:nvSpPr>
             <p:spPr>
               <a:xfrm>
-                <a:off x="4770341" y="1545540"/>
+                <a:off x="4776253" y="1509044"/>
                 <a:ext cx="4220771" cy="327334"/>
               </a:xfrm>
               <a:prstGeom prst="rect">
@@ -6110,7 +5849,7 @@
               <a:blipFill>
                 <a:blip r:embed="rId3"/>
                 <a:stretch>
-                  <a:fillRect b="-3846"/>
+                  <a:fillRect/>
                 </a:stretch>
               </a:blipFill>
             </p:spPr>
@@ -8815,7 +8554,7 @@
             </p:nvSpPr>
             <p:spPr>
               <a:xfrm>
-                <a:off x="4826455" y="2471509"/>
+                <a:off x="4826455" y="2441470"/>
                 <a:ext cx="4113370" cy="327334"/>
               </a:xfrm>
               <a:prstGeom prst="rect">
@@ -9078,7 +8817,7 @@
             </p:nvSpPr>
             <p:spPr>
               <a:xfrm>
-                <a:off x="4826455" y="2471509"/>
+                <a:off x="4826455" y="2441470"/>
                 <a:ext cx="4113370" cy="327334"/>
               </a:xfrm>
               <a:prstGeom prst="rect">
@@ -10178,6 +9917,77 @@
       </p:grpSpPr>
       <p:sp>
         <p:nvSpPr>
+          <p:cNvPr id="38" name="Rectangle 37">
+            <a:extLst>
+              <a:ext uri="{FF2B5EF4-FFF2-40B4-BE49-F238E27FC236}">
+                <a16:creationId xmlns:a16="http://schemas.microsoft.com/office/drawing/2014/main" id="{E5C0D393-5FAC-0A42-8415-10CF64DDDDE0}"/>
+              </a:ext>
+            </a:extLst>
+          </p:cNvPr>
+          <p:cNvSpPr/>
+          <p:nvPr/>
+        </p:nvSpPr>
+        <p:spPr>
+          <a:xfrm>
+            <a:off x="533400" y="221744"/>
+            <a:ext cx="8430886" cy="400110"/>
+          </a:xfrm>
+          <a:prstGeom prst="rect">
+            <a:avLst/>
+          </a:prstGeom>
+          <a:solidFill>
+            <a:schemeClr val="accent5"/>
+          </a:solidFill>
+          <a:ln>
+            <a:noFill/>
+          </a:ln>
+        </p:spPr>
+        <p:style>
+          <a:lnRef idx="2">
+            <a:schemeClr val="accent1"/>
+          </a:lnRef>
+          <a:fillRef idx="1">
+            <a:schemeClr val="lt1"/>
+          </a:fillRef>
+          <a:effectRef idx="0">
+            <a:schemeClr val="accent1"/>
+          </a:effectRef>
+          <a:fontRef idx="minor">
+            <a:schemeClr val="dk1"/>
+          </a:fontRef>
+        </p:style>
+        <p:txBody>
+          <a:bodyPr wrap="square" lIns="91440" tIns="45720" rIns="91440" bIns="45720">
+            <a:spAutoFit/>
+            <a:scene3d>
+              <a:camera prst="orthographicFront"/>
+              <a:lightRig rig="threePt" dir="t"/>
+            </a:scene3d>
+            <a:sp3d extrusionH="57150">
+              <a:bevelT w="38100" h="38100" prst="convex"/>
+            </a:sp3d>
+          </a:bodyPr>
+          <a:lstStyle/>
+          <a:p>
+            <a:pPr algn="ctr"/>
+            <a:endParaRPr lang="en-US" sz="2000" b="0" cap="none" spc="0" dirty="0">
+              <a:ln w="0"/>
+              <a:solidFill>
+                <a:schemeClr val="tx1"/>
+              </a:solidFill>
+              <a:effectLst>
+                <a:outerShdw blurRad="38100" dist="19050" dir="2700000" algn="tl" rotWithShape="0">
+                  <a:schemeClr val="dk1">
+                    <a:alpha val="40000"/>
+                  </a:schemeClr>
+                </a:outerShdw>
+              </a:effectLst>
+            </a:endParaRPr>
+          </a:p>
+        </p:txBody>
+      </p:sp>
+      <p:sp>
+        <p:nvSpPr>
           <p:cNvPr id="42" name="Rectangle 41">
             <a:extLst>
               <a:ext uri="{FF2B5EF4-FFF2-40B4-BE49-F238E27FC236}">
@@ -14747,8 +14557,8 @@
           </a:p>
         </p:txBody>
       </p:sp>
-      <mc:AlternateContent xmlns:mc="http://schemas.openxmlformats.org/markup-compatibility/2006" xmlns:a14="http://schemas.microsoft.com/office/drawing/2010/main">
-        <mc:Choice Requires="a14">
+      <mc:AlternateContent xmlns:mc="http://schemas.openxmlformats.org/markup-compatibility/2006">
+        <mc:Choice xmlns:a14="http://schemas.microsoft.com/office/drawing/2010/main" Requires="a14">
           <p:sp>
             <p:nvSpPr>
               <p:cNvPr id="33" name="TextBox 32">
@@ -14763,7 +14573,7 @@
             </p:nvSpPr>
             <p:spPr>
               <a:xfrm>
-                <a:off x="4162404" y="28664"/>
+                <a:off x="4162404" y="66139"/>
                 <a:ext cx="4115357" cy="307777"/>
               </a:xfrm>
               <a:prstGeom prst="rect">
@@ -14946,7 +14756,7 @@
             </p:txBody>
           </p:sp>
         </mc:Choice>
-        <mc:Fallback xmlns="">
+        <mc:Fallback>
           <p:sp>
             <p:nvSpPr>
               <p:cNvPr id="33" name="TextBox 32">
@@ -14963,7 +14773,7 @@
             </p:nvSpPr>
             <p:spPr>
               <a:xfrm>
-                <a:off x="4162404" y="28664"/>
+                <a:off x="4162404" y="66139"/>
                 <a:ext cx="4115357" cy="307777"/>
               </a:xfrm>
               <a:prstGeom prst="rect">
@@ -15210,8 +15020,8 @@
         </p:nvSpPr>
         <p:spPr bwMode="auto">
           <a:xfrm>
-            <a:off x="117978" y="70199"/>
-            <a:ext cx="8939135" cy="4987665"/>
+            <a:off x="117978" y="66139"/>
+            <a:ext cx="8939135" cy="4991725"/>
           </a:xfrm>
           <a:prstGeom prst="rect">
             <a:avLst/>

</xml_diff>